<commit_message>
Update power point - gradient descent, newton and lm
</commit_message>
<xml_diff>
--- a/power point - gradient descent newton.pptx
+++ b/power point - gradient descent newton.pptx
@@ -6,10 +6,10 @@
     <p:sldMasterId id="2147483730" r:id="rId2"/>
   </p:sldMasterIdLst>
   <p:notesMasterIdLst>
-    <p:notesMasterId r:id="rId17"/>
+    <p:notesMasterId r:id="rId23"/>
   </p:notesMasterIdLst>
   <p:handoutMasterIdLst>
-    <p:handoutMasterId r:id="rId18"/>
+    <p:handoutMasterId r:id="rId24"/>
   </p:handoutMasterIdLst>
   <p:sldIdLst>
     <p:sldId id="256" r:id="rId3"/>
@@ -25,7 +25,13 @@
     <p:sldId id="269" r:id="rId13"/>
     <p:sldId id="270" r:id="rId14"/>
     <p:sldId id="271" r:id="rId15"/>
-    <p:sldId id="258" r:id="rId16"/>
+    <p:sldId id="272" r:id="rId16"/>
+    <p:sldId id="273" r:id="rId17"/>
+    <p:sldId id="274" r:id="rId18"/>
+    <p:sldId id="275" r:id="rId19"/>
+    <p:sldId id="264" r:id="rId20"/>
+    <p:sldId id="265" r:id="rId21"/>
+    <p:sldId id="258" r:id="rId22"/>
   </p:sldIdLst>
   <p:sldSz cx="12192000" cy="6858000"/>
   <p:notesSz cx="6858000" cy="9144000"/>
@@ -1316,7 +1322,7 @@
           <a:p>
             <a:fld id="{9CDF745B-B3CB-4281-BB1A-F01DDA96301C}" type="slidenum">
               <a:rPr lang="en-GB" smtClean="0"/>
-              <a:t>14</a:t>
+              <a:t>20</a:t>
             </a:fld>
             <a:endParaRPr lang="en-GB"/>
           </a:p>
@@ -9405,6 +9411,4661 @@
       </p:grpSpPr>
       <p:sp>
         <p:nvSpPr>
+          <p:cNvPr id="2" name="Title 1">
+            <a:extLst>
+              <a:ext uri="{FF2B5EF4-FFF2-40B4-BE49-F238E27FC236}">
+                <a16:creationId xmlns:a16="http://schemas.microsoft.com/office/drawing/2014/main" id="{E2927949-F476-4BCE-629A-71EA451FF599}"/>
+              </a:ext>
+            </a:extLst>
+          </p:cNvPr>
+          <p:cNvSpPr>
+            <a:spLocks noGrp="1"/>
+          </p:cNvSpPr>
+          <p:nvPr>
+            <p:ph type="title"/>
+          </p:nvPr>
+        </p:nvSpPr>
+        <p:spPr>
+          <a:xfrm>
+            <a:off x="431800" y="980198"/>
+            <a:ext cx="9045832" cy="534988"/>
+          </a:xfrm>
+        </p:spPr>
+        <p:txBody>
+          <a:bodyPr>
+            <a:normAutofit/>
+          </a:bodyPr>
+          <a:lstStyle/>
+          <a:p>
+            <a:r>
+              <a:rPr lang="en-KZ" sz="1800" dirty="0">
+                <a:latin typeface="Jost Medium" pitchFamily="2" charset="77"/>
+                <a:ea typeface="Jost Medium" pitchFamily="2" charset="77"/>
+              </a:rPr>
+              <a:t>What is Levenberg-Marquardt (LM) Method?</a:t>
+            </a:r>
+          </a:p>
+        </p:txBody>
+      </p:sp>
+      <p:cxnSp>
+        <p:nvCxnSpPr>
+          <p:cNvPr id="6" name="Straight Connector 5">
+            <a:extLst>
+              <a:ext uri="{FF2B5EF4-FFF2-40B4-BE49-F238E27FC236}">
+                <a16:creationId xmlns:a16="http://schemas.microsoft.com/office/drawing/2014/main" id="{B07C22B3-5978-C3A7-2CDE-7CC5F6745853}"/>
+              </a:ext>
+            </a:extLst>
+          </p:cNvPr>
+          <p:cNvCxnSpPr>
+            <a:cxnSpLocks/>
+          </p:cNvCxnSpPr>
+          <p:nvPr/>
+        </p:nvCxnSpPr>
+        <p:spPr>
+          <a:xfrm>
+            <a:off x="431800" y="1515186"/>
+            <a:ext cx="9711558" cy="0"/>
+          </a:xfrm>
+          <a:prstGeom prst="line">
+            <a:avLst/>
+          </a:prstGeom>
+          <a:ln w="28575">
+            <a:solidFill>
+              <a:srgbClr val="8F061A"/>
+            </a:solidFill>
+          </a:ln>
+        </p:spPr>
+        <p:style>
+          <a:lnRef idx="1">
+            <a:schemeClr val="accent1"/>
+          </a:lnRef>
+          <a:fillRef idx="0">
+            <a:schemeClr val="accent1"/>
+          </a:fillRef>
+          <a:effectRef idx="0">
+            <a:schemeClr val="accent1"/>
+          </a:effectRef>
+          <a:fontRef idx="minor">
+            <a:schemeClr val="tx1"/>
+          </a:fontRef>
+        </p:style>
+      </p:cxnSp>
+      <p:grpSp>
+        <p:nvGrpSpPr>
+          <p:cNvPr id="8" name="Group 7">
+            <a:extLst>
+              <a:ext uri="{FF2B5EF4-FFF2-40B4-BE49-F238E27FC236}">
+                <a16:creationId xmlns:a16="http://schemas.microsoft.com/office/drawing/2014/main" id="{64519B29-6C2D-437F-2D5D-CCD987C4BC72}"/>
+              </a:ext>
+            </a:extLst>
+          </p:cNvPr>
+          <p:cNvGrpSpPr/>
+          <p:nvPr/>
+        </p:nvGrpSpPr>
+        <p:grpSpPr>
+          <a:xfrm flipH="1">
+            <a:off x="6014977" y="2329400"/>
+            <a:ext cx="162043" cy="3164400"/>
+            <a:chOff x="8279130" y="1995049"/>
+            <a:chExt cx="201602" cy="3932723"/>
+          </a:xfrm>
+        </p:grpSpPr>
+        <p:pic>
+          <p:nvPicPr>
+            <p:cNvPr id="9" name="Picture 8" descr="Shape&#10;&#10;Description automatically generated">
+              <a:extLst>
+                <a:ext uri="{FF2B5EF4-FFF2-40B4-BE49-F238E27FC236}">
+                  <a16:creationId xmlns:a16="http://schemas.microsoft.com/office/drawing/2014/main" id="{0DDB8537-C0D3-F7D1-5BC0-223987B18824}"/>
+                </a:ext>
+              </a:extLst>
+            </p:cNvPr>
+            <p:cNvPicPr>
+              <a:picLocks noChangeAspect="1"/>
+            </p:cNvPicPr>
+            <p:nvPr/>
+          </p:nvPicPr>
+          <p:blipFill>
+            <a:blip r:embed="rId2"/>
+            <a:stretch>
+              <a:fillRect/>
+            </a:stretch>
+          </p:blipFill>
+          <p:spPr>
+            <a:xfrm>
+              <a:off x="8279130" y="1995049"/>
+              <a:ext cx="201600" cy="201600"/>
+            </a:xfrm>
+            <a:prstGeom prst="rect">
+              <a:avLst/>
+            </a:prstGeom>
+            <a:ln>
+              <a:noFill/>
+            </a:ln>
+          </p:spPr>
+        </p:pic>
+        <p:pic>
+          <p:nvPicPr>
+            <p:cNvPr id="10" name="Picture 9" descr="Shape&#10;&#10;Description automatically generated">
+              <a:extLst>
+                <a:ext uri="{FF2B5EF4-FFF2-40B4-BE49-F238E27FC236}">
+                  <a16:creationId xmlns:a16="http://schemas.microsoft.com/office/drawing/2014/main" id="{26ABF83E-D09A-A3F9-6E67-6E93EB3513CC}"/>
+                </a:ext>
+              </a:extLst>
+            </p:cNvPr>
+            <p:cNvPicPr>
+              <a:picLocks noChangeAspect="1"/>
+            </p:cNvPicPr>
+            <p:nvPr/>
+          </p:nvPicPr>
+          <p:blipFill>
+            <a:blip r:embed="rId2"/>
+            <a:stretch>
+              <a:fillRect/>
+            </a:stretch>
+          </p:blipFill>
+          <p:spPr>
+            <a:xfrm>
+              <a:off x="8279130" y="2257443"/>
+              <a:ext cx="201600" cy="201600"/>
+            </a:xfrm>
+            <a:prstGeom prst="rect">
+              <a:avLst/>
+            </a:prstGeom>
+            <a:ln>
+              <a:noFill/>
+            </a:ln>
+          </p:spPr>
+        </p:pic>
+        <p:pic>
+          <p:nvPicPr>
+            <p:cNvPr id="11" name="Picture 10" descr="Shape&#10;&#10;Description automatically generated">
+              <a:extLst>
+                <a:ext uri="{FF2B5EF4-FFF2-40B4-BE49-F238E27FC236}">
+                  <a16:creationId xmlns:a16="http://schemas.microsoft.com/office/drawing/2014/main" id="{CCA1D584-D24E-AD4B-A5B0-44050EE6B5C8}"/>
+                </a:ext>
+              </a:extLst>
+            </p:cNvPr>
+            <p:cNvPicPr>
+              <a:picLocks noChangeAspect="1"/>
+            </p:cNvPicPr>
+            <p:nvPr/>
+          </p:nvPicPr>
+          <p:blipFill>
+            <a:blip r:embed="rId2"/>
+            <a:stretch>
+              <a:fillRect/>
+            </a:stretch>
+          </p:blipFill>
+          <p:spPr>
+            <a:xfrm>
+              <a:off x="8279130" y="2525074"/>
+              <a:ext cx="201600" cy="201600"/>
+            </a:xfrm>
+            <a:prstGeom prst="rect">
+              <a:avLst/>
+            </a:prstGeom>
+            <a:ln>
+              <a:noFill/>
+            </a:ln>
+          </p:spPr>
+        </p:pic>
+        <p:pic>
+          <p:nvPicPr>
+            <p:cNvPr id="12" name="Picture 11" descr="Shape&#10;&#10;Description automatically generated">
+              <a:extLst>
+                <a:ext uri="{FF2B5EF4-FFF2-40B4-BE49-F238E27FC236}">
+                  <a16:creationId xmlns:a16="http://schemas.microsoft.com/office/drawing/2014/main" id="{B1DEA503-2A48-D1DB-FF32-CD6871B8D9FE}"/>
+                </a:ext>
+              </a:extLst>
+            </p:cNvPr>
+            <p:cNvPicPr>
+              <a:picLocks noChangeAspect="1"/>
+            </p:cNvPicPr>
+            <p:nvPr/>
+          </p:nvPicPr>
+          <p:blipFill>
+            <a:blip r:embed="rId2"/>
+            <a:stretch>
+              <a:fillRect/>
+            </a:stretch>
+          </p:blipFill>
+          <p:spPr>
+            <a:xfrm>
+              <a:off x="8279130" y="2792705"/>
+              <a:ext cx="201600" cy="201600"/>
+            </a:xfrm>
+            <a:prstGeom prst="rect">
+              <a:avLst/>
+            </a:prstGeom>
+            <a:ln>
+              <a:noFill/>
+            </a:ln>
+          </p:spPr>
+        </p:pic>
+        <p:pic>
+          <p:nvPicPr>
+            <p:cNvPr id="13" name="Picture 12" descr="Shape&#10;&#10;Description automatically generated">
+              <a:extLst>
+                <a:ext uri="{FF2B5EF4-FFF2-40B4-BE49-F238E27FC236}">
+                  <a16:creationId xmlns:a16="http://schemas.microsoft.com/office/drawing/2014/main" id="{84306BC2-5B3B-FED3-02DA-1ABDF8045907}"/>
+                </a:ext>
+              </a:extLst>
+            </p:cNvPr>
+            <p:cNvPicPr>
+              <a:picLocks noChangeAspect="1"/>
+            </p:cNvPicPr>
+            <p:nvPr/>
+          </p:nvPicPr>
+          <p:blipFill>
+            <a:blip r:embed="rId2"/>
+            <a:stretch>
+              <a:fillRect/>
+            </a:stretch>
+          </p:blipFill>
+          <p:spPr>
+            <a:xfrm>
+              <a:off x="8279130" y="3060336"/>
+              <a:ext cx="201600" cy="201600"/>
+            </a:xfrm>
+            <a:prstGeom prst="rect">
+              <a:avLst/>
+            </a:prstGeom>
+            <a:ln>
+              <a:noFill/>
+            </a:ln>
+          </p:spPr>
+        </p:pic>
+        <p:pic>
+          <p:nvPicPr>
+            <p:cNvPr id="14" name="Picture 13" descr="Shape&#10;&#10;Description automatically generated">
+              <a:extLst>
+                <a:ext uri="{FF2B5EF4-FFF2-40B4-BE49-F238E27FC236}">
+                  <a16:creationId xmlns:a16="http://schemas.microsoft.com/office/drawing/2014/main" id="{85B62D0E-EB08-85F6-9ADE-CEB8637EBF68}"/>
+                </a:ext>
+              </a:extLst>
+            </p:cNvPr>
+            <p:cNvPicPr>
+              <a:picLocks noChangeAspect="1"/>
+            </p:cNvPicPr>
+            <p:nvPr/>
+          </p:nvPicPr>
+          <p:blipFill>
+            <a:blip r:embed="rId2"/>
+            <a:stretch>
+              <a:fillRect/>
+            </a:stretch>
+          </p:blipFill>
+          <p:spPr>
+            <a:xfrm>
+              <a:off x="8279130" y="3327967"/>
+              <a:ext cx="201600" cy="201600"/>
+            </a:xfrm>
+            <a:prstGeom prst="rect">
+              <a:avLst/>
+            </a:prstGeom>
+            <a:ln>
+              <a:noFill/>
+            </a:ln>
+          </p:spPr>
+        </p:pic>
+        <p:pic>
+          <p:nvPicPr>
+            <p:cNvPr id="15" name="Picture 14" descr="Shape&#10;&#10;Description automatically generated">
+              <a:extLst>
+                <a:ext uri="{FF2B5EF4-FFF2-40B4-BE49-F238E27FC236}">
+                  <a16:creationId xmlns:a16="http://schemas.microsoft.com/office/drawing/2014/main" id="{60228803-9B5F-FE17-AEAE-137A8081E908}"/>
+                </a:ext>
+              </a:extLst>
+            </p:cNvPr>
+            <p:cNvPicPr>
+              <a:picLocks noChangeAspect="1"/>
+            </p:cNvPicPr>
+            <p:nvPr/>
+          </p:nvPicPr>
+          <p:blipFill>
+            <a:blip r:embed="rId2"/>
+            <a:stretch>
+              <a:fillRect/>
+            </a:stretch>
+          </p:blipFill>
+          <p:spPr>
+            <a:xfrm>
+              <a:off x="8279130" y="3590361"/>
+              <a:ext cx="201600" cy="201600"/>
+            </a:xfrm>
+            <a:prstGeom prst="rect">
+              <a:avLst/>
+            </a:prstGeom>
+            <a:ln>
+              <a:noFill/>
+            </a:ln>
+          </p:spPr>
+        </p:pic>
+        <p:pic>
+          <p:nvPicPr>
+            <p:cNvPr id="16" name="Picture 15" descr="Shape&#10;&#10;Description automatically generated">
+              <a:extLst>
+                <a:ext uri="{FF2B5EF4-FFF2-40B4-BE49-F238E27FC236}">
+                  <a16:creationId xmlns:a16="http://schemas.microsoft.com/office/drawing/2014/main" id="{4BC20CFB-F86A-523D-E736-9DC5339DA0D6}"/>
+                </a:ext>
+              </a:extLst>
+            </p:cNvPr>
+            <p:cNvPicPr>
+              <a:picLocks noChangeAspect="1"/>
+            </p:cNvPicPr>
+            <p:nvPr/>
+          </p:nvPicPr>
+          <p:blipFill>
+            <a:blip r:embed="rId2"/>
+            <a:stretch>
+              <a:fillRect/>
+            </a:stretch>
+          </p:blipFill>
+          <p:spPr>
+            <a:xfrm>
+              <a:off x="8279130" y="3857992"/>
+              <a:ext cx="201600" cy="201600"/>
+            </a:xfrm>
+            <a:prstGeom prst="rect">
+              <a:avLst/>
+            </a:prstGeom>
+            <a:ln>
+              <a:noFill/>
+            </a:ln>
+          </p:spPr>
+        </p:pic>
+        <p:pic>
+          <p:nvPicPr>
+            <p:cNvPr id="17" name="Picture 16" descr="Shape&#10;&#10;Description automatically generated">
+              <a:extLst>
+                <a:ext uri="{FF2B5EF4-FFF2-40B4-BE49-F238E27FC236}">
+                  <a16:creationId xmlns:a16="http://schemas.microsoft.com/office/drawing/2014/main" id="{41BF8784-63FA-7857-DCB3-A332A29CC5F2}"/>
+                </a:ext>
+              </a:extLst>
+            </p:cNvPr>
+            <p:cNvPicPr>
+              <a:picLocks noChangeAspect="1"/>
+            </p:cNvPicPr>
+            <p:nvPr/>
+          </p:nvPicPr>
+          <p:blipFill>
+            <a:blip r:embed="rId2"/>
+            <a:stretch>
+              <a:fillRect/>
+            </a:stretch>
+          </p:blipFill>
+          <p:spPr>
+            <a:xfrm>
+              <a:off x="8279132" y="4125623"/>
+              <a:ext cx="201600" cy="201600"/>
+            </a:xfrm>
+            <a:prstGeom prst="rect">
+              <a:avLst/>
+            </a:prstGeom>
+            <a:ln>
+              <a:noFill/>
+            </a:ln>
+          </p:spPr>
+        </p:pic>
+        <p:pic>
+          <p:nvPicPr>
+            <p:cNvPr id="18" name="Picture 17" descr="Shape&#10;&#10;Description automatically generated">
+              <a:extLst>
+                <a:ext uri="{FF2B5EF4-FFF2-40B4-BE49-F238E27FC236}">
+                  <a16:creationId xmlns:a16="http://schemas.microsoft.com/office/drawing/2014/main" id="{5DF0C58E-C99A-8E73-8FFA-4AD7D24459BF}"/>
+                </a:ext>
+              </a:extLst>
+            </p:cNvPr>
+            <p:cNvPicPr>
+              <a:picLocks noChangeAspect="1"/>
+            </p:cNvPicPr>
+            <p:nvPr/>
+          </p:nvPicPr>
+          <p:blipFill>
+            <a:blip r:embed="rId2"/>
+            <a:stretch>
+              <a:fillRect/>
+            </a:stretch>
+          </p:blipFill>
+          <p:spPr>
+            <a:xfrm>
+              <a:off x="8279130" y="4393254"/>
+              <a:ext cx="201600" cy="201600"/>
+            </a:xfrm>
+            <a:prstGeom prst="rect">
+              <a:avLst/>
+            </a:prstGeom>
+            <a:ln>
+              <a:noFill/>
+            </a:ln>
+          </p:spPr>
+        </p:pic>
+        <p:pic>
+          <p:nvPicPr>
+            <p:cNvPr id="19" name="Picture 18" descr="Shape&#10;&#10;Description automatically generated">
+              <a:extLst>
+                <a:ext uri="{FF2B5EF4-FFF2-40B4-BE49-F238E27FC236}">
+                  <a16:creationId xmlns:a16="http://schemas.microsoft.com/office/drawing/2014/main" id="{15CB782F-FC33-3800-C851-1989556FDDEE}"/>
+                </a:ext>
+              </a:extLst>
+            </p:cNvPr>
+            <p:cNvPicPr>
+              <a:picLocks noChangeAspect="1"/>
+            </p:cNvPicPr>
+            <p:nvPr/>
+          </p:nvPicPr>
+          <p:blipFill>
+            <a:blip r:embed="rId2"/>
+            <a:stretch>
+              <a:fillRect/>
+            </a:stretch>
+          </p:blipFill>
+          <p:spPr>
+            <a:xfrm>
+              <a:off x="8279130" y="4660885"/>
+              <a:ext cx="201600" cy="201600"/>
+            </a:xfrm>
+            <a:prstGeom prst="rect">
+              <a:avLst/>
+            </a:prstGeom>
+            <a:ln>
+              <a:noFill/>
+            </a:ln>
+          </p:spPr>
+        </p:pic>
+        <p:pic>
+          <p:nvPicPr>
+            <p:cNvPr id="20" name="Picture 19" descr="Shape&#10;&#10;Description automatically generated">
+              <a:extLst>
+                <a:ext uri="{FF2B5EF4-FFF2-40B4-BE49-F238E27FC236}">
+                  <a16:creationId xmlns:a16="http://schemas.microsoft.com/office/drawing/2014/main" id="{9B56A7A5-D22D-3254-2F6F-FCE68B0CF6B6}"/>
+                </a:ext>
+              </a:extLst>
+            </p:cNvPr>
+            <p:cNvPicPr>
+              <a:picLocks noChangeAspect="1"/>
+            </p:cNvPicPr>
+            <p:nvPr/>
+          </p:nvPicPr>
+          <p:blipFill>
+            <a:blip r:embed="rId2"/>
+            <a:stretch>
+              <a:fillRect/>
+            </a:stretch>
+          </p:blipFill>
+          <p:spPr>
+            <a:xfrm>
+              <a:off x="8279130" y="4923279"/>
+              <a:ext cx="201600" cy="201600"/>
+            </a:xfrm>
+            <a:prstGeom prst="rect">
+              <a:avLst/>
+            </a:prstGeom>
+            <a:ln>
+              <a:noFill/>
+            </a:ln>
+          </p:spPr>
+        </p:pic>
+        <p:pic>
+          <p:nvPicPr>
+            <p:cNvPr id="21" name="Picture 20" descr="Shape&#10;&#10;Description automatically generated">
+              <a:extLst>
+                <a:ext uri="{FF2B5EF4-FFF2-40B4-BE49-F238E27FC236}">
+                  <a16:creationId xmlns:a16="http://schemas.microsoft.com/office/drawing/2014/main" id="{526A92B1-82ED-1340-D0D4-5DC2795319F0}"/>
+                </a:ext>
+              </a:extLst>
+            </p:cNvPr>
+            <p:cNvPicPr>
+              <a:picLocks noChangeAspect="1"/>
+            </p:cNvPicPr>
+            <p:nvPr/>
+          </p:nvPicPr>
+          <p:blipFill>
+            <a:blip r:embed="rId2"/>
+            <a:stretch>
+              <a:fillRect/>
+            </a:stretch>
+          </p:blipFill>
+          <p:spPr>
+            <a:xfrm>
+              <a:off x="8279130" y="5190910"/>
+              <a:ext cx="201600" cy="201600"/>
+            </a:xfrm>
+            <a:prstGeom prst="rect">
+              <a:avLst/>
+            </a:prstGeom>
+            <a:ln>
+              <a:noFill/>
+            </a:ln>
+          </p:spPr>
+        </p:pic>
+        <p:pic>
+          <p:nvPicPr>
+            <p:cNvPr id="22" name="Picture 21" descr="Shape&#10;&#10;Description automatically generated">
+              <a:extLst>
+                <a:ext uri="{FF2B5EF4-FFF2-40B4-BE49-F238E27FC236}">
+                  <a16:creationId xmlns:a16="http://schemas.microsoft.com/office/drawing/2014/main" id="{161D2925-2DBD-8A27-D9C7-7D3BFC47D65D}"/>
+                </a:ext>
+              </a:extLst>
+            </p:cNvPr>
+            <p:cNvPicPr>
+              <a:picLocks noChangeAspect="1"/>
+            </p:cNvPicPr>
+            <p:nvPr/>
+          </p:nvPicPr>
+          <p:blipFill>
+            <a:blip r:embed="rId2"/>
+            <a:stretch>
+              <a:fillRect/>
+            </a:stretch>
+          </p:blipFill>
+          <p:spPr>
+            <a:xfrm>
+              <a:off x="8279130" y="5458541"/>
+              <a:ext cx="201600" cy="201600"/>
+            </a:xfrm>
+            <a:prstGeom prst="rect">
+              <a:avLst/>
+            </a:prstGeom>
+            <a:ln>
+              <a:noFill/>
+            </a:ln>
+          </p:spPr>
+        </p:pic>
+        <p:pic>
+          <p:nvPicPr>
+            <p:cNvPr id="23" name="Picture 22" descr="Shape&#10;&#10;Description automatically generated">
+              <a:extLst>
+                <a:ext uri="{FF2B5EF4-FFF2-40B4-BE49-F238E27FC236}">
+                  <a16:creationId xmlns:a16="http://schemas.microsoft.com/office/drawing/2014/main" id="{D5D354CC-45DC-B856-7D33-E3DB07A0B8B6}"/>
+                </a:ext>
+              </a:extLst>
+            </p:cNvPr>
+            <p:cNvPicPr>
+              <a:picLocks noChangeAspect="1"/>
+            </p:cNvPicPr>
+            <p:nvPr/>
+          </p:nvPicPr>
+          <p:blipFill>
+            <a:blip r:embed="rId2"/>
+            <a:stretch>
+              <a:fillRect/>
+            </a:stretch>
+          </p:blipFill>
+          <p:spPr>
+            <a:xfrm>
+              <a:off x="8279130" y="5726172"/>
+              <a:ext cx="201600" cy="201600"/>
+            </a:xfrm>
+            <a:prstGeom prst="rect">
+              <a:avLst/>
+            </a:prstGeom>
+            <a:ln>
+              <a:noFill/>
+            </a:ln>
+          </p:spPr>
+        </p:pic>
+      </p:grpSp>
+      <p:pic>
+        <p:nvPicPr>
+          <p:cNvPr id="24" name="Picture 23" descr="A red circle with a white number on it&#10;&#10;Description automatically generated">
+            <a:extLst>
+              <a:ext uri="{FF2B5EF4-FFF2-40B4-BE49-F238E27FC236}">
+                <a16:creationId xmlns:a16="http://schemas.microsoft.com/office/drawing/2014/main" id="{B3DD1FC3-B5B2-7E83-1D33-1C6BAEBC3E4F}"/>
+              </a:ext>
+            </a:extLst>
+          </p:cNvPr>
+          <p:cNvPicPr>
+            <a:picLocks noChangeAspect="1"/>
+          </p:cNvPicPr>
+          <p:nvPr/>
+        </p:nvPicPr>
+        <p:blipFill>
+          <a:blip r:embed="rId3">
+            <a:extLst>
+              <a:ext uri="{28A0092B-C50C-407E-A947-70E740481C1C}">
+                <a14:useLocalDpi xmlns:a14="http://schemas.microsoft.com/office/drawing/2010/main" val="0"/>
+              </a:ext>
+            </a:extLst>
+          </a:blip>
+          <a:stretch>
+            <a:fillRect/>
+          </a:stretch>
+        </p:blipFill>
+        <p:spPr>
+          <a:xfrm>
+            <a:off x="277915" y="1702982"/>
+            <a:ext cx="307768" cy="307768"/>
+          </a:xfrm>
+          <a:prstGeom prst="rect">
+            <a:avLst/>
+          </a:prstGeom>
+        </p:spPr>
+      </p:pic>
+      <p:pic>
+        <p:nvPicPr>
+          <p:cNvPr id="27" name="Picture 26" descr="A red circle with a white number on it&#10;&#10;Description automatically generated">
+            <a:extLst>
+              <a:ext uri="{FF2B5EF4-FFF2-40B4-BE49-F238E27FC236}">
+                <a16:creationId xmlns:a16="http://schemas.microsoft.com/office/drawing/2014/main" id="{886AD4C8-ED94-4C94-9158-F8D0899DE07F}"/>
+              </a:ext>
+            </a:extLst>
+          </p:cNvPr>
+          <p:cNvPicPr>
+            <a:picLocks noChangeAspect="1"/>
+          </p:cNvPicPr>
+          <p:nvPr/>
+        </p:nvPicPr>
+        <p:blipFill>
+          <a:blip r:embed="rId4">
+            <a:extLst>
+              <a:ext uri="{28A0092B-C50C-407E-A947-70E740481C1C}">
+                <a14:useLocalDpi xmlns:a14="http://schemas.microsoft.com/office/drawing/2010/main" val="0"/>
+              </a:ext>
+            </a:extLst>
+          </a:blip>
+          <a:stretch>
+            <a:fillRect/>
+          </a:stretch>
+        </p:blipFill>
+        <p:spPr>
+          <a:xfrm>
+            <a:off x="6132616" y="1702982"/>
+            <a:ext cx="307767" cy="307767"/>
+          </a:xfrm>
+          <a:prstGeom prst="rect">
+            <a:avLst/>
+          </a:prstGeom>
+        </p:spPr>
+      </p:pic>
+      <p:sp>
+        <p:nvSpPr>
+          <p:cNvPr id="30" name="Rectangle 29">
+            <a:extLst>
+              <a:ext uri="{FF2B5EF4-FFF2-40B4-BE49-F238E27FC236}">
+                <a16:creationId xmlns:a16="http://schemas.microsoft.com/office/drawing/2014/main" id="{CABFE483-1013-F6EE-F8FF-B60EE1D4E60F}"/>
+              </a:ext>
+            </a:extLst>
+          </p:cNvPr>
+          <p:cNvSpPr/>
+          <p:nvPr/>
+        </p:nvSpPr>
+        <p:spPr>
+          <a:xfrm>
+            <a:off x="581605" y="1888334"/>
+            <a:ext cx="5319812" cy="4862870"/>
+          </a:xfrm>
+          <a:prstGeom prst="rect">
+            <a:avLst/>
+          </a:prstGeom>
+        </p:spPr>
+        <p:txBody>
+          <a:bodyPr wrap="square">
+            <a:spAutoFit/>
+          </a:bodyPr>
+          <a:lstStyle/>
+          <a:p>
+            <a:pPr marL="285750" indent="-285750">
+              <a:lnSpc>
+                <a:spcPct val="150000"/>
+              </a:lnSpc>
+              <a:buClr>
+                <a:srgbClr val="D50000"/>
+              </a:buClr>
+              <a:buFont typeface="Wingdings" pitchFamily="2" charset="2"/>
+              <a:buChar char="Ø"/>
+            </a:pPr>
+            <a:r>
+              <a:rPr lang="en-US" sz="1600" dirty="0">
+                <a:effectLst/>
+                <a:latin typeface="Jost Light" pitchFamily="2" charset="77"/>
+                <a:ea typeface="Jost Light" pitchFamily="2" charset="77"/>
+              </a:rPr>
+              <a:t>LM is used to solve non-linear least squares problems. </a:t>
+            </a:r>
+          </a:p>
+          <a:p>
+            <a:pPr marL="285750" indent="-285750">
+              <a:lnSpc>
+                <a:spcPct val="150000"/>
+              </a:lnSpc>
+              <a:buClr>
+                <a:srgbClr val="D50000"/>
+              </a:buClr>
+              <a:buFont typeface="Wingdings" pitchFamily="2" charset="2"/>
+              <a:buChar char="Ø"/>
+            </a:pPr>
+            <a:r>
+              <a:rPr lang="en-US" sz="1600" dirty="0">
+                <a:effectLst/>
+                <a:latin typeface="Jost Light" pitchFamily="2" charset="77"/>
+                <a:ea typeface="Jost Light" pitchFamily="2" charset="77"/>
+              </a:rPr>
+              <a:t>It combines aspects of both the gradient descent and Gauss-Newton methods </a:t>
+            </a:r>
+          </a:p>
+          <a:p>
+            <a:pPr marL="285750" indent="-285750">
+              <a:lnSpc>
+                <a:spcPct val="150000"/>
+              </a:lnSpc>
+              <a:buClr>
+                <a:srgbClr val="D50000"/>
+              </a:buClr>
+              <a:buFont typeface="Wingdings" pitchFamily="2" charset="2"/>
+              <a:buChar char="Ø"/>
+            </a:pPr>
+            <a:endParaRPr lang="en-US" sz="1600" dirty="0">
+              <a:effectLst/>
+              <a:latin typeface="Jost Light" pitchFamily="2" charset="77"/>
+              <a:ea typeface="Jost Light" pitchFamily="2" charset="77"/>
+            </a:endParaRPr>
+          </a:p>
+          <a:p>
+            <a:pPr>
+              <a:lnSpc>
+                <a:spcPct val="150000"/>
+              </a:lnSpc>
+              <a:buClr>
+                <a:srgbClr val="D50000"/>
+              </a:buClr>
+            </a:pPr>
+            <a:r>
+              <a:rPr lang="en-US" sz="1600" dirty="0">
+                <a:effectLst/>
+                <a:latin typeface="Jost Light" pitchFamily="2" charset="77"/>
+                <a:ea typeface="Jost Light" pitchFamily="2" charset="77"/>
+              </a:rPr>
+              <a:t>The main advantages are: </a:t>
+            </a:r>
+            <a:endParaRPr lang="en-US" sz="1600" dirty="0">
+              <a:latin typeface="Jost Light" pitchFamily="2" charset="77"/>
+              <a:ea typeface="Jost Light" pitchFamily="2" charset="77"/>
+            </a:endParaRPr>
+          </a:p>
+          <a:p>
+            <a:pPr marL="285750" indent="-285750">
+              <a:lnSpc>
+                <a:spcPct val="150000"/>
+              </a:lnSpc>
+              <a:buClr>
+                <a:srgbClr val="D50000"/>
+              </a:buClr>
+              <a:buFont typeface="Wingdings" pitchFamily="2" charset="2"/>
+              <a:buChar char="v"/>
+            </a:pPr>
+            <a:r>
+              <a:rPr lang="en-US" sz="1600" dirty="0">
+                <a:effectLst/>
+                <a:latin typeface="Jost Light" pitchFamily="2" charset="77"/>
+                <a:ea typeface="Jost Light" pitchFamily="2" charset="77"/>
+              </a:rPr>
+              <a:t>Fast convergence</a:t>
+            </a:r>
+          </a:p>
+          <a:p>
+            <a:pPr marL="285750" indent="-285750">
+              <a:lnSpc>
+                <a:spcPct val="150000"/>
+              </a:lnSpc>
+              <a:buClr>
+                <a:srgbClr val="D50000"/>
+              </a:buClr>
+              <a:buFont typeface="Wingdings" pitchFamily="2" charset="2"/>
+              <a:buChar char="v"/>
+            </a:pPr>
+            <a:r>
+              <a:rPr lang="en-US" sz="1600" dirty="0">
+                <a:effectLst/>
+                <a:latin typeface="Jost Light" pitchFamily="2" charset="77"/>
+                <a:ea typeface="Jost Light" pitchFamily="2" charset="77"/>
+              </a:rPr>
+              <a:t>Robustness</a:t>
+            </a:r>
+            <a:endParaRPr lang="en-US" sz="1600" dirty="0">
+              <a:latin typeface="Jost Light" pitchFamily="2" charset="77"/>
+              <a:ea typeface="Jost Light" pitchFamily="2" charset="77"/>
+            </a:endParaRPr>
+          </a:p>
+          <a:p>
+            <a:pPr marL="285750" indent="-285750">
+              <a:lnSpc>
+                <a:spcPct val="150000"/>
+              </a:lnSpc>
+              <a:buClr>
+                <a:srgbClr val="D50000"/>
+              </a:buClr>
+              <a:buFont typeface="Wingdings" pitchFamily="2" charset="2"/>
+              <a:buChar char="v"/>
+            </a:pPr>
+            <a:r>
+              <a:rPr lang="en-US" sz="1600" dirty="0">
+                <a:effectLst/>
+                <a:latin typeface="Jost Light" pitchFamily="2" charset="77"/>
+                <a:ea typeface="Jost Light" pitchFamily="2" charset="77"/>
+              </a:rPr>
+              <a:t>Efficiency in small datasets</a:t>
+            </a:r>
+          </a:p>
+          <a:p>
+            <a:pPr marL="285750" indent="-285750">
+              <a:lnSpc>
+                <a:spcPct val="150000"/>
+              </a:lnSpc>
+              <a:buClr>
+                <a:srgbClr val="D50000"/>
+              </a:buClr>
+              <a:buFont typeface="Wingdings" pitchFamily="2" charset="2"/>
+              <a:buChar char="v"/>
+            </a:pPr>
+            <a:endParaRPr lang="en-US" sz="1600" dirty="0">
+              <a:effectLst/>
+              <a:latin typeface="Jost Light" pitchFamily="2" charset="77"/>
+              <a:ea typeface="Jost Light" pitchFamily="2" charset="77"/>
+            </a:endParaRPr>
+          </a:p>
+          <a:p>
+            <a:pPr>
+              <a:lnSpc>
+                <a:spcPct val="150000"/>
+              </a:lnSpc>
+              <a:buClr>
+                <a:srgbClr val="D50000"/>
+              </a:buClr>
+            </a:pPr>
+            <a:r>
+              <a:rPr lang="en-US" sz="1600" dirty="0">
+                <a:latin typeface="Jost Light" pitchFamily="2" charset="77"/>
+                <a:ea typeface="Jost Light" pitchFamily="2" charset="77"/>
+              </a:rPr>
+              <a:t>T</a:t>
+            </a:r>
+            <a:r>
+              <a:rPr lang="en-US" sz="1600" dirty="0">
+                <a:effectLst/>
+                <a:latin typeface="Jost Light" pitchFamily="2" charset="77"/>
+                <a:ea typeface="Jost Light" pitchFamily="2" charset="77"/>
+              </a:rPr>
+              <a:t>he main limitations are:</a:t>
+            </a:r>
+          </a:p>
+          <a:p>
+            <a:pPr marL="285750" indent="-285750">
+              <a:lnSpc>
+                <a:spcPct val="150000"/>
+              </a:lnSpc>
+              <a:buClr>
+                <a:srgbClr val="D50000"/>
+              </a:buClr>
+              <a:buFont typeface="Wingdings" pitchFamily="2" charset="2"/>
+              <a:buChar char="v"/>
+            </a:pPr>
+            <a:r>
+              <a:rPr lang="en-US" sz="1600" dirty="0">
+                <a:effectLst/>
+                <a:latin typeface="Jost Light" pitchFamily="2" charset="77"/>
+                <a:ea typeface="Jost Light" pitchFamily="2" charset="77"/>
+              </a:rPr>
+              <a:t>High computational time</a:t>
+            </a:r>
+            <a:endParaRPr lang="en-US" sz="1600" dirty="0">
+              <a:latin typeface="Jost Light" pitchFamily="2" charset="77"/>
+              <a:ea typeface="Jost Light" pitchFamily="2" charset="77"/>
+            </a:endParaRPr>
+          </a:p>
+          <a:p>
+            <a:pPr marL="285750" indent="-285750">
+              <a:lnSpc>
+                <a:spcPct val="150000"/>
+              </a:lnSpc>
+              <a:buClr>
+                <a:srgbClr val="D50000"/>
+              </a:buClr>
+              <a:buFont typeface="Wingdings" pitchFamily="2" charset="2"/>
+              <a:buChar char="v"/>
+            </a:pPr>
+            <a:r>
+              <a:rPr lang="en-US" sz="1600" dirty="0">
+                <a:effectLst/>
+                <a:latin typeface="Jost Light" pitchFamily="2" charset="77"/>
+                <a:ea typeface="Jost Light" pitchFamily="2" charset="77"/>
+              </a:rPr>
+              <a:t>Calibration of lambda</a:t>
+            </a:r>
+            <a:endParaRPr lang="en-KZ" sz="1600" dirty="0">
+              <a:latin typeface="Jost Light" pitchFamily="2" charset="77"/>
+              <a:ea typeface="Jost Light" pitchFamily="2" charset="77"/>
+            </a:endParaRPr>
+          </a:p>
+          <a:p>
+            <a:pPr marL="285750" indent="-285750">
+              <a:lnSpc>
+                <a:spcPct val="150000"/>
+              </a:lnSpc>
+              <a:buClr>
+                <a:srgbClr val="D50000"/>
+              </a:buClr>
+              <a:buFont typeface="Wingdings" pitchFamily="2" charset="2"/>
+              <a:buChar char="Ø"/>
+            </a:pPr>
+            <a:endParaRPr lang="en-US" sz="1600" dirty="0">
+              <a:latin typeface="Jost Light" pitchFamily="2" charset="77"/>
+              <a:ea typeface="Jost Light" pitchFamily="2" charset="77"/>
+            </a:endParaRPr>
+          </a:p>
+        </p:txBody>
+      </p:sp>
+      <mc:AlternateContent xmlns:mc="http://schemas.openxmlformats.org/markup-compatibility/2006" xmlns:a14="http://schemas.microsoft.com/office/drawing/2010/main">
+        <mc:Choice Requires="a14">
+          <p:sp>
+            <p:nvSpPr>
+              <p:cNvPr id="31" name="Rectangle 30">
+                <a:extLst>
+                  <a:ext uri="{FF2B5EF4-FFF2-40B4-BE49-F238E27FC236}">
+                    <a16:creationId xmlns:a16="http://schemas.microsoft.com/office/drawing/2014/main" id="{3644AAE8-2BDF-AC64-480D-451F32DF0C16}"/>
+                  </a:ext>
+                </a:extLst>
+              </p:cNvPr>
+              <p:cNvSpPr/>
+              <p:nvPr/>
+            </p:nvSpPr>
+            <p:spPr>
+              <a:xfrm>
+                <a:off x="6440383" y="1888334"/>
+                <a:ext cx="5319812" cy="4869988"/>
+              </a:xfrm>
+              <a:prstGeom prst="rect">
+                <a:avLst/>
+              </a:prstGeom>
+            </p:spPr>
+            <p:txBody>
+              <a:bodyPr wrap="square">
+                <a:spAutoFit/>
+              </a:bodyPr>
+              <a:lstStyle/>
+              <a:p>
+                <a:pPr marL="285750" indent="-285750">
+                  <a:lnSpc>
+                    <a:spcPct val="150000"/>
+                  </a:lnSpc>
+                  <a:buClr>
+                    <a:srgbClr val="D50000"/>
+                  </a:buClr>
+                  <a:buFont typeface="Wingdings" pitchFamily="2" charset="2"/>
+                  <a:buChar char="v"/>
+                </a:pPr>
+                <a:r>
+                  <a:rPr lang="en-US" sz="1600" dirty="0">
+                    <a:latin typeface="Jost Light" pitchFamily="2" charset="77"/>
+                    <a:ea typeface="Jost Light" pitchFamily="2" charset="77"/>
+                  </a:rPr>
+                  <a:t>The formula is:</a:t>
+                </a:r>
+              </a:p>
+              <a:p>
+                <a:pPr>
+                  <a:lnSpc>
+                    <a:spcPct val="150000"/>
+                  </a:lnSpc>
+                  <a:buClr>
+                    <a:srgbClr val="D50000"/>
+                  </a:buClr>
+                </a:pPr>
+                <a14:m>
+                  <m:oMath xmlns:m="http://schemas.openxmlformats.org/officeDocument/2006/math">
+                    <m:r>
+                      <a:rPr lang="en-US" sz="1600" b="0" i="0" smtClean="0">
+                        <a:latin typeface="Cambria Math" panose="02040503050406030204" pitchFamily="18" charset="0"/>
+                      </a:rPr>
+                      <m:t>(</m:t>
+                    </m:r>
+                    <m:sSup>
+                      <m:sSupPr>
+                        <m:ctrlPr>
+                          <a:rPr lang="en-US" sz="1600" i="1" smtClean="0">
+                            <a:latin typeface="Cambria Math" panose="02040503050406030204" pitchFamily="18" charset="0"/>
+                          </a:rPr>
+                        </m:ctrlPr>
+                      </m:sSupPr>
+                      <m:e>
+                        <m:r>
+                          <m:rPr>
+                            <m:sty m:val="p"/>
+                          </m:rPr>
+                          <a:rPr lang="en-US" sz="1600" b="0" i="0" smtClean="0">
+                            <a:latin typeface="Cambria Math" panose="02040503050406030204" pitchFamily="18" charset="0"/>
+                          </a:rPr>
+                          <m:t>J</m:t>
+                        </m:r>
+                      </m:e>
+                      <m:sup>
+                        <m:r>
+                          <m:rPr>
+                            <m:sty m:val="p"/>
+                          </m:rPr>
+                          <a:rPr lang="en-US" sz="1600" b="0" i="0" smtClean="0">
+                            <a:latin typeface="Cambria Math" panose="02040503050406030204" pitchFamily="18" charset="0"/>
+                          </a:rPr>
+                          <m:t>T</m:t>
+                        </m:r>
+                      </m:sup>
+                    </m:sSup>
+                    <m:r>
+                      <m:rPr>
+                        <m:sty m:val="p"/>
+                      </m:rPr>
+                      <a:rPr lang="en-US" sz="1600" b="0" i="0" smtClean="0">
+                        <a:latin typeface="Cambria Math" panose="02040503050406030204" pitchFamily="18" charset="0"/>
+                      </a:rPr>
+                      <m:t>J</m:t>
+                    </m:r>
+                    <m:r>
+                      <a:rPr lang="en-US" sz="1600" b="0" i="0" smtClean="0">
+                        <a:latin typeface="Cambria Math" panose="02040503050406030204" pitchFamily="18" charset="0"/>
+                      </a:rPr>
+                      <m:t>+</m:t>
+                    </m:r>
+                    <m:r>
+                      <m:rPr>
+                        <m:sty m:val="p"/>
+                      </m:rPr>
+                      <a:rPr lang="el-GR" sz="1600" b="0" i="0" smtClean="0">
+                        <a:latin typeface="Cambria Math" panose="02040503050406030204" pitchFamily="18" charset="0"/>
+                      </a:rPr>
+                      <m:t>λ</m:t>
+                    </m:r>
+                    <m:r>
+                      <m:rPr>
+                        <m:sty m:val="p"/>
+                      </m:rPr>
+                      <a:rPr lang="en-US" sz="1600" b="0" i="0" smtClean="0">
+                        <a:latin typeface="Cambria Math" panose="02040503050406030204" pitchFamily="18" charset="0"/>
+                      </a:rPr>
+                      <m:t>I</m:t>
+                    </m:r>
+                    <m:r>
+                      <a:rPr lang="en-US" sz="1600" b="0" i="0" smtClean="0">
+                        <a:latin typeface="Cambria Math" panose="02040503050406030204" pitchFamily="18" charset="0"/>
+                      </a:rPr>
+                      <m:t>)</m:t>
+                    </m:r>
+                    <m:r>
+                      <m:rPr>
+                        <m:sty m:val="p"/>
+                      </m:rPr>
+                      <a:rPr lang="el-GR" sz="1600" b="0" i="0" smtClean="0">
+                        <a:latin typeface="Cambria Math" panose="02040503050406030204" pitchFamily="18" charset="0"/>
+                      </a:rPr>
+                      <m:t>Δ</m:t>
+                    </m:r>
+                    <m:r>
+                      <a:rPr lang="el-GR" sz="1600" b="0" i="0" smtClean="0">
+                        <a:latin typeface="Cambria Math" panose="02040503050406030204" pitchFamily="18" charset="0"/>
+                      </a:rPr>
+                      <m:t>=</m:t>
+                    </m:r>
+                    <m:sSup>
+                      <m:sSupPr>
+                        <m:ctrlPr>
+                          <a:rPr lang="en-US" sz="1600" i="1" smtClean="0">
+                            <a:latin typeface="Cambria Math" panose="02040503050406030204" pitchFamily="18" charset="0"/>
+                          </a:rPr>
+                        </m:ctrlPr>
+                      </m:sSupPr>
+                      <m:e>
+                        <m:r>
+                          <m:rPr>
+                            <m:sty m:val="p"/>
+                          </m:rPr>
+                          <a:rPr lang="en-US" sz="1600" b="0" i="0" smtClean="0">
+                            <a:latin typeface="Cambria Math" panose="02040503050406030204" pitchFamily="18" charset="0"/>
+                          </a:rPr>
+                          <m:t>J</m:t>
+                        </m:r>
+                      </m:e>
+                      <m:sup>
+                        <m:r>
+                          <m:rPr>
+                            <m:sty m:val="p"/>
+                          </m:rPr>
+                          <a:rPr lang="en-US" sz="1600" b="0" i="0" smtClean="0">
+                            <a:latin typeface="Cambria Math" panose="02040503050406030204" pitchFamily="18" charset="0"/>
+                          </a:rPr>
+                          <m:t>T</m:t>
+                        </m:r>
+                      </m:sup>
+                    </m:sSup>
+                    <m:r>
+                      <a:rPr lang="en-US" sz="1600" b="0" i="0" smtClean="0">
+                        <a:latin typeface="Cambria Math" panose="02040503050406030204" pitchFamily="18" charset="0"/>
+                      </a:rPr>
+                      <m:t>[</m:t>
+                    </m:r>
+                    <m:r>
+                      <m:rPr>
+                        <m:sty m:val="p"/>
+                      </m:rPr>
+                      <a:rPr lang="en-US" sz="1600" b="0" i="0" smtClean="0">
+                        <a:latin typeface="Cambria Math" panose="02040503050406030204" pitchFamily="18" charset="0"/>
+                      </a:rPr>
+                      <m:t>y</m:t>
+                    </m:r>
+                    <m:r>
+                      <a:rPr lang="en-US" sz="1600" b="0" i="0" smtClean="0">
+                        <a:latin typeface="Cambria Math" panose="02040503050406030204" pitchFamily="18" charset="0"/>
+                      </a:rPr>
+                      <m:t>−</m:t>
+                    </m:r>
+                    <m:r>
+                      <m:rPr>
+                        <m:sty m:val="p"/>
+                      </m:rPr>
+                      <a:rPr lang="en-US" sz="1600" b="0" i="0" smtClean="0">
+                        <a:latin typeface="Cambria Math" panose="02040503050406030204" pitchFamily="18" charset="0"/>
+                      </a:rPr>
+                      <m:t>f</m:t>
+                    </m:r>
+                    <m:r>
+                      <a:rPr lang="en-US" sz="1600" b="0" i="0" smtClean="0">
+                        <a:latin typeface="Cambria Math" panose="02040503050406030204" pitchFamily="18" charset="0"/>
+                      </a:rPr>
+                      <m:t>(</m:t>
+                    </m:r>
+                    <m:r>
+                      <m:rPr>
+                        <m:sty m:val="p"/>
+                      </m:rPr>
+                      <a:rPr lang="en-US" sz="1600" b="0" i="0" smtClean="0">
+                        <a:latin typeface="Cambria Math" panose="02040503050406030204" pitchFamily="18" charset="0"/>
+                      </a:rPr>
+                      <m:t>x</m:t>
+                    </m:r>
+                    <m:r>
+                      <a:rPr lang="en-US" sz="1600" b="0" i="0" smtClean="0">
+                        <a:latin typeface="Cambria Math" panose="02040503050406030204" pitchFamily="18" charset="0"/>
+                      </a:rPr>
+                      <m:t>,</m:t>
+                    </m:r>
+                    <m:r>
+                      <m:rPr>
+                        <m:sty m:val="p"/>
+                      </m:rPr>
+                      <a:rPr lang="el-GR" sz="1600" b="0" i="0" smtClean="0">
+                        <a:latin typeface="Cambria Math" panose="02040503050406030204" pitchFamily="18" charset="0"/>
+                      </a:rPr>
+                      <m:t>β</m:t>
+                    </m:r>
+                    <m:r>
+                      <a:rPr lang="el-GR" sz="1600" b="0" i="0" smtClean="0">
+                        <a:latin typeface="Cambria Math" panose="02040503050406030204" pitchFamily="18" charset="0"/>
+                      </a:rPr>
+                      <m:t>)]</m:t>
+                    </m:r>
+                  </m:oMath>
+                </a14:m>
+                <a:r>
+                  <a:rPr lang="en-KZ" sz="1600" dirty="0">
+                    <a:latin typeface="Jost Light" pitchFamily="2" charset="77"/>
+                    <a:ea typeface="Jost Light" pitchFamily="2" charset="77"/>
+                  </a:rPr>
+                  <a:t>, where:</a:t>
+                </a:r>
+              </a:p>
+              <a:p>
+                <a:pPr marL="285750" indent="-285750">
+                  <a:lnSpc>
+                    <a:spcPct val="150000"/>
+                  </a:lnSpc>
+                  <a:buClr>
+                    <a:srgbClr val="D50000"/>
+                  </a:buClr>
+                  <a:buFont typeface="Wingdings" pitchFamily="2" charset="2"/>
+                  <a:buChar char="Ø"/>
+                </a:pPr>
+                <a:r>
+                  <a:rPr lang="en-US" sz="1600" dirty="0">
+                    <a:latin typeface="Jost Light" pitchFamily="2" charset="77"/>
+                    <a:ea typeface="Jost Light" pitchFamily="2" charset="77"/>
+                  </a:rPr>
+                  <a:t>J is the Jacobian matrix of the function f with respect to parameters </a:t>
+                </a:r>
+                <a:r>
+                  <a:rPr lang="el-GR" sz="1600" dirty="0">
+                    <a:latin typeface="Jost Light" pitchFamily="2" charset="77"/>
+                    <a:ea typeface="Jost Light" pitchFamily="2" charset="77"/>
+                  </a:rPr>
+                  <a:t>β,</a:t>
+                </a:r>
+                <a:endParaRPr lang="en-US" sz="1600" dirty="0">
+                  <a:latin typeface="Jost Light" pitchFamily="2" charset="77"/>
+                  <a:ea typeface="Jost Light" pitchFamily="2" charset="77"/>
+                </a:endParaRPr>
+              </a:p>
+              <a:p>
+                <a:pPr marL="285750" indent="-285750">
+                  <a:lnSpc>
+                    <a:spcPct val="150000"/>
+                  </a:lnSpc>
+                  <a:buClr>
+                    <a:srgbClr val="D50000"/>
+                  </a:buClr>
+                  <a:buFont typeface="Wingdings" pitchFamily="2" charset="2"/>
+                  <a:buChar char="Ø"/>
+                </a:pPr>
+                <a:r>
+                  <a:rPr lang="en-US" sz="1600" dirty="0">
+                    <a:latin typeface="Jost Light" pitchFamily="2" charset="77"/>
+                    <a:ea typeface="Jost Light" pitchFamily="2" charset="77"/>
+                  </a:rPr>
+                  <a:t>J</a:t>
+                </a:r>
+                <a:r>
+                  <a:rPr lang="en-US" sz="1600" baseline="30000" dirty="0">
+                    <a:latin typeface="Jost Light" pitchFamily="2" charset="77"/>
+                    <a:ea typeface="Jost Light" pitchFamily="2" charset="77"/>
+                  </a:rPr>
+                  <a:t>T</a:t>
+                </a:r>
+                <a:r>
+                  <a:rPr lang="en-US" sz="1600" dirty="0">
+                    <a:latin typeface="Jost Light" pitchFamily="2" charset="77"/>
+                    <a:ea typeface="Jost Light" pitchFamily="2" charset="77"/>
+                  </a:rPr>
+                  <a:t> is the transpose of J,</a:t>
+                </a:r>
+              </a:p>
+              <a:p>
+                <a:pPr marL="285750" indent="-285750">
+                  <a:lnSpc>
+                    <a:spcPct val="150000"/>
+                  </a:lnSpc>
+                  <a:buClr>
+                    <a:srgbClr val="D50000"/>
+                  </a:buClr>
+                  <a:buFont typeface="Wingdings" pitchFamily="2" charset="2"/>
+                  <a:buChar char="Ø"/>
+                </a:pPr>
+                <a:endParaRPr lang="en-US" sz="1600" dirty="0">
+                  <a:latin typeface="Jost Light" pitchFamily="2" charset="77"/>
+                  <a:ea typeface="Jost Light" pitchFamily="2" charset="77"/>
+                </a:endParaRPr>
+              </a:p>
+              <a:p>
+                <a:pPr marL="285750" indent="-285750">
+                  <a:lnSpc>
+                    <a:spcPct val="150000"/>
+                  </a:lnSpc>
+                  <a:buClr>
+                    <a:srgbClr val="D50000"/>
+                  </a:buClr>
+                  <a:buFont typeface="Wingdings" pitchFamily="2" charset="2"/>
+                  <a:buChar char="Ø"/>
+                </a:pPr>
+                <a:r>
+                  <a:rPr lang="el-GR" sz="1600" dirty="0">
+                    <a:latin typeface="Jost Light" pitchFamily="2" charset="77"/>
+                    <a:ea typeface="Jost Light" pitchFamily="2" charset="77"/>
+                  </a:rPr>
+                  <a:t>λ </a:t>
+                </a:r>
+                <a:r>
+                  <a:rPr lang="en-US" sz="1600" dirty="0">
+                    <a:latin typeface="Jost Light" pitchFamily="2" charset="77"/>
+                    <a:ea typeface="Jost Light" pitchFamily="2" charset="77"/>
+                  </a:rPr>
+                  <a:t>is the damping factor that is adjusted iteratively,</a:t>
+                </a:r>
+              </a:p>
+              <a:p>
+                <a:pPr marL="285750" indent="-285750">
+                  <a:lnSpc>
+                    <a:spcPct val="150000"/>
+                  </a:lnSpc>
+                  <a:buClr>
+                    <a:srgbClr val="D50000"/>
+                  </a:buClr>
+                  <a:buFont typeface="Wingdings" pitchFamily="2" charset="2"/>
+                  <a:buChar char="Ø"/>
+                </a:pPr>
+                <a:r>
+                  <a:rPr lang="en-US" sz="1600" dirty="0">
+                    <a:latin typeface="Jost Light" pitchFamily="2" charset="77"/>
+                    <a:ea typeface="Jost Light" pitchFamily="2" charset="77"/>
+                  </a:rPr>
+                  <a:t>I is the identity matrix,</a:t>
+                </a:r>
+              </a:p>
+              <a:p>
+                <a:pPr marL="285750" indent="-285750">
+                  <a:lnSpc>
+                    <a:spcPct val="150000"/>
+                  </a:lnSpc>
+                  <a:buClr>
+                    <a:srgbClr val="D50000"/>
+                  </a:buClr>
+                  <a:buFont typeface="Wingdings" pitchFamily="2" charset="2"/>
+                  <a:buChar char="Ø"/>
+                </a:pPr>
+                <a:endParaRPr lang="en-US" sz="1600" dirty="0">
+                  <a:latin typeface="Jost Light" pitchFamily="2" charset="77"/>
+                  <a:ea typeface="Jost Light" pitchFamily="2" charset="77"/>
+                </a:endParaRPr>
+              </a:p>
+              <a:p>
+                <a:pPr marL="285750" indent="-285750">
+                  <a:lnSpc>
+                    <a:spcPct val="150000"/>
+                  </a:lnSpc>
+                  <a:buClr>
+                    <a:srgbClr val="D50000"/>
+                  </a:buClr>
+                  <a:buFont typeface="Wingdings" pitchFamily="2" charset="2"/>
+                  <a:buChar char="Ø"/>
+                </a:pPr>
+                <a:r>
+                  <a:rPr lang="en-US" sz="1600" dirty="0">
+                    <a:latin typeface="Jost Light" pitchFamily="2" charset="77"/>
+                    <a:ea typeface="Jost Light" pitchFamily="2" charset="77"/>
+                  </a:rPr>
+                  <a:t>y is the observed data,</a:t>
+                </a:r>
+              </a:p>
+              <a:p>
+                <a:pPr marL="285750" indent="-285750">
+                  <a:lnSpc>
+                    <a:spcPct val="150000"/>
+                  </a:lnSpc>
+                  <a:buClr>
+                    <a:srgbClr val="D50000"/>
+                  </a:buClr>
+                  <a:buFont typeface="Wingdings" pitchFamily="2" charset="2"/>
+                  <a:buChar char="Ø"/>
+                </a:pPr>
+                <a:r>
+                  <a:rPr lang="en-US" sz="1600" dirty="0">
+                    <a:latin typeface="Jost Light" pitchFamily="2" charset="77"/>
+                    <a:ea typeface="Jost Light" pitchFamily="2" charset="77"/>
+                  </a:rPr>
+                  <a:t>f(x,</a:t>
+                </a:r>
+                <a:r>
+                  <a:rPr lang="el-GR" sz="1600" dirty="0">
+                    <a:latin typeface="Jost Light" pitchFamily="2" charset="77"/>
+                    <a:ea typeface="Jost Light" pitchFamily="2" charset="77"/>
+                  </a:rPr>
+                  <a:t>β) </a:t>
+                </a:r>
+                <a:r>
+                  <a:rPr lang="en-US" sz="1600" dirty="0">
+                    <a:latin typeface="Jost Light" pitchFamily="2" charset="77"/>
+                    <a:ea typeface="Jost Light" pitchFamily="2" charset="77"/>
+                  </a:rPr>
+                  <a:t>is the model function.</a:t>
+                </a:r>
+                <a:endParaRPr lang="en-KZ" sz="1600" dirty="0">
+                  <a:latin typeface="Jost Light" pitchFamily="2" charset="77"/>
+                  <a:ea typeface="Jost Light" pitchFamily="2" charset="77"/>
+                </a:endParaRPr>
+              </a:p>
+              <a:p>
+                <a:pPr marL="285750" indent="-285750">
+                  <a:lnSpc>
+                    <a:spcPct val="150000"/>
+                  </a:lnSpc>
+                  <a:buClr>
+                    <a:srgbClr val="D50000"/>
+                  </a:buClr>
+                  <a:buFont typeface="Wingdings" pitchFamily="2" charset="2"/>
+                  <a:buChar char="v"/>
+                </a:pPr>
+                <a:endParaRPr lang="en-KZ" sz="1600" dirty="0">
+                  <a:latin typeface="Jost Light" pitchFamily="2" charset="77"/>
+                  <a:ea typeface="Jost Light" pitchFamily="2" charset="77"/>
+                </a:endParaRPr>
+              </a:p>
+              <a:p>
+                <a:pPr marL="285750" indent="-285750">
+                  <a:lnSpc>
+                    <a:spcPct val="150000"/>
+                  </a:lnSpc>
+                  <a:buClr>
+                    <a:srgbClr val="D50000"/>
+                  </a:buClr>
+                  <a:buFont typeface="Wingdings" pitchFamily="2" charset="2"/>
+                  <a:buChar char="Ø"/>
+                </a:pPr>
+                <a:endParaRPr lang="en-US" sz="1600" dirty="0">
+                  <a:latin typeface="Jost Light" pitchFamily="2" charset="77"/>
+                  <a:ea typeface="Jost Light" pitchFamily="2" charset="77"/>
+                </a:endParaRPr>
+              </a:p>
+            </p:txBody>
+          </p:sp>
+        </mc:Choice>
+        <mc:Fallback xmlns="">
+          <p:sp>
+            <p:nvSpPr>
+              <p:cNvPr id="31" name="Rectangle 30">
+                <a:extLst>
+                  <a:ext uri="{FF2B5EF4-FFF2-40B4-BE49-F238E27FC236}">
+                    <a16:creationId xmlns:a16="http://schemas.microsoft.com/office/drawing/2014/main" id="{3644AAE8-2BDF-AC64-480D-451F32DF0C16}"/>
+                  </a:ext>
+                </a:extLst>
+              </p:cNvPr>
+              <p:cNvSpPr>
+                <a:spLocks noRot="1" noChangeAspect="1" noMove="1" noResize="1" noEditPoints="1" noAdjustHandles="1" noChangeArrowheads="1" noChangeShapeType="1" noTextEdit="1"/>
+              </p:cNvSpPr>
+              <p:nvPr/>
+            </p:nvSpPr>
+            <p:spPr>
+              <a:xfrm>
+                <a:off x="6440383" y="1888334"/>
+                <a:ext cx="5319812" cy="4869988"/>
+              </a:xfrm>
+              <a:prstGeom prst="rect">
+                <a:avLst/>
+              </a:prstGeom>
+              <a:blipFill>
+                <a:blip r:embed="rId5"/>
+                <a:stretch>
+                  <a:fillRect l="-476"/>
+                </a:stretch>
+              </a:blipFill>
+            </p:spPr>
+            <p:txBody>
+              <a:bodyPr/>
+              <a:lstStyle/>
+              <a:p>
+                <a:r>
+                  <a:rPr lang="en-KZ">
+                    <a:noFill/>
+                  </a:rPr>
+                  <a:t> </a:t>
+                </a:r>
+              </a:p>
+            </p:txBody>
+          </p:sp>
+        </mc:Fallback>
+      </mc:AlternateContent>
+    </p:spTree>
+    <p:extLst>
+      <p:ext uri="{BB962C8B-B14F-4D97-AF65-F5344CB8AC3E}">
+        <p14:creationId xmlns:p14="http://schemas.microsoft.com/office/powerpoint/2010/main" val="3813532169"/>
+      </p:ext>
+    </p:extLst>
+  </p:cSld>
+  <p:clrMapOvr>
+    <a:masterClrMapping/>
+  </p:clrMapOvr>
+</p:sld>
+</file>
+
+<file path=ppt/slides/slide15.xml><?xml version="1.0" encoding="utf-8"?>
+<p:sld xmlns:a="http://schemas.openxmlformats.org/drawingml/2006/main" xmlns:r="http://schemas.openxmlformats.org/officeDocument/2006/relationships" xmlns:p="http://schemas.openxmlformats.org/presentationml/2006/main">
+  <p:cSld>
+    <p:spTree>
+      <p:nvGrpSpPr>
+        <p:cNvPr id="1" name=""/>
+        <p:cNvGrpSpPr/>
+        <p:nvPr/>
+      </p:nvGrpSpPr>
+      <p:grpSpPr>
+        <a:xfrm>
+          <a:off x="0" y="0"/>
+          <a:ext cx="0" cy="0"/>
+          <a:chOff x="0" y="0"/>
+          <a:chExt cx="0" cy="0"/>
+        </a:xfrm>
+      </p:grpSpPr>
+      <p:pic>
+        <p:nvPicPr>
+          <p:cNvPr id="7" name="Content Placeholder 6" descr="A graph with a line and numbers&#10;&#10;Description automatically generated with medium confidence">
+            <a:extLst>
+              <a:ext uri="{FF2B5EF4-FFF2-40B4-BE49-F238E27FC236}">
+                <a16:creationId xmlns:a16="http://schemas.microsoft.com/office/drawing/2014/main" id="{B082A0C8-0A04-8361-DA75-4B84999119FB}"/>
+              </a:ext>
+            </a:extLst>
+          </p:cNvPr>
+          <p:cNvPicPr>
+            <a:picLocks noGrp="1" noChangeAspect="1"/>
+          </p:cNvPicPr>
+          <p:nvPr>
+            <p:ph sz="half" idx="1"/>
+          </p:nvPr>
+        </p:nvPicPr>
+        <p:blipFill>
+          <a:blip r:embed="rId2">
+            <a:extLst>
+              <a:ext uri="{28A0092B-C50C-407E-A947-70E740481C1C}">
+                <a14:useLocalDpi xmlns:a14="http://schemas.microsoft.com/office/drawing/2010/main" val="0"/>
+              </a:ext>
+            </a:extLst>
+          </a:blip>
+          <a:stretch>
+            <a:fillRect/>
+          </a:stretch>
+        </p:blipFill>
+        <p:spPr>
+          <a:xfrm>
+            <a:off x="431799" y="1601684"/>
+            <a:ext cx="2714065" cy="2715749"/>
+          </a:xfrm>
+          <a:prstGeom prst="roundRect">
+            <a:avLst>
+              <a:gd name="adj" fmla="val 6769"/>
+            </a:avLst>
+          </a:prstGeom>
+          <a:effectLst>
+            <a:outerShdw blurRad="50800" dist="38100" dir="8100000" algn="tr" rotWithShape="0">
+              <a:srgbClr val="8F061A">
+                <a:alpha val="40000"/>
+              </a:srgbClr>
+            </a:outerShdw>
+          </a:effectLst>
+        </p:spPr>
+      </p:pic>
+      <p:sp>
+        <p:nvSpPr>
+          <p:cNvPr id="9" name="Title 1">
+            <a:extLst>
+              <a:ext uri="{FF2B5EF4-FFF2-40B4-BE49-F238E27FC236}">
+                <a16:creationId xmlns:a16="http://schemas.microsoft.com/office/drawing/2014/main" id="{D795159C-856C-23A2-4B0B-518596422747}"/>
+              </a:ext>
+            </a:extLst>
+          </p:cNvPr>
+          <p:cNvSpPr txBox="1">
+            <a:spLocks/>
+          </p:cNvSpPr>
+          <p:nvPr/>
+        </p:nvSpPr>
+        <p:spPr>
+          <a:xfrm>
+            <a:off x="431800" y="980198"/>
+            <a:ext cx="9045832" cy="534988"/>
+          </a:xfrm>
+          <a:prstGeom prst="rect">
+            <a:avLst/>
+          </a:prstGeom>
+        </p:spPr>
+        <p:txBody>
+          <a:bodyPr vert="horz" lIns="91440" tIns="45720" rIns="91440" bIns="45720" rtlCol="0" anchor="ctr">
+            <a:normAutofit/>
+          </a:bodyPr>
+          <a:lstStyle>
+            <a:lvl1pPr algn="l" defTabSz="914400" rtl="0" eaLnBrk="1" latinLnBrk="0" hangingPunct="1">
+              <a:lnSpc>
+                <a:spcPct val="90000"/>
+              </a:lnSpc>
+              <a:spcBef>
+                <a:spcPct val="0"/>
+              </a:spcBef>
+              <a:buNone/>
+              <a:defRPr sz="4400" kern="1200" baseline="0">
+                <a:solidFill>
+                  <a:schemeClr val="tx1"/>
+                </a:solidFill>
+                <a:latin typeface="+mj-lt"/>
+                <a:ea typeface="+mj-ea"/>
+                <a:cs typeface="+mj-cs"/>
+              </a:defRPr>
+            </a:lvl1pPr>
+          </a:lstStyle>
+          <a:p>
+            <a:r>
+              <a:rPr lang="en-KZ" sz="1800" dirty="0">
+                <a:latin typeface="Jost Medium" pitchFamily="2" charset="77"/>
+                <a:ea typeface="Jost Medium" pitchFamily="2" charset="77"/>
+              </a:rPr>
+              <a:t>Results and Best Parameters</a:t>
+            </a:r>
+          </a:p>
+        </p:txBody>
+      </p:sp>
+      <p:cxnSp>
+        <p:nvCxnSpPr>
+          <p:cNvPr id="10" name="Straight Connector 9">
+            <a:extLst>
+              <a:ext uri="{FF2B5EF4-FFF2-40B4-BE49-F238E27FC236}">
+                <a16:creationId xmlns:a16="http://schemas.microsoft.com/office/drawing/2014/main" id="{13C6A679-ACC6-E664-2F42-042040BF554F}"/>
+              </a:ext>
+            </a:extLst>
+          </p:cNvPr>
+          <p:cNvCxnSpPr>
+            <a:cxnSpLocks/>
+          </p:cNvCxnSpPr>
+          <p:nvPr/>
+        </p:nvCxnSpPr>
+        <p:spPr>
+          <a:xfrm>
+            <a:off x="431800" y="1515186"/>
+            <a:ext cx="9711558" cy="0"/>
+          </a:xfrm>
+          <a:prstGeom prst="line">
+            <a:avLst/>
+          </a:prstGeom>
+          <a:ln w="28575">
+            <a:solidFill>
+              <a:srgbClr val="8F061A"/>
+            </a:solidFill>
+          </a:ln>
+        </p:spPr>
+        <p:style>
+          <a:lnRef idx="1">
+            <a:schemeClr val="accent1"/>
+          </a:lnRef>
+          <a:fillRef idx="0">
+            <a:schemeClr val="accent1"/>
+          </a:fillRef>
+          <a:effectRef idx="0">
+            <a:schemeClr val="accent1"/>
+          </a:effectRef>
+          <a:fontRef idx="minor">
+            <a:schemeClr val="tx1"/>
+          </a:fontRef>
+        </p:style>
+      </p:cxnSp>
+      <p:pic>
+        <p:nvPicPr>
+          <p:cNvPr id="12" name="Picture 11" descr="A graph with a line and numbers&#10;&#10;Description automatically generated">
+            <a:extLst>
+              <a:ext uri="{FF2B5EF4-FFF2-40B4-BE49-F238E27FC236}">
+                <a16:creationId xmlns:a16="http://schemas.microsoft.com/office/drawing/2014/main" id="{F4193128-797F-6FFC-4BA3-605B8FF7D245}"/>
+              </a:ext>
+            </a:extLst>
+          </p:cNvPr>
+          <p:cNvPicPr>
+            <a:picLocks noChangeAspect="1"/>
+          </p:cNvPicPr>
+          <p:nvPr/>
+        </p:nvPicPr>
+        <p:blipFill>
+          <a:blip r:embed="rId3">
+            <a:extLst>
+              <a:ext uri="{28A0092B-C50C-407E-A947-70E740481C1C}">
+                <a14:useLocalDpi xmlns:a14="http://schemas.microsoft.com/office/drawing/2010/main" val="0"/>
+              </a:ext>
+            </a:extLst>
+          </a:blip>
+          <a:stretch>
+            <a:fillRect/>
+          </a:stretch>
+        </p:blipFill>
+        <p:spPr>
+          <a:xfrm>
+            <a:off x="6115645" y="3850749"/>
+            <a:ext cx="2715748" cy="2715748"/>
+          </a:xfrm>
+          <a:prstGeom prst="roundRect">
+            <a:avLst>
+              <a:gd name="adj" fmla="val 6769"/>
+            </a:avLst>
+          </a:prstGeom>
+          <a:effectLst>
+            <a:outerShdw blurRad="50800" dist="38100" dir="2700000" algn="tl" rotWithShape="0">
+              <a:srgbClr val="4900E5">
+                <a:alpha val="40000"/>
+              </a:srgbClr>
+            </a:outerShdw>
+          </a:effectLst>
+        </p:spPr>
+      </p:pic>
+      <p:pic>
+        <p:nvPicPr>
+          <p:cNvPr id="14" name="Picture 13" descr="A graph with a line and numbers&#10;&#10;Description automatically generated">
+            <a:extLst>
+              <a:ext uri="{FF2B5EF4-FFF2-40B4-BE49-F238E27FC236}">
+                <a16:creationId xmlns:a16="http://schemas.microsoft.com/office/drawing/2014/main" id="{EBC79ABD-36E4-4A7A-18F1-9BCAEAA38D20}"/>
+              </a:ext>
+            </a:extLst>
+          </p:cNvPr>
+          <p:cNvPicPr>
+            <a:picLocks noChangeAspect="1"/>
+          </p:cNvPicPr>
+          <p:nvPr/>
+        </p:nvPicPr>
+        <p:blipFill>
+          <a:blip r:embed="rId4">
+            <a:extLst>
+              <a:ext uri="{28A0092B-C50C-407E-A947-70E740481C1C}">
+                <a14:useLocalDpi xmlns:a14="http://schemas.microsoft.com/office/drawing/2010/main" val="0"/>
+              </a:ext>
+            </a:extLst>
+          </a:blip>
+          <a:stretch>
+            <a:fillRect/>
+          </a:stretch>
+        </p:blipFill>
+        <p:spPr>
+          <a:xfrm>
+            <a:off x="8954623" y="3850750"/>
+            <a:ext cx="2715748" cy="2715748"/>
+          </a:xfrm>
+          <a:prstGeom prst="roundRect">
+            <a:avLst>
+              <a:gd name="adj" fmla="val 6769"/>
+            </a:avLst>
+          </a:prstGeom>
+          <a:effectLst>
+            <a:outerShdw blurRad="50800" dist="38100" dir="2700000" algn="tl" rotWithShape="0">
+              <a:srgbClr val="4900E5">
+                <a:alpha val="40000"/>
+              </a:srgbClr>
+            </a:outerShdw>
+          </a:effectLst>
+        </p:spPr>
+      </p:pic>
+      <p:pic>
+        <p:nvPicPr>
+          <p:cNvPr id="16" name="Picture 15" descr="A graph with a line and numbers&#10;&#10;Description automatically generated">
+            <a:extLst>
+              <a:ext uri="{FF2B5EF4-FFF2-40B4-BE49-F238E27FC236}">
+                <a16:creationId xmlns:a16="http://schemas.microsoft.com/office/drawing/2014/main" id="{7902EB7B-CE6C-FE8A-6EAA-01F139E1CEC2}"/>
+              </a:ext>
+            </a:extLst>
+          </p:cNvPr>
+          <p:cNvPicPr>
+            <a:picLocks noChangeAspect="1"/>
+          </p:cNvPicPr>
+          <p:nvPr/>
+        </p:nvPicPr>
+        <p:blipFill>
+          <a:blip r:embed="rId5">
+            <a:extLst>
+              <a:ext uri="{28A0092B-C50C-407E-A947-70E740481C1C}">
+                <a14:useLocalDpi xmlns:a14="http://schemas.microsoft.com/office/drawing/2010/main" val="0"/>
+              </a:ext>
+            </a:extLst>
+          </a:blip>
+          <a:stretch>
+            <a:fillRect/>
+          </a:stretch>
+        </p:blipFill>
+        <p:spPr>
+          <a:xfrm>
+            <a:off x="3269094" y="1601685"/>
+            <a:ext cx="2715748" cy="2715748"/>
+          </a:xfrm>
+          <a:prstGeom prst="roundRect">
+            <a:avLst>
+              <a:gd name="adj" fmla="val 6769"/>
+            </a:avLst>
+          </a:prstGeom>
+          <a:effectLst>
+            <a:outerShdw blurRad="50800" dist="38100" dir="8100000" algn="tr" rotWithShape="0">
+              <a:srgbClr val="8F061A">
+                <a:alpha val="40000"/>
+              </a:srgbClr>
+            </a:outerShdw>
+          </a:effectLst>
+        </p:spPr>
+      </p:pic>
+      <p:pic>
+        <p:nvPicPr>
+          <p:cNvPr id="19" name="Picture 18" descr="A red circle with a white number on it&#10;&#10;Description automatically generated">
+            <a:extLst>
+              <a:ext uri="{FF2B5EF4-FFF2-40B4-BE49-F238E27FC236}">
+                <a16:creationId xmlns:a16="http://schemas.microsoft.com/office/drawing/2014/main" id="{F500F929-E45C-94C5-9090-F515DCE38B31}"/>
+              </a:ext>
+            </a:extLst>
+          </p:cNvPr>
+          <p:cNvPicPr>
+            <a:picLocks noChangeAspect="1"/>
+          </p:cNvPicPr>
+          <p:nvPr/>
+        </p:nvPicPr>
+        <p:blipFill>
+          <a:blip r:embed="rId6">
+            <a:extLst>
+              <a:ext uri="{28A0092B-C50C-407E-A947-70E740481C1C}">
+                <a14:useLocalDpi xmlns:a14="http://schemas.microsoft.com/office/drawing/2010/main" val="0"/>
+              </a:ext>
+            </a:extLst>
+          </a:blip>
+          <a:stretch>
+            <a:fillRect/>
+          </a:stretch>
+        </p:blipFill>
+        <p:spPr>
+          <a:xfrm>
+            <a:off x="9053775" y="3900177"/>
+            <a:ext cx="183600" cy="183600"/>
+          </a:xfrm>
+          <a:prstGeom prst="rect">
+            <a:avLst/>
+          </a:prstGeom>
+        </p:spPr>
+      </p:pic>
+      <p:pic>
+        <p:nvPicPr>
+          <p:cNvPr id="21" name="Picture 20" descr="A red circle with white number three on it&#10;&#10;Description automatically generated">
+            <a:extLst>
+              <a:ext uri="{FF2B5EF4-FFF2-40B4-BE49-F238E27FC236}">
+                <a16:creationId xmlns:a16="http://schemas.microsoft.com/office/drawing/2014/main" id="{7DBA6ED8-E50D-7F03-6592-E441A5156BA6}"/>
+              </a:ext>
+            </a:extLst>
+          </p:cNvPr>
+          <p:cNvPicPr>
+            <a:picLocks noChangeAspect="1"/>
+          </p:cNvPicPr>
+          <p:nvPr/>
+        </p:nvPicPr>
+        <p:blipFill>
+          <a:blip r:embed="rId7">
+            <a:extLst>
+              <a:ext uri="{28A0092B-C50C-407E-A947-70E740481C1C}">
+                <a14:useLocalDpi xmlns:a14="http://schemas.microsoft.com/office/drawing/2010/main" val="0"/>
+              </a:ext>
+            </a:extLst>
+          </a:blip>
+          <a:stretch>
+            <a:fillRect/>
+          </a:stretch>
+        </p:blipFill>
+        <p:spPr>
+          <a:xfrm>
+            <a:off x="6192572" y="3900177"/>
+            <a:ext cx="183600" cy="183600"/>
+          </a:xfrm>
+          <a:prstGeom prst="rect">
+            <a:avLst/>
+          </a:prstGeom>
+        </p:spPr>
+      </p:pic>
+      <p:pic>
+        <p:nvPicPr>
+          <p:cNvPr id="23" name="Picture 22" descr="A red circle with a white number on it&#10;&#10;Description automatically generated">
+            <a:extLst>
+              <a:ext uri="{FF2B5EF4-FFF2-40B4-BE49-F238E27FC236}">
+                <a16:creationId xmlns:a16="http://schemas.microsoft.com/office/drawing/2014/main" id="{48DC53D1-9F54-A67E-656D-A8B0552877DC}"/>
+              </a:ext>
+            </a:extLst>
+          </p:cNvPr>
+          <p:cNvPicPr>
+            <a:picLocks noChangeAspect="1"/>
+          </p:cNvPicPr>
+          <p:nvPr/>
+        </p:nvPicPr>
+        <p:blipFill>
+          <a:blip r:embed="rId8">
+            <a:extLst>
+              <a:ext uri="{28A0092B-C50C-407E-A947-70E740481C1C}">
+                <a14:useLocalDpi xmlns:a14="http://schemas.microsoft.com/office/drawing/2010/main" val="0"/>
+              </a:ext>
+            </a:extLst>
+          </a:blip>
+          <a:stretch>
+            <a:fillRect/>
+          </a:stretch>
+        </p:blipFill>
+        <p:spPr>
+          <a:xfrm>
+            <a:off x="3420921" y="1649937"/>
+            <a:ext cx="183600" cy="183600"/>
+          </a:xfrm>
+          <a:prstGeom prst="rect">
+            <a:avLst/>
+          </a:prstGeom>
+        </p:spPr>
+      </p:pic>
+      <p:pic>
+        <p:nvPicPr>
+          <p:cNvPr id="25" name="Picture 24" descr="A red circle with a white number on it&#10;&#10;Description automatically generated">
+            <a:extLst>
+              <a:ext uri="{FF2B5EF4-FFF2-40B4-BE49-F238E27FC236}">
+                <a16:creationId xmlns:a16="http://schemas.microsoft.com/office/drawing/2014/main" id="{4B2524D1-7D2C-796A-9A57-A2E46837CA03}"/>
+              </a:ext>
+            </a:extLst>
+          </p:cNvPr>
+          <p:cNvPicPr>
+            <a:picLocks noChangeAspect="1"/>
+          </p:cNvPicPr>
+          <p:nvPr/>
+        </p:nvPicPr>
+        <p:blipFill>
+          <a:blip r:embed="rId9">
+            <a:extLst>
+              <a:ext uri="{28A0092B-C50C-407E-A947-70E740481C1C}">
+                <a14:useLocalDpi xmlns:a14="http://schemas.microsoft.com/office/drawing/2010/main" val="0"/>
+              </a:ext>
+            </a:extLst>
+          </a:blip>
+          <a:stretch>
+            <a:fillRect/>
+          </a:stretch>
+        </p:blipFill>
+        <p:spPr>
+          <a:xfrm>
+            <a:off x="535405" y="1649937"/>
+            <a:ext cx="183600" cy="183600"/>
+          </a:xfrm>
+          <a:prstGeom prst="rect">
+            <a:avLst/>
+          </a:prstGeom>
+        </p:spPr>
+      </p:pic>
+      <p:sp>
+        <p:nvSpPr>
+          <p:cNvPr id="26" name="Arc 25">
+            <a:extLst>
+              <a:ext uri="{FF2B5EF4-FFF2-40B4-BE49-F238E27FC236}">
+                <a16:creationId xmlns:a16="http://schemas.microsoft.com/office/drawing/2014/main" id="{05809304-16D0-836C-5EBF-27EDEBE5751E}"/>
+              </a:ext>
+            </a:extLst>
+          </p:cNvPr>
+          <p:cNvSpPr/>
+          <p:nvPr/>
+        </p:nvSpPr>
+        <p:spPr>
+          <a:xfrm rot="11901726" flipV="1">
+            <a:off x="5824120" y="1588885"/>
+            <a:ext cx="1259610" cy="892693"/>
+          </a:xfrm>
+          <a:custGeom>
+            <a:avLst/>
+            <a:gdLst>
+              <a:gd name="connsiteX0" fmla="*/ 225950 w 1259610"/>
+              <a:gd name="connsiteY0" fmla="*/ 103846 h 892693"/>
+              <a:gd name="connsiteX1" fmla="*/ 755242 w 1259610"/>
+              <a:gd name="connsiteY1" fmla="*/ 8942 h 892693"/>
+              <a:gd name="connsiteX2" fmla="*/ 1246685 w 1259610"/>
+              <a:gd name="connsiteY2" fmla="*/ 356381 h 892693"/>
+              <a:gd name="connsiteX3" fmla="*/ 629805 w 1259610"/>
+              <a:gd name="connsiteY3" fmla="*/ 446347 h 892693"/>
+              <a:gd name="connsiteX4" fmla="*/ 225950 w 1259610"/>
+              <a:gd name="connsiteY4" fmla="*/ 103846 h 892693"/>
+              <a:gd name="connsiteX0" fmla="*/ 225950 w 1259610"/>
+              <a:gd name="connsiteY0" fmla="*/ 103846 h 892693"/>
+              <a:gd name="connsiteX1" fmla="*/ 755242 w 1259610"/>
+              <a:gd name="connsiteY1" fmla="*/ 8942 h 892693"/>
+              <a:gd name="connsiteX2" fmla="*/ 1246685 w 1259610"/>
+              <a:gd name="connsiteY2" fmla="*/ 356381 h 892693"/>
+            </a:gdLst>
+            <a:ahLst/>
+            <a:cxnLst>
+              <a:cxn ang="0">
+                <a:pos x="connsiteX0" y="connsiteY0"/>
+              </a:cxn>
+              <a:cxn ang="0">
+                <a:pos x="connsiteX1" y="connsiteY1"/>
+              </a:cxn>
+              <a:cxn ang="0">
+                <a:pos x="connsiteX2" y="connsiteY2"/>
+              </a:cxn>
+            </a:cxnLst>
+            <a:rect l="l" t="t" r="r" b="b"/>
+            <a:pathLst>
+              <a:path w="1259610" h="892693" stroke="0" extrusionOk="0">
+                <a:moveTo>
+                  <a:pt x="225950" y="103846"/>
+                </a:moveTo>
+                <a:cubicBezTo>
+                  <a:pt x="368252" y="14002"/>
+                  <a:pt x="537275" y="-6690"/>
+                  <a:pt x="755242" y="8942"/>
+                </a:cubicBezTo>
+                <a:cubicBezTo>
+                  <a:pt x="1022837" y="48841"/>
+                  <a:pt x="1166188" y="182209"/>
+                  <a:pt x="1246685" y="356381"/>
+                </a:cubicBezTo>
+                <a:cubicBezTo>
+                  <a:pt x="1154171" y="409172"/>
+                  <a:pt x="816494" y="454032"/>
+                  <a:pt x="629805" y="446347"/>
+                </a:cubicBezTo>
+                <a:cubicBezTo>
+                  <a:pt x="564241" y="434330"/>
+                  <a:pt x="369815" y="201630"/>
+                  <a:pt x="225950" y="103846"/>
+                </a:cubicBezTo>
+                <a:close/>
+              </a:path>
+              <a:path w="1259610" h="892693" fill="none" extrusionOk="0">
+                <a:moveTo>
+                  <a:pt x="225950" y="103846"/>
+                </a:moveTo>
+                <a:cubicBezTo>
+                  <a:pt x="384759" y="18254"/>
+                  <a:pt x="570961" y="-24941"/>
+                  <a:pt x="755242" y="8942"/>
+                </a:cubicBezTo>
+                <a:cubicBezTo>
+                  <a:pt x="984866" y="41856"/>
+                  <a:pt x="1172653" y="203094"/>
+                  <a:pt x="1246685" y="356381"/>
+                </a:cubicBezTo>
+              </a:path>
+            </a:pathLst>
+          </a:custGeom>
+          <a:noFill/>
+          <a:ln w="12700">
+            <a:solidFill>
+              <a:srgbClr val="D50000"/>
+            </a:solidFill>
+            <a:prstDash val="dash"/>
+            <a:headEnd type="stealth" w="med" len="med"/>
+            <a:tailEnd type="oval" w="med" len="med"/>
+            <a:extLst>
+              <a:ext uri="{C807C97D-BFC1-408E-A445-0C87EB9F89A2}">
+                <ask:lineSketchStyleProps xmlns:ask="http://schemas.microsoft.com/office/drawing/2018/sketchyshapes" sd="1219033472">
+                  <a:prstGeom prst="arc">
+                    <a:avLst>
+                      <a:gd name="adj1" fmla="val 13218029"/>
+                      <a:gd name="adj2" fmla="val 21102149"/>
+                    </a:avLst>
+                  </a:prstGeom>
+                  <ask:type>
+                    <ask:lineSketchCurved/>
+                  </ask:type>
+                </ask:lineSketchStyleProps>
+              </a:ext>
+            </a:extLst>
+          </a:ln>
+        </p:spPr>
+        <p:style>
+          <a:lnRef idx="1">
+            <a:schemeClr val="accent1"/>
+          </a:lnRef>
+          <a:fillRef idx="0">
+            <a:schemeClr val="accent1"/>
+          </a:fillRef>
+          <a:effectRef idx="0">
+            <a:schemeClr val="accent1"/>
+          </a:effectRef>
+          <a:fontRef idx="minor">
+            <a:schemeClr val="tx1"/>
+          </a:fontRef>
+        </p:style>
+        <p:txBody>
+          <a:bodyPr rtlCol="0" anchor="ctr"/>
+          <a:lstStyle/>
+          <a:p>
+            <a:pPr algn="ctr"/>
+            <a:endParaRPr lang="en-KZ"/>
+          </a:p>
+        </p:txBody>
+      </p:sp>
+      <p:sp>
+        <p:nvSpPr>
+          <p:cNvPr id="27" name="Rectangle 26">
+            <a:extLst>
+              <a:ext uri="{FF2B5EF4-FFF2-40B4-BE49-F238E27FC236}">
+                <a16:creationId xmlns:a16="http://schemas.microsoft.com/office/drawing/2014/main" id="{088A90B1-CEC4-86B3-EC05-1EA50169D190}"/>
+              </a:ext>
+            </a:extLst>
+          </p:cNvPr>
+          <p:cNvSpPr/>
+          <p:nvPr/>
+        </p:nvSpPr>
+        <p:spPr>
+          <a:xfrm>
+            <a:off x="6902156" y="1868962"/>
+            <a:ext cx="4229100" cy="1169551"/>
+          </a:xfrm>
+          <a:prstGeom prst="rect">
+            <a:avLst/>
+          </a:prstGeom>
+        </p:spPr>
+        <p:txBody>
+          <a:bodyPr wrap="square">
+            <a:spAutoFit/>
+          </a:bodyPr>
+          <a:lstStyle/>
+          <a:p>
+            <a:pPr marL="285750" indent="-285750">
+              <a:buClr>
+                <a:srgbClr val="D50000"/>
+              </a:buClr>
+              <a:buFont typeface="Wingdings" pitchFamily="2" charset="2"/>
+              <a:buChar char="Ø"/>
+            </a:pPr>
+            <a:r>
+              <a:rPr lang="en-US" sz="1400" dirty="0">
+                <a:latin typeface="Jost Light" pitchFamily="2" charset="77"/>
+                <a:ea typeface="Jost Light" pitchFamily="2" charset="77"/>
+              </a:rPr>
+              <a:t>Demonstrates </a:t>
+            </a:r>
+            <a:r>
+              <a:rPr lang="en-US" sz="1400" b="1" dirty="0">
+                <a:latin typeface="Jost Light" pitchFamily="2" charset="77"/>
+                <a:ea typeface="Jost Light" pitchFamily="2" charset="77"/>
+              </a:rPr>
+              <a:t>rapid convergence </a:t>
+            </a:r>
+            <a:r>
+              <a:rPr lang="en-US" sz="1400" dirty="0">
+                <a:latin typeface="Jost Light" pitchFamily="2" charset="77"/>
+                <a:ea typeface="Jost Light" pitchFamily="2" charset="77"/>
+              </a:rPr>
+              <a:t>with high accuracy in parameter estimation.</a:t>
+            </a:r>
+          </a:p>
+          <a:p>
+            <a:pPr marL="285750" indent="-285750">
+              <a:buClr>
+                <a:srgbClr val="D50000"/>
+              </a:buClr>
+              <a:buFont typeface="Wingdings" pitchFamily="2" charset="2"/>
+              <a:buChar char="Ø"/>
+            </a:pPr>
+            <a:r>
+              <a:rPr lang="en-US" sz="1400" b="1" dirty="0">
+                <a:latin typeface="Jost Light" pitchFamily="2" charset="77"/>
+                <a:ea typeface="Jost Light" pitchFamily="2" charset="77"/>
+              </a:rPr>
+              <a:t>Best parameters </a:t>
+            </a:r>
+            <a:r>
+              <a:rPr lang="en-US" sz="1400" dirty="0">
+                <a:latin typeface="Jost Light" pitchFamily="2" charset="77"/>
+                <a:ea typeface="Jost Light" pitchFamily="2" charset="77"/>
+              </a:rPr>
+              <a:t>provide an almost perfect fit with minimal iterations.</a:t>
+            </a:r>
+          </a:p>
+          <a:p>
+            <a:pPr marL="285750" indent="-285750">
+              <a:buClr>
+                <a:srgbClr val="D50000"/>
+              </a:buClr>
+              <a:buFont typeface="Wingdings" pitchFamily="2" charset="2"/>
+              <a:buChar char="Ø"/>
+            </a:pPr>
+            <a:r>
+              <a:rPr lang="en-US" sz="1400" dirty="0">
+                <a:latin typeface="Jost Light" pitchFamily="2" charset="77"/>
+                <a:ea typeface="Jost Light" pitchFamily="2" charset="77"/>
+              </a:rPr>
+              <a:t>Number of iterations is 3!</a:t>
+            </a:r>
+          </a:p>
+        </p:txBody>
+      </p:sp>
+      <p:sp>
+        <p:nvSpPr>
+          <p:cNvPr id="31" name="Arc 30">
+            <a:extLst>
+              <a:ext uri="{FF2B5EF4-FFF2-40B4-BE49-F238E27FC236}">
+                <a16:creationId xmlns:a16="http://schemas.microsoft.com/office/drawing/2014/main" id="{139A8171-69B9-0AB2-935E-AAD953701382}"/>
+              </a:ext>
+            </a:extLst>
+          </p:cNvPr>
+          <p:cNvSpPr/>
+          <p:nvPr/>
+        </p:nvSpPr>
+        <p:spPr>
+          <a:xfrm rot="1203726" flipV="1">
+            <a:off x="5069613" y="5699891"/>
+            <a:ext cx="1259610" cy="892693"/>
+          </a:xfrm>
+          <a:custGeom>
+            <a:avLst/>
+            <a:gdLst>
+              <a:gd name="connsiteX0" fmla="*/ 225950 w 1259610"/>
+              <a:gd name="connsiteY0" fmla="*/ 103846 h 892693"/>
+              <a:gd name="connsiteX1" fmla="*/ 755242 w 1259610"/>
+              <a:gd name="connsiteY1" fmla="*/ 8942 h 892693"/>
+              <a:gd name="connsiteX2" fmla="*/ 1246685 w 1259610"/>
+              <a:gd name="connsiteY2" fmla="*/ 356381 h 892693"/>
+              <a:gd name="connsiteX3" fmla="*/ 629805 w 1259610"/>
+              <a:gd name="connsiteY3" fmla="*/ 446347 h 892693"/>
+              <a:gd name="connsiteX4" fmla="*/ 225950 w 1259610"/>
+              <a:gd name="connsiteY4" fmla="*/ 103846 h 892693"/>
+              <a:gd name="connsiteX0" fmla="*/ 225950 w 1259610"/>
+              <a:gd name="connsiteY0" fmla="*/ 103846 h 892693"/>
+              <a:gd name="connsiteX1" fmla="*/ 755242 w 1259610"/>
+              <a:gd name="connsiteY1" fmla="*/ 8942 h 892693"/>
+              <a:gd name="connsiteX2" fmla="*/ 1246685 w 1259610"/>
+              <a:gd name="connsiteY2" fmla="*/ 356381 h 892693"/>
+            </a:gdLst>
+            <a:ahLst/>
+            <a:cxnLst>
+              <a:cxn ang="0">
+                <a:pos x="connsiteX0" y="connsiteY0"/>
+              </a:cxn>
+              <a:cxn ang="0">
+                <a:pos x="connsiteX1" y="connsiteY1"/>
+              </a:cxn>
+              <a:cxn ang="0">
+                <a:pos x="connsiteX2" y="connsiteY2"/>
+              </a:cxn>
+            </a:cxnLst>
+            <a:rect l="l" t="t" r="r" b="b"/>
+            <a:pathLst>
+              <a:path w="1259610" h="892693" stroke="0" extrusionOk="0">
+                <a:moveTo>
+                  <a:pt x="225950" y="103846"/>
+                </a:moveTo>
+                <a:cubicBezTo>
+                  <a:pt x="368252" y="14002"/>
+                  <a:pt x="537275" y="-6690"/>
+                  <a:pt x="755242" y="8942"/>
+                </a:cubicBezTo>
+                <a:cubicBezTo>
+                  <a:pt x="1022837" y="48841"/>
+                  <a:pt x="1166188" y="182209"/>
+                  <a:pt x="1246685" y="356381"/>
+                </a:cubicBezTo>
+                <a:cubicBezTo>
+                  <a:pt x="1154171" y="409172"/>
+                  <a:pt x="816494" y="454032"/>
+                  <a:pt x="629805" y="446347"/>
+                </a:cubicBezTo>
+                <a:cubicBezTo>
+                  <a:pt x="564241" y="434330"/>
+                  <a:pt x="369815" y="201630"/>
+                  <a:pt x="225950" y="103846"/>
+                </a:cubicBezTo>
+                <a:close/>
+              </a:path>
+              <a:path w="1259610" h="892693" fill="none" extrusionOk="0">
+                <a:moveTo>
+                  <a:pt x="225950" y="103846"/>
+                </a:moveTo>
+                <a:cubicBezTo>
+                  <a:pt x="384759" y="18254"/>
+                  <a:pt x="570961" y="-24941"/>
+                  <a:pt x="755242" y="8942"/>
+                </a:cubicBezTo>
+                <a:cubicBezTo>
+                  <a:pt x="984866" y="41856"/>
+                  <a:pt x="1172653" y="203094"/>
+                  <a:pt x="1246685" y="356381"/>
+                </a:cubicBezTo>
+              </a:path>
+            </a:pathLst>
+          </a:custGeom>
+          <a:noFill/>
+          <a:ln w="12700">
+            <a:solidFill>
+              <a:srgbClr val="D50000"/>
+            </a:solidFill>
+            <a:prstDash val="dash"/>
+            <a:headEnd type="stealth" w="med" len="med"/>
+            <a:tailEnd type="oval" w="med" len="med"/>
+            <a:extLst>
+              <a:ext uri="{C807C97D-BFC1-408E-A445-0C87EB9F89A2}">
+                <ask:lineSketchStyleProps xmlns:ask="http://schemas.microsoft.com/office/drawing/2018/sketchyshapes" sd="1219033472">
+                  <a:prstGeom prst="arc">
+                    <a:avLst>
+                      <a:gd name="adj1" fmla="val 13218029"/>
+                      <a:gd name="adj2" fmla="val 21102149"/>
+                    </a:avLst>
+                  </a:prstGeom>
+                  <ask:type>
+                    <ask:lineSketchCurved/>
+                  </ask:type>
+                </ask:lineSketchStyleProps>
+              </a:ext>
+            </a:extLst>
+          </a:ln>
+        </p:spPr>
+        <p:style>
+          <a:lnRef idx="1">
+            <a:schemeClr val="accent1"/>
+          </a:lnRef>
+          <a:fillRef idx="0">
+            <a:schemeClr val="accent1"/>
+          </a:fillRef>
+          <a:effectRef idx="0">
+            <a:schemeClr val="accent1"/>
+          </a:effectRef>
+          <a:fontRef idx="minor">
+            <a:schemeClr val="tx1"/>
+          </a:fontRef>
+        </p:style>
+        <p:txBody>
+          <a:bodyPr rtlCol="0" anchor="ctr"/>
+          <a:lstStyle/>
+          <a:p>
+            <a:pPr algn="ctr"/>
+            <a:endParaRPr lang="en-KZ"/>
+          </a:p>
+        </p:txBody>
+      </p:sp>
+      <p:sp>
+        <p:nvSpPr>
+          <p:cNvPr id="32" name="Rectangle 31">
+            <a:extLst>
+              <a:ext uri="{FF2B5EF4-FFF2-40B4-BE49-F238E27FC236}">
+                <a16:creationId xmlns:a16="http://schemas.microsoft.com/office/drawing/2014/main" id="{94186D06-C81A-0E5D-8B68-09FC37E14E64}"/>
+              </a:ext>
+            </a:extLst>
+          </p:cNvPr>
+          <p:cNvSpPr/>
+          <p:nvPr/>
+        </p:nvSpPr>
+        <p:spPr>
+          <a:xfrm>
+            <a:off x="535404" y="4687059"/>
+            <a:ext cx="5074563" cy="1815882"/>
+          </a:xfrm>
+          <a:prstGeom prst="rect">
+            <a:avLst/>
+          </a:prstGeom>
+        </p:spPr>
+        <p:txBody>
+          <a:bodyPr wrap="square">
+            <a:spAutoFit/>
+          </a:bodyPr>
+          <a:lstStyle/>
+          <a:p>
+            <a:pPr>
+              <a:buClr>
+                <a:srgbClr val="D50000"/>
+              </a:buClr>
+            </a:pPr>
+            <a:r>
+              <a:rPr lang="en-US" sz="1400" dirty="0">
+                <a:latin typeface="Jost Light" pitchFamily="2" charset="77"/>
+                <a:ea typeface="Jost Light" pitchFamily="2" charset="77"/>
+              </a:rPr>
+              <a:t>LM algorithm does not fit the data perfectly for several reasons:</a:t>
+            </a:r>
+          </a:p>
+          <a:p>
+            <a:pPr marL="285750" indent="-285750">
+              <a:buClr>
+                <a:srgbClr val="D50000"/>
+              </a:buClr>
+              <a:buFont typeface="Wingdings" pitchFamily="2" charset="2"/>
+              <a:buChar char="Ø"/>
+            </a:pPr>
+            <a:r>
+              <a:rPr lang="en-US" sz="1400" dirty="0">
+                <a:latin typeface="Jost Light" pitchFamily="2" charset="77"/>
+                <a:ea typeface="Jost Light" pitchFamily="2" charset="77"/>
+              </a:rPr>
+              <a:t>Model Limitations: The underlying model may not capture all the complexities of the data. For instance, if the model is too simple (underfitting), it won't capture all the nuances of the dataset.</a:t>
+            </a:r>
+          </a:p>
+          <a:p>
+            <a:pPr marL="285750" indent="-285750">
+              <a:buClr>
+                <a:srgbClr val="D50000"/>
+              </a:buClr>
+              <a:buFont typeface="Wingdings" pitchFamily="2" charset="2"/>
+              <a:buChar char="Ø"/>
+            </a:pPr>
+            <a:r>
+              <a:rPr lang="en-US" sz="1400" dirty="0">
+                <a:latin typeface="Jost Light" pitchFamily="2" charset="77"/>
+                <a:ea typeface="Jost Light" pitchFamily="2" charset="77"/>
+              </a:rPr>
+              <a:t>Local Minima: The LM algorithm, like other gradient-based optimization methods, can get stuck in local minima, especially if the error surface is not convex.</a:t>
+            </a:r>
+          </a:p>
+        </p:txBody>
+      </p:sp>
+    </p:spTree>
+    <p:extLst>
+      <p:ext uri="{BB962C8B-B14F-4D97-AF65-F5344CB8AC3E}">
+        <p14:creationId xmlns:p14="http://schemas.microsoft.com/office/powerpoint/2010/main" val="3566982402"/>
+      </p:ext>
+    </p:extLst>
+  </p:cSld>
+  <p:clrMapOvr>
+    <a:masterClrMapping/>
+  </p:clrMapOvr>
+</p:sld>
+</file>
+
+<file path=ppt/slides/slide16.xml><?xml version="1.0" encoding="utf-8"?>
+<p:sld xmlns:a="http://schemas.openxmlformats.org/drawingml/2006/main" xmlns:r="http://schemas.openxmlformats.org/officeDocument/2006/relationships" xmlns:p="http://schemas.openxmlformats.org/presentationml/2006/main">
+  <p:cSld>
+    <p:spTree>
+      <p:nvGrpSpPr>
+        <p:cNvPr id="1" name=""/>
+        <p:cNvGrpSpPr/>
+        <p:nvPr/>
+      </p:nvGrpSpPr>
+      <p:grpSpPr>
+        <a:xfrm>
+          <a:off x="0" y="0"/>
+          <a:ext cx="0" cy="0"/>
+          <a:chOff x="0" y="0"/>
+          <a:chExt cx="0" cy="0"/>
+        </a:xfrm>
+      </p:grpSpPr>
+      <p:sp>
+        <p:nvSpPr>
+          <p:cNvPr id="2" name="Title 1">
+            <a:extLst>
+              <a:ext uri="{FF2B5EF4-FFF2-40B4-BE49-F238E27FC236}">
+                <a16:creationId xmlns:a16="http://schemas.microsoft.com/office/drawing/2014/main" id="{E2927949-F476-4BCE-629A-71EA451FF599}"/>
+              </a:ext>
+            </a:extLst>
+          </p:cNvPr>
+          <p:cNvSpPr>
+            <a:spLocks noGrp="1"/>
+          </p:cNvSpPr>
+          <p:nvPr>
+            <p:ph type="title"/>
+          </p:nvPr>
+        </p:nvSpPr>
+        <p:spPr>
+          <a:xfrm>
+            <a:off x="431800" y="980198"/>
+            <a:ext cx="9045832" cy="534988"/>
+          </a:xfrm>
+        </p:spPr>
+        <p:txBody>
+          <a:bodyPr>
+            <a:normAutofit/>
+          </a:bodyPr>
+          <a:lstStyle/>
+          <a:p>
+            <a:r>
+              <a:rPr lang="en-US" sz="1800" dirty="0">
+                <a:latin typeface="Jost Medium" pitchFamily="2" charset="77"/>
+                <a:ea typeface="Jost Medium" pitchFamily="2" charset="77"/>
+              </a:rPr>
+              <a:t>Comparison with BFGS and Newton Methods [Part I]</a:t>
+            </a:r>
+            <a:endParaRPr lang="en-KZ" sz="1800" dirty="0">
+              <a:latin typeface="Jost Medium" pitchFamily="2" charset="77"/>
+              <a:ea typeface="Jost Medium" pitchFamily="2" charset="77"/>
+            </a:endParaRPr>
+          </a:p>
+        </p:txBody>
+      </p:sp>
+      <p:cxnSp>
+        <p:nvCxnSpPr>
+          <p:cNvPr id="6" name="Straight Connector 5">
+            <a:extLst>
+              <a:ext uri="{FF2B5EF4-FFF2-40B4-BE49-F238E27FC236}">
+                <a16:creationId xmlns:a16="http://schemas.microsoft.com/office/drawing/2014/main" id="{B07C22B3-5978-C3A7-2CDE-7CC5F6745853}"/>
+              </a:ext>
+            </a:extLst>
+          </p:cNvPr>
+          <p:cNvCxnSpPr>
+            <a:cxnSpLocks/>
+          </p:cNvCxnSpPr>
+          <p:nvPr/>
+        </p:nvCxnSpPr>
+        <p:spPr>
+          <a:xfrm>
+            <a:off x="431800" y="1515186"/>
+            <a:ext cx="9711558" cy="0"/>
+          </a:xfrm>
+          <a:prstGeom prst="line">
+            <a:avLst/>
+          </a:prstGeom>
+          <a:ln w="28575">
+            <a:solidFill>
+              <a:srgbClr val="8F061A"/>
+            </a:solidFill>
+          </a:ln>
+        </p:spPr>
+        <p:style>
+          <a:lnRef idx="1">
+            <a:schemeClr val="accent1"/>
+          </a:lnRef>
+          <a:fillRef idx="0">
+            <a:schemeClr val="accent1"/>
+          </a:fillRef>
+          <a:effectRef idx="0">
+            <a:schemeClr val="accent1"/>
+          </a:effectRef>
+          <a:fontRef idx="minor">
+            <a:schemeClr val="tx1"/>
+          </a:fontRef>
+        </p:style>
+      </p:cxnSp>
+      <p:grpSp>
+        <p:nvGrpSpPr>
+          <p:cNvPr id="41" name="Group 40">
+            <a:extLst>
+              <a:ext uri="{FF2B5EF4-FFF2-40B4-BE49-F238E27FC236}">
+                <a16:creationId xmlns:a16="http://schemas.microsoft.com/office/drawing/2014/main" id="{AA264125-ABBF-6AC7-09BD-301FE03D1B0F}"/>
+              </a:ext>
+            </a:extLst>
+          </p:cNvPr>
+          <p:cNvGrpSpPr/>
+          <p:nvPr/>
+        </p:nvGrpSpPr>
+        <p:grpSpPr>
+          <a:xfrm>
+            <a:off x="431800" y="1668162"/>
+            <a:ext cx="11146993" cy="2866768"/>
+            <a:chOff x="339033" y="1624990"/>
+            <a:chExt cx="13044533" cy="3120095"/>
+          </a:xfrm>
+        </p:grpSpPr>
+        <p:pic>
+          <p:nvPicPr>
+            <p:cNvPr id="29" name="Picture 28" descr="A graph with a line and numbers&#10;&#10;Description automatically generated">
+              <a:extLst>
+                <a:ext uri="{FF2B5EF4-FFF2-40B4-BE49-F238E27FC236}">
+                  <a16:creationId xmlns:a16="http://schemas.microsoft.com/office/drawing/2014/main" id="{B15DBE5D-47F2-3938-128C-900D2631964D}"/>
+                </a:ext>
+              </a:extLst>
+            </p:cNvPr>
+            <p:cNvPicPr>
+              <a:picLocks noChangeAspect="1"/>
+            </p:cNvPicPr>
+            <p:nvPr/>
+          </p:nvPicPr>
+          <p:blipFill>
+            <a:blip r:embed="rId2">
+              <a:extLst>
+                <a:ext uri="{28A0092B-C50C-407E-A947-70E740481C1C}">
+                  <a14:useLocalDpi xmlns:a14="http://schemas.microsoft.com/office/drawing/2010/main" val="0"/>
+                </a:ext>
+              </a:extLst>
+            </a:blip>
+            <a:stretch>
+              <a:fillRect/>
+            </a:stretch>
+          </p:blipFill>
+          <p:spPr>
+            <a:xfrm>
+              <a:off x="339033" y="1624990"/>
+              <a:ext cx="3120095" cy="3120095"/>
+            </a:xfrm>
+            <a:prstGeom prst="roundRect">
+              <a:avLst>
+                <a:gd name="adj" fmla="val 6769"/>
+              </a:avLst>
+            </a:prstGeom>
+            <a:effectLst>
+              <a:outerShdw blurRad="50800" dist="38100" dir="8100000" algn="tr" rotWithShape="0">
+                <a:srgbClr val="8F061A">
+                  <a:alpha val="40000"/>
+                </a:srgbClr>
+              </a:outerShdw>
+            </a:effectLst>
+          </p:spPr>
+        </p:pic>
+        <p:pic>
+          <p:nvPicPr>
+            <p:cNvPr id="31" name="Picture 30" descr="A graph with a line and a dotted line&#10;&#10;Description automatically generated with medium confidence">
+              <a:extLst>
+                <a:ext uri="{FF2B5EF4-FFF2-40B4-BE49-F238E27FC236}">
+                  <a16:creationId xmlns:a16="http://schemas.microsoft.com/office/drawing/2014/main" id="{7089447E-A87B-551D-D4A8-ADDF9C30F72D}"/>
+                </a:ext>
+              </a:extLst>
+            </p:cNvPr>
+            <p:cNvPicPr>
+              <a:picLocks noChangeAspect="1"/>
+            </p:cNvPicPr>
+            <p:nvPr/>
+          </p:nvPicPr>
+          <p:blipFill>
+            <a:blip r:embed="rId3">
+              <a:extLst>
+                <a:ext uri="{28A0092B-C50C-407E-A947-70E740481C1C}">
+                  <a14:useLocalDpi xmlns:a14="http://schemas.microsoft.com/office/drawing/2010/main" val="0"/>
+                </a:ext>
+              </a:extLst>
+            </a:blip>
+            <a:stretch>
+              <a:fillRect/>
+            </a:stretch>
+          </p:blipFill>
+          <p:spPr>
+            <a:xfrm>
+              <a:off x="10263471" y="1624990"/>
+              <a:ext cx="3120095" cy="3120095"/>
+            </a:xfrm>
+            <a:prstGeom prst="roundRect">
+              <a:avLst>
+                <a:gd name="adj" fmla="val 6769"/>
+              </a:avLst>
+            </a:prstGeom>
+            <a:effectLst>
+              <a:outerShdw blurRad="50800" dist="38100" dir="2700000" algn="tl" rotWithShape="0">
+                <a:srgbClr val="4900E5">
+                  <a:alpha val="40000"/>
+                </a:srgbClr>
+              </a:outerShdw>
+            </a:effectLst>
+          </p:spPr>
+        </p:pic>
+        <p:pic>
+          <p:nvPicPr>
+            <p:cNvPr id="33" name="Picture 32" descr="A graph with blue and orange lines&#10;&#10;Description automatically generated">
+              <a:extLst>
+                <a:ext uri="{FF2B5EF4-FFF2-40B4-BE49-F238E27FC236}">
+                  <a16:creationId xmlns:a16="http://schemas.microsoft.com/office/drawing/2014/main" id="{A8697303-1140-FBA3-2773-1D785A2ABF9E}"/>
+                </a:ext>
+              </a:extLst>
+            </p:cNvPr>
+            <p:cNvPicPr>
+              <a:picLocks noChangeAspect="1"/>
+            </p:cNvPicPr>
+            <p:nvPr/>
+          </p:nvPicPr>
+          <p:blipFill>
+            <a:blip r:embed="rId4">
+              <a:extLst>
+                <a:ext uri="{28A0092B-C50C-407E-A947-70E740481C1C}">
+                  <a14:useLocalDpi xmlns:a14="http://schemas.microsoft.com/office/drawing/2010/main" val="0"/>
+                </a:ext>
+              </a:extLst>
+            </a:blip>
+            <a:stretch>
+              <a:fillRect/>
+            </a:stretch>
+          </p:blipFill>
+          <p:spPr>
+            <a:xfrm>
+              <a:off x="6955325" y="1624990"/>
+              <a:ext cx="3120095" cy="3120095"/>
+            </a:xfrm>
+            <a:prstGeom prst="roundRect">
+              <a:avLst>
+                <a:gd name="adj" fmla="val 6769"/>
+              </a:avLst>
+            </a:prstGeom>
+            <a:effectLst>
+              <a:outerShdw blurRad="50800" dist="38100" dir="2700000" algn="tl" rotWithShape="0">
+                <a:srgbClr val="4900E5">
+                  <a:alpha val="40000"/>
+                </a:srgbClr>
+              </a:outerShdw>
+            </a:effectLst>
+          </p:spPr>
+        </p:pic>
+        <p:pic>
+          <p:nvPicPr>
+            <p:cNvPr id="37" name="Picture 36" descr="A graph with a line and numbers&#10;&#10;Description automatically generated">
+              <a:extLst>
+                <a:ext uri="{FF2B5EF4-FFF2-40B4-BE49-F238E27FC236}">
+                  <a16:creationId xmlns:a16="http://schemas.microsoft.com/office/drawing/2014/main" id="{F7B4CD6B-0F11-A58B-1424-EFF9D3BC2314}"/>
+                </a:ext>
+              </a:extLst>
+            </p:cNvPr>
+            <p:cNvPicPr>
+              <a:picLocks noChangeAspect="1"/>
+            </p:cNvPicPr>
+            <p:nvPr/>
+          </p:nvPicPr>
+          <p:blipFill>
+            <a:blip r:embed="rId5">
+              <a:extLst>
+                <a:ext uri="{28A0092B-C50C-407E-A947-70E740481C1C}">
+                  <a14:useLocalDpi xmlns:a14="http://schemas.microsoft.com/office/drawing/2010/main" val="0"/>
+                </a:ext>
+              </a:extLst>
+            </a:blip>
+            <a:stretch>
+              <a:fillRect/>
+            </a:stretch>
+          </p:blipFill>
+          <p:spPr>
+            <a:xfrm>
+              <a:off x="3647179" y="1624990"/>
+              <a:ext cx="3120095" cy="3120095"/>
+            </a:xfrm>
+            <a:prstGeom prst="roundRect">
+              <a:avLst>
+                <a:gd name="adj" fmla="val 6769"/>
+              </a:avLst>
+            </a:prstGeom>
+            <a:effectLst>
+              <a:outerShdw blurRad="50800" dist="38100" dir="8100000" algn="tr" rotWithShape="0">
+                <a:srgbClr val="8F061A">
+                  <a:alpha val="40000"/>
+                </a:srgbClr>
+              </a:outerShdw>
+            </a:effectLst>
+          </p:spPr>
+        </p:pic>
+      </p:grpSp>
+      <p:cxnSp>
+        <p:nvCxnSpPr>
+          <p:cNvPr id="42" name="Elbow Connector 41">
+            <a:extLst>
+              <a:ext uri="{FF2B5EF4-FFF2-40B4-BE49-F238E27FC236}">
+                <a16:creationId xmlns:a16="http://schemas.microsoft.com/office/drawing/2014/main" id="{8D843184-2C81-2355-112E-FDDE5369374A}"/>
+              </a:ext>
+            </a:extLst>
+          </p:cNvPr>
+          <p:cNvCxnSpPr>
+            <a:cxnSpLocks/>
+          </p:cNvCxnSpPr>
+          <p:nvPr/>
+        </p:nvCxnSpPr>
+        <p:spPr>
+          <a:xfrm rot="5400000">
+            <a:off x="4566935" y="3098386"/>
+            <a:ext cx="2860419" cy="12672"/>
+          </a:xfrm>
+          <a:prstGeom prst="bentConnector3">
+            <a:avLst>
+              <a:gd name="adj1" fmla="val 100543"/>
+            </a:avLst>
+          </a:prstGeom>
+          <a:ln w="28575">
+            <a:solidFill>
+              <a:srgbClr val="D50000"/>
+            </a:solidFill>
+            <a:prstDash val="dashDot"/>
+            <a:headEnd type="diamond" w="med" len="med"/>
+            <a:tailEnd type="diamond" w="med" len="med"/>
+          </a:ln>
+        </p:spPr>
+        <p:style>
+          <a:lnRef idx="1">
+            <a:schemeClr val="accent1"/>
+          </a:lnRef>
+          <a:fillRef idx="0">
+            <a:schemeClr val="accent1"/>
+          </a:fillRef>
+          <a:effectRef idx="0">
+            <a:schemeClr val="accent1"/>
+          </a:effectRef>
+          <a:fontRef idx="minor">
+            <a:schemeClr val="tx1"/>
+          </a:fontRef>
+        </p:style>
+      </p:cxnSp>
+      <p:sp>
+        <p:nvSpPr>
+          <p:cNvPr id="58" name="Rectangle 57">
+            <a:extLst>
+              <a:ext uri="{FF2B5EF4-FFF2-40B4-BE49-F238E27FC236}">
+                <a16:creationId xmlns:a16="http://schemas.microsoft.com/office/drawing/2014/main" id="{BAEEFD62-2DE7-63A6-60AF-74C15FB4AC48}"/>
+              </a:ext>
+            </a:extLst>
+          </p:cNvPr>
+          <p:cNvSpPr/>
+          <p:nvPr/>
+        </p:nvSpPr>
+        <p:spPr>
+          <a:xfrm>
+            <a:off x="431800" y="4785913"/>
+            <a:ext cx="9201088" cy="1569660"/>
+          </a:xfrm>
+          <a:prstGeom prst="rect">
+            <a:avLst/>
+          </a:prstGeom>
+        </p:spPr>
+        <p:txBody>
+          <a:bodyPr wrap="square">
+            <a:spAutoFit/>
+          </a:bodyPr>
+          <a:lstStyle/>
+          <a:p>
+            <a:pPr>
+              <a:buClr>
+                <a:srgbClr val="D50000"/>
+              </a:buClr>
+            </a:pPr>
+            <a:r>
+              <a:rPr lang="en-US" sz="1600" dirty="0">
+                <a:latin typeface="Jost Light" pitchFamily="2" charset="77"/>
+                <a:ea typeface="Jost Light" pitchFamily="2" charset="77"/>
+              </a:rPr>
+              <a:t>LM vs. BFGS:</a:t>
+            </a:r>
+          </a:p>
+          <a:p>
+            <a:pPr marL="400050" indent="-400050">
+              <a:buClr>
+                <a:srgbClr val="D50000"/>
+              </a:buClr>
+              <a:buFont typeface="+mj-lt"/>
+              <a:buAutoNum type="romanUcPeriod"/>
+            </a:pPr>
+            <a:r>
+              <a:rPr lang="en-US" sz="1600" dirty="0">
+                <a:latin typeface="Jost Light" pitchFamily="2" charset="77"/>
+                <a:ea typeface="Jost Light" pitchFamily="2" charset="77"/>
+              </a:rPr>
+              <a:t>LM and BFGS are comparable in speed, both algorithms completed the calculations in 3 iterations.</a:t>
+            </a:r>
+          </a:p>
+          <a:p>
+            <a:pPr marL="400050" indent="-400050">
+              <a:buClr>
+                <a:srgbClr val="D50000"/>
+              </a:buClr>
+              <a:buFont typeface="+mj-lt"/>
+              <a:buAutoNum type="romanUcPeriod"/>
+            </a:pPr>
+            <a:r>
+              <a:rPr lang="en-US" sz="1600" dirty="0">
+                <a:latin typeface="Jost Light" pitchFamily="2" charset="77"/>
+                <a:ea typeface="Jost Light" pitchFamily="2" charset="77"/>
+              </a:rPr>
+              <a:t>Accuracy - both LM and BFGS accurately find best betas and tau for Nelson-Siegel model for standard yield curve.  </a:t>
+            </a:r>
+          </a:p>
+          <a:p>
+            <a:pPr marL="400050" indent="-400050">
+              <a:buClr>
+                <a:srgbClr val="D50000"/>
+              </a:buClr>
+              <a:buFont typeface="+mj-lt"/>
+              <a:buAutoNum type="romanUcPeriod"/>
+            </a:pPr>
+            <a:r>
+              <a:rPr lang="en-US" sz="1600" dirty="0">
+                <a:latin typeface="Jost Light" pitchFamily="2" charset="77"/>
+                <a:ea typeface="Jost Light" pitchFamily="2" charset="77"/>
+              </a:rPr>
+              <a:t>LM is favored for its robustness in varied starting conditions, especially when modelling the yield curves with non-standard shape, i.e., with higher volatility and inverse yield curve.</a:t>
+            </a:r>
+          </a:p>
+        </p:txBody>
+      </p:sp>
+      <p:pic>
+        <p:nvPicPr>
+          <p:cNvPr id="59" name="Picture 58" descr="A red circle with a white number on it&#10;&#10;Description automatically generated">
+            <a:extLst>
+              <a:ext uri="{FF2B5EF4-FFF2-40B4-BE49-F238E27FC236}">
+                <a16:creationId xmlns:a16="http://schemas.microsoft.com/office/drawing/2014/main" id="{24FA54F6-90A1-7F7D-334B-32354B089D06}"/>
+              </a:ext>
+            </a:extLst>
+          </p:cNvPr>
+          <p:cNvPicPr>
+            <a:picLocks noChangeAspect="1"/>
+          </p:cNvPicPr>
+          <p:nvPr/>
+        </p:nvPicPr>
+        <p:blipFill>
+          <a:blip r:embed="rId6">
+            <a:extLst>
+              <a:ext uri="{28A0092B-C50C-407E-A947-70E740481C1C}">
+                <a14:useLocalDpi xmlns:a14="http://schemas.microsoft.com/office/drawing/2010/main" val="0"/>
+              </a:ext>
+            </a:extLst>
+          </a:blip>
+          <a:stretch>
+            <a:fillRect/>
+          </a:stretch>
+        </p:blipFill>
+        <p:spPr>
+          <a:xfrm>
+            <a:off x="3342105" y="1700779"/>
+            <a:ext cx="183600" cy="183600"/>
+          </a:xfrm>
+          <a:prstGeom prst="rect">
+            <a:avLst/>
+          </a:prstGeom>
+        </p:spPr>
+      </p:pic>
+      <p:pic>
+        <p:nvPicPr>
+          <p:cNvPr id="60" name="Picture 59">
+            <a:extLst>
+              <a:ext uri="{FF2B5EF4-FFF2-40B4-BE49-F238E27FC236}">
+                <a16:creationId xmlns:a16="http://schemas.microsoft.com/office/drawing/2014/main" id="{D18D44C3-8D94-F387-22CC-1FD07BBCC5F4}"/>
+              </a:ext>
+            </a:extLst>
+          </p:cNvPr>
+          <p:cNvPicPr>
+            <a:picLocks noChangeAspect="1"/>
+          </p:cNvPicPr>
+          <p:nvPr/>
+        </p:nvPicPr>
+        <p:blipFill>
+          <a:blip r:embed="rId7"/>
+          <a:stretch>
+            <a:fillRect/>
+          </a:stretch>
+        </p:blipFill>
+        <p:spPr>
+          <a:xfrm>
+            <a:off x="6164177" y="1700779"/>
+            <a:ext cx="205218" cy="205218"/>
+          </a:xfrm>
+          <a:prstGeom prst="rect">
+            <a:avLst/>
+          </a:prstGeom>
+        </p:spPr>
+      </p:pic>
+      <p:pic>
+        <p:nvPicPr>
+          <p:cNvPr id="61" name="Picture 60">
+            <a:extLst>
+              <a:ext uri="{FF2B5EF4-FFF2-40B4-BE49-F238E27FC236}">
+                <a16:creationId xmlns:a16="http://schemas.microsoft.com/office/drawing/2014/main" id="{A154762F-F7B3-12EC-D890-D1860E4DB4D0}"/>
+              </a:ext>
+            </a:extLst>
+          </p:cNvPr>
+          <p:cNvPicPr>
+            <a:picLocks noChangeAspect="1"/>
+          </p:cNvPicPr>
+          <p:nvPr/>
+        </p:nvPicPr>
+        <p:blipFill>
+          <a:blip r:embed="rId8"/>
+          <a:srcRect/>
+          <a:stretch/>
+        </p:blipFill>
+        <p:spPr>
+          <a:xfrm>
+            <a:off x="9018002" y="1704397"/>
+            <a:ext cx="201600" cy="201600"/>
+          </a:xfrm>
+          <a:prstGeom prst="rect">
+            <a:avLst/>
+          </a:prstGeom>
+        </p:spPr>
+      </p:pic>
+      <p:pic>
+        <p:nvPicPr>
+          <p:cNvPr id="62" name="Picture 61" descr="A red circle with a white number on it&#10;&#10;Description automatically generated">
+            <a:extLst>
+              <a:ext uri="{FF2B5EF4-FFF2-40B4-BE49-F238E27FC236}">
+                <a16:creationId xmlns:a16="http://schemas.microsoft.com/office/drawing/2014/main" id="{CB414FCB-49FA-87A4-F8D7-3E3B5148025C}"/>
+              </a:ext>
+            </a:extLst>
+          </p:cNvPr>
+          <p:cNvPicPr>
+            <a:picLocks noChangeAspect="1"/>
+          </p:cNvPicPr>
+          <p:nvPr/>
+        </p:nvPicPr>
+        <p:blipFill>
+          <a:blip r:embed="rId9">
+            <a:extLst>
+              <a:ext uri="{28A0092B-C50C-407E-A947-70E740481C1C}">
+                <a14:useLocalDpi xmlns:a14="http://schemas.microsoft.com/office/drawing/2010/main" val="0"/>
+              </a:ext>
+            </a:extLst>
+          </a:blip>
+          <a:stretch>
+            <a:fillRect/>
+          </a:stretch>
+        </p:blipFill>
+        <p:spPr>
+          <a:xfrm>
+            <a:off x="521407" y="1700779"/>
+            <a:ext cx="183600" cy="183600"/>
+          </a:xfrm>
+          <a:prstGeom prst="rect">
+            <a:avLst/>
+          </a:prstGeom>
+        </p:spPr>
+      </p:pic>
+    </p:spTree>
+    <p:extLst>
+      <p:ext uri="{BB962C8B-B14F-4D97-AF65-F5344CB8AC3E}">
+        <p14:creationId xmlns:p14="http://schemas.microsoft.com/office/powerpoint/2010/main" val="3946109853"/>
+      </p:ext>
+    </p:extLst>
+  </p:cSld>
+  <p:clrMapOvr>
+    <a:masterClrMapping/>
+  </p:clrMapOvr>
+</p:sld>
+</file>
+
+<file path=ppt/slides/slide17.xml><?xml version="1.0" encoding="utf-8"?>
+<p:sld xmlns:a="http://schemas.openxmlformats.org/drawingml/2006/main" xmlns:r="http://schemas.openxmlformats.org/officeDocument/2006/relationships" xmlns:p="http://schemas.openxmlformats.org/presentationml/2006/main">
+  <p:cSld>
+    <p:spTree>
+      <p:nvGrpSpPr>
+        <p:cNvPr id="1" name=""/>
+        <p:cNvGrpSpPr/>
+        <p:nvPr/>
+      </p:nvGrpSpPr>
+      <p:grpSpPr>
+        <a:xfrm>
+          <a:off x="0" y="0"/>
+          <a:ext cx="0" cy="0"/>
+          <a:chOff x="0" y="0"/>
+          <a:chExt cx="0" cy="0"/>
+        </a:xfrm>
+      </p:grpSpPr>
+      <p:pic>
+        <p:nvPicPr>
+          <p:cNvPr id="7" name="Content Placeholder 6" descr="A graph with blue and orange lines&#10;&#10;Description automatically generated">
+            <a:extLst>
+              <a:ext uri="{FF2B5EF4-FFF2-40B4-BE49-F238E27FC236}">
+                <a16:creationId xmlns:a16="http://schemas.microsoft.com/office/drawing/2014/main" id="{E6BB2498-02C6-DE6B-A8C2-0AE77F4DC03A}"/>
+              </a:ext>
+            </a:extLst>
+          </p:cNvPr>
+          <p:cNvPicPr>
+            <a:picLocks noGrp="1" noChangeAspect="1"/>
+          </p:cNvPicPr>
+          <p:nvPr>
+            <p:ph sz="half" idx="1"/>
+          </p:nvPr>
+        </p:nvPicPr>
+        <p:blipFill>
+          <a:blip r:embed="rId2">
+            <a:extLst>
+              <a:ext uri="{28A0092B-C50C-407E-A947-70E740481C1C}">
+                <a14:useLocalDpi xmlns:a14="http://schemas.microsoft.com/office/drawing/2010/main" val="0"/>
+              </a:ext>
+            </a:extLst>
+          </a:blip>
+          <a:stretch>
+            <a:fillRect/>
+          </a:stretch>
+        </p:blipFill>
+        <p:spPr>
+          <a:xfrm>
+            <a:off x="7497379" y="1690687"/>
+            <a:ext cx="4592781" cy="4592781"/>
+          </a:xfrm>
+          <a:prstGeom prst="roundRect">
+            <a:avLst>
+              <a:gd name="adj" fmla="val 6769"/>
+            </a:avLst>
+          </a:prstGeom>
+          <a:effectLst>
+            <a:outerShdw blurRad="50800" dist="38100" dir="2700000" algn="tl" rotWithShape="0">
+              <a:srgbClr val="4900E5">
+                <a:alpha val="40000"/>
+              </a:srgbClr>
+            </a:outerShdw>
+          </a:effectLst>
+        </p:spPr>
+      </p:pic>
+      <p:pic>
+        <p:nvPicPr>
+          <p:cNvPr id="9" name="Content Placeholder 8" descr="A graph with blue and orange lines&#10;&#10;Description automatically generated">
+            <a:extLst>
+              <a:ext uri="{FF2B5EF4-FFF2-40B4-BE49-F238E27FC236}">
+                <a16:creationId xmlns:a16="http://schemas.microsoft.com/office/drawing/2014/main" id="{292D71F1-AEA9-A348-367F-0A36F8CC4974}"/>
+              </a:ext>
+            </a:extLst>
+          </p:cNvPr>
+          <p:cNvPicPr>
+            <a:picLocks noGrp="1" noChangeAspect="1"/>
+          </p:cNvPicPr>
+          <p:nvPr>
+            <p:ph sz="half" idx="2"/>
+          </p:nvPr>
+        </p:nvPicPr>
+        <p:blipFill>
+          <a:blip r:embed="rId3">
+            <a:extLst>
+              <a:ext uri="{28A0092B-C50C-407E-A947-70E740481C1C}">
+                <a14:useLocalDpi xmlns:a14="http://schemas.microsoft.com/office/drawing/2010/main" val="0"/>
+              </a:ext>
+            </a:extLst>
+          </a:blip>
+          <a:stretch>
+            <a:fillRect/>
+          </a:stretch>
+        </p:blipFill>
+        <p:spPr>
+          <a:xfrm>
+            <a:off x="431800" y="1690687"/>
+            <a:ext cx="4592782" cy="4592782"/>
+          </a:xfrm>
+          <a:prstGeom prst="roundRect">
+            <a:avLst>
+              <a:gd name="adj" fmla="val 6769"/>
+            </a:avLst>
+          </a:prstGeom>
+          <a:effectLst>
+            <a:outerShdw blurRad="50800" dist="38100" dir="8100000" algn="tr" rotWithShape="0">
+              <a:srgbClr val="8F061A">
+                <a:alpha val="40000"/>
+              </a:srgbClr>
+            </a:outerShdw>
+          </a:effectLst>
+        </p:spPr>
+      </p:pic>
+      <p:sp>
+        <p:nvSpPr>
+          <p:cNvPr id="10" name="Title 1">
+            <a:extLst>
+              <a:ext uri="{FF2B5EF4-FFF2-40B4-BE49-F238E27FC236}">
+                <a16:creationId xmlns:a16="http://schemas.microsoft.com/office/drawing/2014/main" id="{CD86288F-A15F-2444-3351-8F4D59F98FAF}"/>
+              </a:ext>
+            </a:extLst>
+          </p:cNvPr>
+          <p:cNvSpPr txBox="1">
+            <a:spLocks/>
+          </p:cNvSpPr>
+          <p:nvPr/>
+        </p:nvSpPr>
+        <p:spPr>
+          <a:xfrm>
+            <a:off x="431800" y="980198"/>
+            <a:ext cx="9045832" cy="534988"/>
+          </a:xfrm>
+          <a:prstGeom prst="rect">
+            <a:avLst/>
+          </a:prstGeom>
+        </p:spPr>
+        <p:txBody>
+          <a:bodyPr vert="horz" lIns="91440" tIns="45720" rIns="91440" bIns="45720" rtlCol="0" anchor="ctr">
+            <a:normAutofit/>
+          </a:bodyPr>
+          <a:lstStyle>
+            <a:lvl1pPr algn="l" defTabSz="914400" rtl="0" eaLnBrk="1" latinLnBrk="0" hangingPunct="1">
+              <a:lnSpc>
+                <a:spcPct val="90000"/>
+              </a:lnSpc>
+              <a:spcBef>
+                <a:spcPct val="0"/>
+              </a:spcBef>
+              <a:buNone/>
+              <a:defRPr sz="4400" kern="1200" baseline="0">
+                <a:solidFill>
+                  <a:schemeClr val="tx1"/>
+                </a:solidFill>
+                <a:latin typeface="+mj-lt"/>
+                <a:ea typeface="+mj-ea"/>
+                <a:cs typeface="+mj-cs"/>
+              </a:defRPr>
+            </a:lvl1pPr>
+          </a:lstStyle>
+          <a:p>
+            <a:r>
+              <a:rPr lang="en-US" sz="1800" dirty="0">
+                <a:latin typeface="Jost Medium" pitchFamily="2" charset="77"/>
+                <a:ea typeface="Jost Medium" pitchFamily="2" charset="77"/>
+              </a:rPr>
+              <a:t>Comparison with BFGS and Newton Methods [Part II]: Devil in the details</a:t>
+            </a:r>
+            <a:endParaRPr lang="en-KZ" sz="1800" dirty="0">
+              <a:latin typeface="Jost Medium" pitchFamily="2" charset="77"/>
+              <a:ea typeface="Jost Medium" pitchFamily="2" charset="77"/>
+            </a:endParaRPr>
+          </a:p>
+        </p:txBody>
+      </p:sp>
+      <p:cxnSp>
+        <p:nvCxnSpPr>
+          <p:cNvPr id="11" name="Straight Connector 10">
+            <a:extLst>
+              <a:ext uri="{FF2B5EF4-FFF2-40B4-BE49-F238E27FC236}">
+                <a16:creationId xmlns:a16="http://schemas.microsoft.com/office/drawing/2014/main" id="{A0A6FF00-D80E-8A78-E714-0D12390DA102}"/>
+              </a:ext>
+            </a:extLst>
+          </p:cNvPr>
+          <p:cNvCxnSpPr>
+            <a:cxnSpLocks/>
+          </p:cNvCxnSpPr>
+          <p:nvPr/>
+        </p:nvCxnSpPr>
+        <p:spPr>
+          <a:xfrm>
+            <a:off x="431800" y="1515186"/>
+            <a:ext cx="9711558" cy="0"/>
+          </a:xfrm>
+          <a:prstGeom prst="line">
+            <a:avLst/>
+          </a:prstGeom>
+          <a:ln w="28575">
+            <a:solidFill>
+              <a:srgbClr val="8F061A"/>
+            </a:solidFill>
+          </a:ln>
+        </p:spPr>
+        <p:style>
+          <a:lnRef idx="1">
+            <a:schemeClr val="accent1"/>
+          </a:lnRef>
+          <a:fillRef idx="0">
+            <a:schemeClr val="accent1"/>
+          </a:fillRef>
+          <a:effectRef idx="0">
+            <a:schemeClr val="accent1"/>
+          </a:effectRef>
+          <a:fontRef idx="minor">
+            <a:schemeClr val="tx1"/>
+          </a:fontRef>
+        </p:style>
+      </p:cxnSp>
+      <p:sp>
+        <p:nvSpPr>
+          <p:cNvPr id="12" name="Rounded Rectangle 11">
+            <a:extLst>
+              <a:ext uri="{FF2B5EF4-FFF2-40B4-BE49-F238E27FC236}">
+                <a16:creationId xmlns:a16="http://schemas.microsoft.com/office/drawing/2014/main" id="{A42D888C-4CC1-44A8-BB87-E13B26D2FE87}"/>
+              </a:ext>
+            </a:extLst>
+          </p:cNvPr>
+          <p:cNvSpPr/>
+          <p:nvPr/>
+        </p:nvSpPr>
+        <p:spPr>
+          <a:xfrm>
+            <a:off x="8495221" y="4432410"/>
+            <a:ext cx="559879" cy="838923"/>
+          </a:xfrm>
+          <a:prstGeom prst="roundRect">
+            <a:avLst>
+              <a:gd name="adj" fmla="val 4210"/>
+            </a:avLst>
+          </a:prstGeom>
+          <a:solidFill>
+            <a:schemeClr val="bg2">
+              <a:alpha val="70000"/>
+            </a:schemeClr>
+          </a:solidFill>
+          <a:ln>
+            <a:noFill/>
+          </a:ln>
+        </p:spPr>
+        <p:style>
+          <a:lnRef idx="2">
+            <a:schemeClr val="accent1"/>
+          </a:lnRef>
+          <a:fillRef idx="1">
+            <a:schemeClr val="lt1"/>
+          </a:fillRef>
+          <a:effectRef idx="0">
+            <a:schemeClr val="accent1"/>
+          </a:effectRef>
+          <a:fontRef idx="minor">
+            <a:schemeClr val="dk1"/>
+          </a:fontRef>
+        </p:style>
+        <p:txBody>
+          <a:bodyPr rtlCol="0" anchor="ctr"/>
+          <a:lstStyle/>
+          <a:p>
+            <a:pPr algn="ctr"/>
+            <a:endParaRPr lang="en-KZ" dirty="0"/>
+          </a:p>
+        </p:txBody>
+      </p:sp>
+      <p:sp>
+        <p:nvSpPr>
+          <p:cNvPr id="13" name="Rounded Rectangle 12">
+            <a:extLst>
+              <a:ext uri="{FF2B5EF4-FFF2-40B4-BE49-F238E27FC236}">
+                <a16:creationId xmlns:a16="http://schemas.microsoft.com/office/drawing/2014/main" id="{7F4BB287-95A7-49DD-6521-C26EF3C4A034}"/>
+              </a:ext>
+            </a:extLst>
+          </p:cNvPr>
+          <p:cNvSpPr/>
+          <p:nvPr/>
+        </p:nvSpPr>
+        <p:spPr>
+          <a:xfrm>
+            <a:off x="1433621" y="4432410"/>
+            <a:ext cx="560279" cy="838923"/>
+          </a:xfrm>
+          <a:prstGeom prst="roundRect">
+            <a:avLst>
+              <a:gd name="adj" fmla="val 4210"/>
+            </a:avLst>
+          </a:prstGeom>
+          <a:solidFill>
+            <a:schemeClr val="bg2">
+              <a:alpha val="70000"/>
+            </a:schemeClr>
+          </a:solidFill>
+          <a:ln>
+            <a:noFill/>
+          </a:ln>
+        </p:spPr>
+        <p:style>
+          <a:lnRef idx="2">
+            <a:schemeClr val="accent1"/>
+          </a:lnRef>
+          <a:fillRef idx="1">
+            <a:schemeClr val="lt1"/>
+          </a:fillRef>
+          <a:effectRef idx="0">
+            <a:schemeClr val="accent1"/>
+          </a:effectRef>
+          <a:fontRef idx="minor">
+            <a:schemeClr val="dk1"/>
+          </a:fontRef>
+        </p:style>
+        <p:txBody>
+          <a:bodyPr rtlCol="0" anchor="ctr"/>
+          <a:lstStyle/>
+          <a:p>
+            <a:pPr algn="ctr"/>
+            <a:endParaRPr lang="en-KZ" dirty="0"/>
+          </a:p>
+        </p:txBody>
+      </p:sp>
+      <p:cxnSp>
+        <p:nvCxnSpPr>
+          <p:cNvPr id="15" name="Elbow Connector 14">
+            <a:extLst>
+              <a:ext uri="{FF2B5EF4-FFF2-40B4-BE49-F238E27FC236}">
+                <a16:creationId xmlns:a16="http://schemas.microsoft.com/office/drawing/2014/main" id="{C1AC8B9B-CBD0-7998-4343-CB25985B0B6C}"/>
+              </a:ext>
+            </a:extLst>
+          </p:cNvPr>
+          <p:cNvCxnSpPr>
+            <a:cxnSpLocks/>
+            <a:stCxn id="13" idx="3"/>
+          </p:cNvCxnSpPr>
+          <p:nvPr/>
+        </p:nvCxnSpPr>
+        <p:spPr>
+          <a:xfrm flipV="1">
+            <a:off x="1993900" y="2050174"/>
+            <a:ext cx="3293679" cy="2801698"/>
+          </a:xfrm>
+          <a:prstGeom prst="bentConnector3">
+            <a:avLst>
+              <a:gd name="adj1" fmla="val 80076"/>
+            </a:avLst>
+          </a:prstGeom>
+          <a:ln w="12700">
+            <a:solidFill>
+              <a:srgbClr val="D50000"/>
+            </a:solidFill>
+            <a:prstDash val="dash"/>
+            <a:headEnd type="oval" w="med" len="med"/>
+            <a:tailEnd type="triangle" w="med" len="med"/>
+          </a:ln>
+        </p:spPr>
+        <p:style>
+          <a:lnRef idx="1">
+            <a:schemeClr val="accent1"/>
+          </a:lnRef>
+          <a:fillRef idx="0">
+            <a:schemeClr val="accent1"/>
+          </a:fillRef>
+          <a:effectRef idx="0">
+            <a:schemeClr val="accent1"/>
+          </a:effectRef>
+          <a:fontRef idx="minor">
+            <a:schemeClr val="tx1"/>
+          </a:fontRef>
+        </p:style>
+      </p:cxnSp>
+      <p:cxnSp>
+        <p:nvCxnSpPr>
+          <p:cNvPr id="26" name="Elbow Connector 25">
+            <a:extLst>
+              <a:ext uri="{FF2B5EF4-FFF2-40B4-BE49-F238E27FC236}">
+                <a16:creationId xmlns:a16="http://schemas.microsoft.com/office/drawing/2014/main" id="{8B767938-98DA-D6B0-AAD2-98597462E087}"/>
+              </a:ext>
+            </a:extLst>
+          </p:cNvPr>
+          <p:cNvCxnSpPr>
+            <a:cxnSpLocks/>
+            <a:stCxn id="12" idx="1"/>
+            <a:endCxn id="32" idx="3"/>
+          </p:cNvCxnSpPr>
+          <p:nvPr/>
+        </p:nvCxnSpPr>
+        <p:spPr>
+          <a:xfrm rot="10800000">
+            <a:off x="7352223" y="3643770"/>
+            <a:ext cx="1142998" cy="1208103"/>
+          </a:xfrm>
+          <a:prstGeom prst="bentConnector3">
+            <a:avLst>
+              <a:gd name="adj1" fmla="val 40000"/>
+            </a:avLst>
+          </a:prstGeom>
+          <a:ln w="12700">
+            <a:solidFill>
+              <a:srgbClr val="D50000"/>
+            </a:solidFill>
+            <a:prstDash val="dash"/>
+            <a:headEnd type="oval" w="med" len="med"/>
+            <a:tailEnd type="triangle" w="med" len="med"/>
+          </a:ln>
+        </p:spPr>
+        <p:style>
+          <a:lnRef idx="1">
+            <a:schemeClr val="accent1"/>
+          </a:lnRef>
+          <a:fillRef idx="0">
+            <a:schemeClr val="accent1"/>
+          </a:fillRef>
+          <a:effectRef idx="0">
+            <a:schemeClr val="accent1"/>
+          </a:effectRef>
+          <a:fontRef idx="minor">
+            <a:schemeClr val="tx1"/>
+          </a:fontRef>
+        </p:style>
+      </p:cxnSp>
+      <p:sp>
+        <p:nvSpPr>
+          <p:cNvPr id="32" name="Rectangle 31">
+            <a:extLst>
+              <a:ext uri="{FF2B5EF4-FFF2-40B4-BE49-F238E27FC236}">
+                <a16:creationId xmlns:a16="http://schemas.microsoft.com/office/drawing/2014/main" id="{13BC57DC-E2AE-C3AB-2C0B-78977B3E89A3}"/>
+              </a:ext>
+            </a:extLst>
+          </p:cNvPr>
+          <p:cNvSpPr/>
+          <p:nvPr/>
+        </p:nvSpPr>
+        <p:spPr>
+          <a:xfrm>
+            <a:off x="5287579" y="1981775"/>
+            <a:ext cx="2064644" cy="3323987"/>
+          </a:xfrm>
+          <a:prstGeom prst="rect">
+            <a:avLst/>
+          </a:prstGeom>
+        </p:spPr>
+        <p:txBody>
+          <a:bodyPr wrap="square">
+            <a:spAutoFit/>
+          </a:bodyPr>
+          <a:lstStyle/>
+          <a:p>
+            <a:pPr marL="285750" indent="-285750">
+              <a:buClr>
+                <a:srgbClr val="D50000"/>
+              </a:buClr>
+              <a:buFont typeface="Wingdings" pitchFamily="2" charset="2"/>
+              <a:buChar char="Ø"/>
+            </a:pPr>
+            <a:r>
+              <a:rPr lang="en-US" sz="1400" dirty="0">
+                <a:latin typeface="Jost Light" pitchFamily="2" charset="77"/>
+                <a:ea typeface="Jost Light" pitchFamily="2" charset="77"/>
+              </a:rPr>
+              <a:t>LM tries to fit the second-year maturity as accurately as possible and after that converges in downward trend with the data.</a:t>
+            </a:r>
+          </a:p>
+          <a:p>
+            <a:pPr marL="285750" indent="-285750">
+              <a:buClr>
+                <a:srgbClr val="D50000"/>
+              </a:buClr>
+              <a:buFont typeface="Wingdings" pitchFamily="2" charset="2"/>
+              <a:buChar char="Ø"/>
+            </a:pPr>
+            <a:r>
+              <a:rPr lang="en-US" sz="1400" dirty="0">
+                <a:latin typeface="Jost Light" pitchFamily="2" charset="77"/>
+                <a:ea typeface="Jost Light" pitchFamily="2" charset="77"/>
+              </a:rPr>
+              <a:t>BFGS’ graph looks more like the average between two spikes.</a:t>
+            </a:r>
+          </a:p>
+          <a:p>
+            <a:pPr marL="285750" indent="-285750">
+              <a:buClr>
+                <a:srgbClr val="D50000"/>
+              </a:buClr>
+              <a:buFont typeface="Wingdings" pitchFamily="2" charset="2"/>
+              <a:buChar char="Ø"/>
+            </a:pPr>
+            <a:r>
+              <a:rPr lang="en-US" sz="1400" dirty="0">
+                <a:latin typeface="Jost Light" pitchFamily="2" charset="77"/>
+                <a:ea typeface="Jost Light" pitchFamily="2" charset="77"/>
+              </a:rPr>
+              <a:t>Even though this yield curve pattern is very hard to predict, LM showed itself to be more robust.</a:t>
+            </a:r>
+          </a:p>
+        </p:txBody>
+      </p:sp>
+    </p:spTree>
+    <p:extLst>
+      <p:ext uri="{BB962C8B-B14F-4D97-AF65-F5344CB8AC3E}">
+        <p14:creationId xmlns:p14="http://schemas.microsoft.com/office/powerpoint/2010/main" val="4132696976"/>
+      </p:ext>
+    </p:extLst>
+  </p:cSld>
+  <p:clrMapOvr>
+    <a:masterClrMapping/>
+  </p:clrMapOvr>
+</p:sld>
+</file>
+
+<file path=ppt/slides/slide18.xml><?xml version="1.0" encoding="utf-8"?>
+<p:sld xmlns:a="http://schemas.openxmlformats.org/drawingml/2006/main" xmlns:r="http://schemas.openxmlformats.org/officeDocument/2006/relationships" xmlns:p="http://schemas.openxmlformats.org/presentationml/2006/main">
+  <p:cSld>
+    <p:spTree>
+      <p:nvGrpSpPr>
+        <p:cNvPr id="1" name=""/>
+        <p:cNvGrpSpPr/>
+        <p:nvPr/>
+      </p:nvGrpSpPr>
+      <p:grpSpPr>
+        <a:xfrm>
+          <a:off x="0" y="0"/>
+          <a:ext cx="0" cy="0"/>
+          <a:chOff x="0" y="0"/>
+          <a:chExt cx="0" cy="0"/>
+        </a:xfrm>
+      </p:grpSpPr>
+      <p:pic>
+        <p:nvPicPr>
+          <p:cNvPr id="7" name="Content Placeholder 6" descr="A graph with blue and orange lines&#10;&#10;Description automatically generated">
+            <a:extLst>
+              <a:ext uri="{FF2B5EF4-FFF2-40B4-BE49-F238E27FC236}">
+                <a16:creationId xmlns:a16="http://schemas.microsoft.com/office/drawing/2014/main" id="{6F58D870-0DA4-76B4-5B5D-E57FA9AFD0E1}"/>
+              </a:ext>
+            </a:extLst>
+          </p:cNvPr>
+          <p:cNvPicPr>
+            <a:picLocks noGrp="1" noChangeAspect="1"/>
+          </p:cNvPicPr>
+          <p:nvPr>
+            <p:ph sz="half" idx="1"/>
+          </p:nvPr>
+        </p:nvPicPr>
+        <p:blipFill>
+          <a:blip r:embed="rId2">
+            <a:extLst>
+              <a:ext uri="{28A0092B-C50C-407E-A947-70E740481C1C}">
+                <a14:useLocalDpi xmlns:a14="http://schemas.microsoft.com/office/drawing/2010/main" val="0"/>
+              </a:ext>
+            </a:extLst>
+          </a:blip>
+          <a:stretch>
+            <a:fillRect/>
+          </a:stretch>
+        </p:blipFill>
+        <p:spPr>
+          <a:xfrm>
+            <a:off x="8136761" y="1685211"/>
+            <a:ext cx="3657600" cy="3657600"/>
+          </a:xfrm>
+          <a:prstGeom prst="roundRect">
+            <a:avLst>
+              <a:gd name="adj" fmla="val 6769"/>
+            </a:avLst>
+          </a:prstGeom>
+          <a:effectLst>
+            <a:outerShdw blurRad="50800" dist="38100" dir="2700000" algn="tl" rotWithShape="0">
+              <a:srgbClr val="4900E5">
+                <a:alpha val="40000"/>
+              </a:srgbClr>
+            </a:outerShdw>
+          </a:effectLst>
+        </p:spPr>
+      </p:pic>
+      <p:pic>
+        <p:nvPicPr>
+          <p:cNvPr id="13" name="Content Placeholder 12" descr="A graph with a line and numbers&#10;&#10;Description automatically generated">
+            <a:extLst>
+              <a:ext uri="{FF2B5EF4-FFF2-40B4-BE49-F238E27FC236}">
+                <a16:creationId xmlns:a16="http://schemas.microsoft.com/office/drawing/2014/main" id="{CD249FB8-1B9D-34EC-74CF-38E9D9ACF3BD}"/>
+              </a:ext>
+            </a:extLst>
+          </p:cNvPr>
+          <p:cNvPicPr>
+            <a:picLocks noGrp="1" noChangeAspect="1"/>
+          </p:cNvPicPr>
+          <p:nvPr>
+            <p:ph sz="half" idx="2"/>
+          </p:nvPr>
+        </p:nvPicPr>
+        <p:blipFill>
+          <a:blip r:embed="rId3">
+            <a:extLst>
+              <a:ext uri="{28A0092B-C50C-407E-A947-70E740481C1C}">
+                <a14:useLocalDpi xmlns:a14="http://schemas.microsoft.com/office/drawing/2010/main" val="0"/>
+              </a:ext>
+            </a:extLst>
+          </a:blip>
+          <a:stretch>
+            <a:fillRect/>
+          </a:stretch>
+        </p:blipFill>
+        <p:spPr>
+          <a:xfrm>
+            <a:off x="431800" y="1682127"/>
+            <a:ext cx="3660685" cy="3660685"/>
+          </a:xfrm>
+          <a:prstGeom prst="roundRect">
+            <a:avLst>
+              <a:gd name="adj" fmla="val 6769"/>
+            </a:avLst>
+          </a:prstGeom>
+          <a:effectLst>
+            <a:outerShdw blurRad="50800" dist="38100" dir="8100000" algn="tr" rotWithShape="0">
+              <a:srgbClr val="8F061A">
+                <a:alpha val="40000"/>
+              </a:srgbClr>
+            </a:outerShdw>
+          </a:effectLst>
+        </p:spPr>
+      </p:pic>
+      <p:pic>
+        <p:nvPicPr>
+          <p:cNvPr id="15" name="Picture 14" descr="A graph with blue and orange lines&#10;&#10;Description automatically generated">
+            <a:extLst>
+              <a:ext uri="{FF2B5EF4-FFF2-40B4-BE49-F238E27FC236}">
+                <a16:creationId xmlns:a16="http://schemas.microsoft.com/office/drawing/2014/main" id="{E12B679C-7F74-1EFF-567F-C5C39B296EDD}"/>
+              </a:ext>
+            </a:extLst>
+          </p:cNvPr>
+          <p:cNvPicPr>
+            <a:picLocks noChangeAspect="1"/>
+          </p:cNvPicPr>
+          <p:nvPr/>
+        </p:nvPicPr>
+        <p:blipFill>
+          <a:blip r:embed="rId4">
+            <a:extLst>
+              <a:ext uri="{28A0092B-C50C-407E-A947-70E740481C1C}">
+                <a14:useLocalDpi xmlns:a14="http://schemas.microsoft.com/office/drawing/2010/main" val="0"/>
+              </a:ext>
+            </a:extLst>
+          </a:blip>
+          <a:stretch>
+            <a:fillRect/>
+          </a:stretch>
+        </p:blipFill>
+        <p:spPr>
+          <a:xfrm>
+            <a:off x="4284281" y="1682127"/>
+            <a:ext cx="3660684" cy="3660684"/>
+          </a:xfrm>
+          <a:prstGeom prst="roundRect">
+            <a:avLst>
+              <a:gd name="adj" fmla="val 6769"/>
+            </a:avLst>
+          </a:prstGeom>
+          <a:effectLst>
+            <a:outerShdw blurRad="50800" dist="38100" dir="5400000" algn="tr" rotWithShape="0">
+              <a:srgbClr val="8F061A">
+                <a:alpha val="40000"/>
+              </a:srgbClr>
+            </a:outerShdw>
+          </a:effectLst>
+        </p:spPr>
+      </p:pic>
+      <p:sp>
+        <p:nvSpPr>
+          <p:cNvPr id="16" name="Title 1">
+            <a:extLst>
+              <a:ext uri="{FF2B5EF4-FFF2-40B4-BE49-F238E27FC236}">
+                <a16:creationId xmlns:a16="http://schemas.microsoft.com/office/drawing/2014/main" id="{F240E52C-8707-296C-1D87-04F6DA5FF913}"/>
+              </a:ext>
+            </a:extLst>
+          </p:cNvPr>
+          <p:cNvSpPr txBox="1">
+            <a:spLocks/>
+          </p:cNvSpPr>
+          <p:nvPr/>
+        </p:nvSpPr>
+        <p:spPr>
+          <a:xfrm>
+            <a:off x="431800" y="980198"/>
+            <a:ext cx="9045832" cy="534988"/>
+          </a:xfrm>
+          <a:prstGeom prst="rect">
+            <a:avLst/>
+          </a:prstGeom>
+        </p:spPr>
+        <p:txBody>
+          <a:bodyPr vert="horz" lIns="91440" tIns="45720" rIns="91440" bIns="45720" rtlCol="0" anchor="ctr">
+            <a:normAutofit/>
+          </a:bodyPr>
+          <a:lstStyle>
+            <a:lvl1pPr algn="l" defTabSz="914400" rtl="0" eaLnBrk="1" latinLnBrk="0" hangingPunct="1">
+              <a:lnSpc>
+                <a:spcPct val="90000"/>
+              </a:lnSpc>
+              <a:spcBef>
+                <a:spcPct val="0"/>
+              </a:spcBef>
+              <a:buNone/>
+              <a:defRPr sz="4400" kern="1200" baseline="0">
+                <a:solidFill>
+                  <a:schemeClr val="tx1"/>
+                </a:solidFill>
+                <a:latin typeface="+mj-lt"/>
+                <a:ea typeface="+mj-ea"/>
+                <a:cs typeface="+mj-cs"/>
+              </a:defRPr>
+            </a:lvl1pPr>
+          </a:lstStyle>
+          <a:p>
+            <a:r>
+              <a:rPr lang="en-US" sz="1800" dirty="0">
+                <a:latin typeface="Jost Medium" pitchFamily="2" charset="77"/>
+                <a:ea typeface="Jost Medium" pitchFamily="2" charset="77"/>
+              </a:rPr>
+              <a:t>Comparison with BFGS and Newton Methods [Part III]: A little more examples</a:t>
+            </a:r>
+            <a:endParaRPr lang="en-KZ" sz="1800" dirty="0">
+              <a:latin typeface="Jost Medium" pitchFamily="2" charset="77"/>
+              <a:ea typeface="Jost Medium" pitchFamily="2" charset="77"/>
+            </a:endParaRPr>
+          </a:p>
+        </p:txBody>
+      </p:sp>
+      <p:cxnSp>
+        <p:nvCxnSpPr>
+          <p:cNvPr id="17" name="Straight Connector 16">
+            <a:extLst>
+              <a:ext uri="{FF2B5EF4-FFF2-40B4-BE49-F238E27FC236}">
+                <a16:creationId xmlns:a16="http://schemas.microsoft.com/office/drawing/2014/main" id="{77D6BA98-615D-C145-6C8A-08608129B4B3}"/>
+              </a:ext>
+            </a:extLst>
+          </p:cNvPr>
+          <p:cNvCxnSpPr>
+            <a:cxnSpLocks/>
+          </p:cNvCxnSpPr>
+          <p:nvPr/>
+        </p:nvCxnSpPr>
+        <p:spPr>
+          <a:xfrm>
+            <a:off x="431800" y="1515186"/>
+            <a:ext cx="9711558" cy="0"/>
+          </a:xfrm>
+          <a:prstGeom prst="line">
+            <a:avLst/>
+          </a:prstGeom>
+          <a:ln w="28575">
+            <a:solidFill>
+              <a:srgbClr val="8F061A"/>
+            </a:solidFill>
+          </a:ln>
+        </p:spPr>
+        <p:style>
+          <a:lnRef idx="1">
+            <a:schemeClr val="accent1"/>
+          </a:lnRef>
+          <a:fillRef idx="0">
+            <a:schemeClr val="accent1"/>
+          </a:fillRef>
+          <a:effectRef idx="0">
+            <a:schemeClr val="accent1"/>
+          </a:effectRef>
+          <a:fontRef idx="minor">
+            <a:schemeClr val="tx1"/>
+          </a:fontRef>
+        </p:style>
+      </p:cxnSp>
+      <p:sp>
+        <p:nvSpPr>
+          <p:cNvPr id="18" name="Rectangle 17">
+            <a:extLst>
+              <a:ext uri="{FF2B5EF4-FFF2-40B4-BE49-F238E27FC236}">
+                <a16:creationId xmlns:a16="http://schemas.microsoft.com/office/drawing/2014/main" id="{9FEB4125-2E6A-D2FF-1F00-CB31E075CCDF}"/>
+              </a:ext>
+            </a:extLst>
+          </p:cNvPr>
+          <p:cNvSpPr/>
+          <p:nvPr/>
+        </p:nvSpPr>
+        <p:spPr>
+          <a:xfrm>
+            <a:off x="431800" y="5509751"/>
+            <a:ext cx="5664200" cy="1169551"/>
+          </a:xfrm>
+          <a:prstGeom prst="rect">
+            <a:avLst/>
+          </a:prstGeom>
+        </p:spPr>
+        <p:txBody>
+          <a:bodyPr wrap="square">
+            <a:spAutoFit/>
+          </a:bodyPr>
+          <a:lstStyle/>
+          <a:p>
+            <a:pPr>
+              <a:buClr>
+                <a:srgbClr val="D50000"/>
+              </a:buClr>
+            </a:pPr>
+            <a:r>
+              <a:rPr lang="en-US" sz="1400" dirty="0">
+                <a:latin typeface="Jost Light" pitchFamily="2" charset="77"/>
+                <a:ea typeface="Jost Light" pitchFamily="2" charset="77"/>
+              </a:rPr>
+              <a:t>Inverted yield curve:</a:t>
+            </a:r>
+          </a:p>
+          <a:p>
+            <a:pPr marL="285750" indent="-285750">
+              <a:buClr>
+                <a:srgbClr val="D50000"/>
+              </a:buClr>
+              <a:buFont typeface="Wingdings" pitchFamily="2" charset="2"/>
+              <a:buChar char="Ø"/>
+            </a:pPr>
+            <a:r>
+              <a:rPr lang="en-US" sz="1400" dirty="0">
+                <a:latin typeface="Jost Light" pitchFamily="2" charset="77"/>
+                <a:ea typeface="Jost Light" pitchFamily="2" charset="77"/>
+              </a:rPr>
+              <a:t>Three of the methods do comparatively good job modeling the inverted yield curve.</a:t>
+            </a:r>
+          </a:p>
+          <a:p>
+            <a:pPr marL="285750" indent="-285750">
+              <a:buClr>
+                <a:srgbClr val="D50000"/>
+              </a:buClr>
+              <a:buFont typeface="Wingdings" pitchFamily="2" charset="2"/>
+              <a:buChar char="Ø"/>
+            </a:pPr>
+            <a:r>
+              <a:rPr lang="en-US" sz="1400" dirty="0">
+                <a:latin typeface="Jost Light" pitchFamily="2" charset="77"/>
+                <a:ea typeface="Jost Light" pitchFamily="2" charset="77"/>
+              </a:rPr>
+              <a:t>Newton Method here is limited to its speed, it took all the 100 iterations to complete the task.</a:t>
+            </a:r>
+          </a:p>
+        </p:txBody>
+      </p:sp>
+      <p:pic>
+        <p:nvPicPr>
+          <p:cNvPr id="19" name="Picture 18" descr="A red circle with a white number on it&#10;&#10;Description automatically generated">
+            <a:extLst>
+              <a:ext uri="{FF2B5EF4-FFF2-40B4-BE49-F238E27FC236}">
+                <a16:creationId xmlns:a16="http://schemas.microsoft.com/office/drawing/2014/main" id="{DDC6888A-F5C0-1394-734F-514B92F6F8BD}"/>
+              </a:ext>
+            </a:extLst>
+          </p:cNvPr>
+          <p:cNvPicPr>
+            <a:picLocks noChangeAspect="1"/>
+          </p:cNvPicPr>
+          <p:nvPr/>
+        </p:nvPicPr>
+        <p:blipFill>
+          <a:blip r:embed="rId5">
+            <a:extLst>
+              <a:ext uri="{28A0092B-C50C-407E-A947-70E740481C1C}">
+                <a14:useLocalDpi xmlns:a14="http://schemas.microsoft.com/office/drawing/2010/main" val="0"/>
+              </a:ext>
+            </a:extLst>
+          </a:blip>
+          <a:stretch>
+            <a:fillRect/>
+          </a:stretch>
+        </p:blipFill>
+        <p:spPr>
+          <a:xfrm>
+            <a:off x="484604" y="1758325"/>
+            <a:ext cx="273195" cy="273195"/>
+          </a:xfrm>
+          <a:prstGeom prst="rect">
+            <a:avLst/>
+          </a:prstGeom>
+        </p:spPr>
+      </p:pic>
+      <p:pic>
+        <p:nvPicPr>
+          <p:cNvPr id="22" name="Picture 21" descr="A red circle with a white number on it&#10;&#10;Description automatically generated">
+            <a:extLst>
+              <a:ext uri="{FF2B5EF4-FFF2-40B4-BE49-F238E27FC236}">
+                <a16:creationId xmlns:a16="http://schemas.microsoft.com/office/drawing/2014/main" id="{FFDC3D26-C04C-CA49-572C-7A88D9B669A2}"/>
+              </a:ext>
+            </a:extLst>
+          </p:cNvPr>
+          <p:cNvPicPr>
+            <a:picLocks noChangeAspect="1"/>
+          </p:cNvPicPr>
+          <p:nvPr/>
+        </p:nvPicPr>
+        <p:blipFill>
+          <a:blip r:embed="rId6">
+            <a:extLst>
+              <a:ext uri="{28A0092B-C50C-407E-A947-70E740481C1C}">
+                <a14:useLocalDpi xmlns:a14="http://schemas.microsoft.com/office/drawing/2010/main" val="0"/>
+              </a:ext>
+            </a:extLst>
+          </a:blip>
+          <a:stretch>
+            <a:fillRect/>
+          </a:stretch>
+        </p:blipFill>
+        <p:spPr>
+          <a:xfrm>
+            <a:off x="4358896" y="1758324"/>
+            <a:ext cx="273195" cy="273195"/>
+          </a:xfrm>
+          <a:prstGeom prst="rect">
+            <a:avLst/>
+          </a:prstGeom>
+        </p:spPr>
+      </p:pic>
+      <p:pic>
+        <p:nvPicPr>
+          <p:cNvPr id="23" name="Picture 22" descr="A red circle with white number three on it&#10;&#10;Description automatically generated">
+            <a:extLst>
+              <a:ext uri="{FF2B5EF4-FFF2-40B4-BE49-F238E27FC236}">
+                <a16:creationId xmlns:a16="http://schemas.microsoft.com/office/drawing/2014/main" id="{62486BF0-D065-7BFB-01F4-F7B65DD66AB4}"/>
+              </a:ext>
+            </a:extLst>
+          </p:cNvPr>
+          <p:cNvPicPr>
+            <a:picLocks noChangeAspect="1"/>
+          </p:cNvPicPr>
+          <p:nvPr/>
+        </p:nvPicPr>
+        <p:blipFill>
+          <a:blip r:embed="rId7">
+            <a:extLst>
+              <a:ext uri="{28A0092B-C50C-407E-A947-70E740481C1C}">
+                <a14:useLocalDpi xmlns:a14="http://schemas.microsoft.com/office/drawing/2010/main" val="0"/>
+              </a:ext>
+            </a:extLst>
+          </a:blip>
+          <a:stretch>
+            <a:fillRect/>
+          </a:stretch>
+        </p:blipFill>
+        <p:spPr>
+          <a:xfrm>
+            <a:off x="8187560" y="1757919"/>
+            <a:ext cx="273600" cy="273600"/>
+          </a:xfrm>
+          <a:prstGeom prst="rect">
+            <a:avLst/>
+          </a:prstGeom>
+        </p:spPr>
+      </p:pic>
+    </p:spTree>
+    <p:extLst>
+      <p:ext uri="{BB962C8B-B14F-4D97-AF65-F5344CB8AC3E}">
+        <p14:creationId xmlns:p14="http://schemas.microsoft.com/office/powerpoint/2010/main" val="4049800086"/>
+      </p:ext>
+    </p:extLst>
+  </p:cSld>
+  <p:clrMapOvr>
+    <a:masterClrMapping/>
+  </p:clrMapOvr>
+</p:sld>
+</file>
+
+<file path=ppt/slides/slide19.xml><?xml version="1.0" encoding="utf-8"?>
+<p:sld xmlns:a="http://schemas.openxmlformats.org/drawingml/2006/main" xmlns:r="http://schemas.openxmlformats.org/officeDocument/2006/relationships" xmlns:p="http://schemas.openxmlformats.org/presentationml/2006/main">
+  <p:cSld>
+    <p:spTree>
+      <p:nvGrpSpPr>
+        <p:cNvPr id="1" name=""/>
+        <p:cNvGrpSpPr/>
+        <p:nvPr/>
+      </p:nvGrpSpPr>
+      <p:grpSpPr>
+        <a:xfrm>
+          <a:off x="0" y="0"/>
+          <a:ext cx="0" cy="0"/>
+          <a:chOff x="0" y="0"/>
+          <a:chExt cx="0" cy="0"/>
+        </a:xfrm>
+      </p:grpSpPr>
+      <p:pic>
+        <p:nvPicPr>
+          <p:cNvPr id="7" name="Content Placeholder 6" descr="A graph with blue and orange lines&#10;&#10;Description automatically generated">
+            <a:extLst>
+              <a:ext uri="{FF2B5EF4-FFF2-40B4-BE49-F238E27FC236}">
+                <a16:creationId xmlns:a16="http://schemas.microsoft.com/office/drawing/2014/main" id="{82B5529A-23BF-4A1A-99CE-2540B38EC065}"/>
+              </a:ext>
+            </a:extLst>
+          </p:cNvPr>
+          <p:cNvPicPr>
+            <a:picLocks noGrp="1" noChangeAspect="1"/>
+          </p:cNvPicPr>
+          <p:nvPr>
+            <p:ph sz="half" idx="1"/>
+          </p:nvPr>
+        </p:nvPicPr>
+        <p:blipFill>
+          <a:blip r:embed="rId2">
+            <a:extLst>
+              <a:ext uri="{28A0092B-C50C-407E-A947-70E740481C1C}">
+                <a14:useLocalDpi xmlns:a14="http://schemas.microsoft.com/office/drawing/2010/main" val="0"/>
+              </a:ext>
+            </a:extLst>
+          </a:blip>
+          <a:stretch>
+            <a:fillRect/>
+          </a:stretch>
+        </p:blipFill>
+        <p:spPr>
+          <a:xfrm>
+            <a:off x="299674" y="1753342"/>
+            <a:ext cx="3657600" cy="3657600"/>
+          </a:xfrm>
+          <a:prstGeom prst="roundRect">
+            <a:avLst>
+              <a:gd name="adj" fmla="val 6769"/>
+            </a:avLst>
+          </a:prstGeom>
+          <a:effectLst>
+            <a:outerShdw blurRad="50800" dist="38100" dir="8100000" algn="tr" rotWithShape="0">
+              <a:srgbClr val="8F061A">
+                <a:alpha val="40000"/>
+              </a:srgbClr>
+            </a:outerShdw>
+          </a:effectLst>
+        </p:spPr>
+      </p:pic>
+      <p:pic>
+        <p:nvPicPr>
+          <p:cNvPr id="9" name="Content Placeholder 8" descr="A graph with blue and orange lines&#10;&#10;Description automatically generated">
+            <a:extLst>
+              <a:ext uri="{FF2B5EF4-FFF2-40B4-BE49-F238E27FC236}">
+                <a16:creationId xmlns:a16="http://schemas.microsoft.com/office/drawing/2014/main" id="{AF51052E-E9E5-9FF1-304B-0FBDB82091F8}"/>
+              </a:ext>
+            </a:extLst>
+          </p:cNvPr>
+          <p:cNvPicPr>
+            <a:picLocks noGrp="1" noChangeAspect="1"/>
+          </p:cNvPicPr>
+          <p:nvPr>
+            <p:ph sz="half" idx="2"/>
+          </p:nvPr>
+        </p:nvPicPr>
+        <p:blipFill>
+          <a:blip r:embed="rId3">
+            <a:extLst>
+              <a:ext uri="{28A0092B-C50C-407E-A947-70E740481C1C}">
+                <a14:useLocalDpi xmlns:a14="http://schemas.microsoft.com/office/drawing/2010/main" val="0"/>
+              </a:ext>
+            </a:extLst>
+          </a:blip>
+          <a:stretch>
+            <a:fillRect/>
+          </a:stretch>
+        </p:blipFill>
+        <p:spPr>
+          <a:xfrm>
+            <a:off x="8065684" y="1753342"/>
+            <a:ext cx="3657600" cy="3657600"/>
+          </a:xfrm>
+          <a:prstGeom prst="roundRect">
+            <a:avLst>
+              <a:gd name="adj" fmla="val 6769"/>
+            </a:avLst>
+          </a:prstGeom>
+          <a:effectLst>
+            <a:outerShdw blurRad="50800" dist="38100" dir="2700000" algn="tl" rotWithShape="0">
+              <a:srgbClr val="4900E5">
+                <a:alpha val="40000"/>
+              </a:srgbClr>
+            </a:outerShdw>
+          </a:effectLst>
+        </p:spPr>
+      </p:pic>
+      <p:pic>
+        <p:nvPicPr>
+          <p:cNvPr id="11" name="Picture 10" descr="A graph with blue and orange lines&#10;&#10;Description automatically generated">
+            <a:extLst>
+              <a:ext uri="{FF2B5EF4-FFF2-40B4-BE49-F238E27FC236}">
+                <a16:creationId xmlns:a16="http://schemas.microsoft.com/office/drawing/2014/main" id="{3ACDA0DA-3867-2EA0-D533-BD5E6AE19F2F}"/>
+              </a:ext>
+            </a:extLst>
+          </p:cNvPr>
+          <p:cNvPicPr>
+            <a:picLocks noChangeAspect="1"/>
+          </p:cNvPicPr>
+          <p:nvPr/>
+        </p:nvPicPr>
+        <p:blipFill>
+          <a:blip r:embed="rId4">
+            <a:extLst>
+              <a:ext uri="{28A0092B-C50C-407E-A947-70E740481C1C}">
+                <a14:useLocalDpi xmlns:a14="http://schemas.microsoft.com/office/drawing/2010/main" val="0"/>
+              </a:ext>
+            </a:extLst>
+          </a:blip>
+          <a:stretch>
+            <a:fillRect/>
+          </a:stretch>
+        </p:blipFill>
+        <p:spPr>
+          <a:xfrm>
+            <a:off x="4183421" y="1754826"/>
+            <a:ext cx="3656116" cy="3656116"/>
+          </a:xfrm>
+          <a:prstGeom prst="roundRect">
+            <a:avLst>
+              <a:gd name="adj" fmla="val 6769"/>
+            </a:avLst>
+          </a:prstGeom>
+          <a:effectLst>
+            <a:outerShdw blurRad="50800" dist="38100" dir="5400000" algn="tr" rotWithShape="0">
+              <a:srgbClr val="8F061A">
+                <a:alpha val="40000"/>
+              </a:srgbClr>
+            </a:outerShdw>
+          </a:effectLst>
+        </p:spPr>
+      </p:pic>
+      <p:sp>
+        <p:nvSpPr>
+          <p:cNvPr id="13" name="Title 1">
+            <a:extLst>
+              <a:ext uri="{FF2B5EF4-FFF2-40B4-BE49-F238E27FC236}">
+                <a16:creationId xmlns:a16="http://schemas.microsoft.com/office/drawing/2014/main" id="{7F12AA2D-F903-375E-0AFF-6A7CF419FF6B}"/>
+              </a:ext>
+            </a:extLst>
+          </p:cNvPr>
+          <p:cNvSpPr txBox="1">
+            <a:spLocks/>
+          </p:cNvSpPr>
+          <p:nvPr/>
+        </p:nvSpPr>
+        <p:spPr>
+          <a:xfrm>
+            <a:off x="431800" y="980198"/>
+            <a:ext cx="9045832" cy="534988"/>
+          </a:xfrm>
+          <a:prstGeom prst="rect">
+            <a:avLst/>
+          </a:prstGeom>
+        </p:spPr>
+        <p:txBody>
+          <a:bodyPr vert="horz" lIns="91440" tIns="45720" rIns="91440" bIns="45720" rtlCol="0" anchor="ctr">
+            <a:normAutofit/>
+          </a:bodyPr>
+          <a:lstStyle>
+            <a:lvl1pPr algn="l" defTabSz="914400" rtl="0" eaLnBrk="1" latinLnBrk="0" hangingPunct="1">
+              <a:lnSpc>
+                <a:spcPct val="90000"/>
+              </a:lnSpc>
+              <a:spcBef>
+                <a:spcPct val="0"/>
+              </a:spcBef>
+              <a:buNone/>
+              <a:defRPr sz="4400" kern="1200" baseline="0">
+                <a:solidFill>
+                  <a:schemeClr val="tx1"/>
+                </a:solidFill>
+                <a:latin typeface="+mj-lt"/>
+                <a:ea typeface="+mj-ea"/>
+                <a:cs typeface="+mj-cs"/>
+              </a:defRPr>
+            </a:lvl1pPr>
+          </a:lstStyle>
+          <a:p>
+            <a:r>
+              <a:rPr lang="en-US" sz="1800" dirty="0">
+                <a:latin typeface="Jost Medium" pitchFamily="2" charset="77"/>
+                <a:ea typeface="Jost Medium" pitchFamily="2" charset="77"/>
+              </a:rPr>
+              <a:t>Comparison with BFGS and Newton Methods [Part IV]: Only Newton can solve this?</a:t>
+            </a:r>
+            <a:endParaRPr lang="en-KZ" sz="1800" dirty="0">
+              <a:latin typeface="Jost Medium" pitchFamily="2" charset="77"/>
+              <a:ea typeface="Jost Medium" pitchFamily="2" charset="77"/>
+            </a:endParaRPr>
+          </a:p>
+        </p:txBody>
+      </p:sp>
+      <p:cxnSp>
+        <p:nvCxnSpPr>
+          <p:cNvPr id="14" name="Straight Connector 13">
+            <a:extLst>
+              <a:ext uri="{FF2B5EF4-FFF2-40B4-BE49-F238E27FC236}">
+                <a16:creationId xmlns:a16="http://schemas.microsoft.com/office/drawing/2014/main" id="{ED8DA34A-9CB6-917C-0A21-A051E2533249}"/>
+              </a:ext>
+            </a:extLst>
+          </p:cNvPr>
+          <p:cNvCxnSpPr>
+            <a:cxnSpLocks/>
+          </p:cNvCxnSpPr>
+          <p:nvPr/>
+        </p:nvCxnSpPr>
+        <p:spPr>
+          <a:xfrm>
+            <a:off x="431800" y="1515186"/>
+            <a:ext cx="9711558" cy="0"/>
+          </a:xfrm>
+          <a:prstGeom prst="line">
+            <a:avLst/>
+          </a:prstGeom>
+          <a:ln w="28575">
+            <a:solidFill>
+              <a:srgbClr val="8F061A"/>
+            </a:solidFill>
+          </a:ln>
+        </p:spPr>
+        <p:style>
+          <a:lnRef idx="1">
+            <a:schemeClr val="accent1"/>
+          </a:lnRef>
+          <a:fillRef idx="0">
+            <a:schemeClr val="accent1"/>
+          </a:fillRef>
+          <a:effectRef idx="0">
+            <a:schemeClr val="accent1"/>
+          </a:effectRef>
+          <a:fontRef idx="minor">
+            <a:schemeClr val="tx1"/>
+          </a:fontRef>
+        </p:style>
+      </p:cxnSp>
+      <p:sp>
+        <p:nvSpPr>
+          <p:cNvPr id="15" name="Rectangle 14">
+            <a:extLst>
+              <a:ext uri="{FF2B5EF4-FFF2-40B4-BE49-F238E27FC236}">
+                <a16:creationId xmlns:a16="http://schemas.microsoft.com/office/drawing/2014/main" id="{5FACC481-30C8-160A-DB4E-8A6A5D1F7E19}"/>
+              </a:ext>
+            </a:extLst>
+          </p:cNvPr>
+          <p:cNvSpPr/>
+          <p:nvPr/>
+        </p:nvSpPr>
+        <p:spPr>
+          <a:xfrm>
+            <a:off x="299674" y="5522451"/>
+            <a:ext cx="4500926" cy="1169551"/>
+          </a:xfrm>
+          <a:prstGeom prst="rect">
+            <a:avLst/>
+          </a:prstGeom>
+        </p:spPr>
+        <p:txBody>
+          <a:bodyPr wrap="square">
+            <a:spAutoFit/>
+          </a:bodyPr>
+          <a:lstStyle/>
+          <a:p>
+            <a:pPr>
+              <a:buClr>
+                <a:srgbClr val="D50000"/>
+              </a:buClr>
+            </a:pPr>
+            <a:r>
+              <a:rPr lang="en-US" sz="1400" b="1" dirty="0">
+                <a:latin typeface="Jost Light" pitchFamily="2" charset="77"/>
+                <a:ea typeface="Jost Light" pitchFamily="2" charset="77"/>
+              </a:rPr>
+              <a:t>LM vs. Newton</a:t>
+            </a:r>
+            <a:r>
+              <a:rPr lang="en-US" sz="1400" dirty="0">
+                <a:latin typeface="Jost Light" pitchFamily="2" charset="77"/>
+                <a:ea typeface="Jost Light" pitchFamily="2" charset="77"/>
+              </a:rPr>
+              <a:t>:</a:t>
+            </a:r>
+          </a:p>
+          <a:p>
+            <a:pPr marL="285750" indent="-285750">
+              <a:buClr>
+                <a:srgbClr val="D50000"/>
+              </a:buClr>
+              <a:buFont typeface="Wingdings" pitchFamily="2" charset="2"/>
+              <a:buChar char="Ø"/>
+            </a:pPr>
+            <a:r>
+              <a:rPr lang="en-US" sz="1400" dirty="0">
+                <a:latin typeface="Jost Light" pitchFamily="2" charset="77"/>
+                <a:ea typeface="Jost Light" pitchFamily="2" charset="77"/>
+              </a:rPr>
+              <a:t>Newton converges fast if the optimal parameters chosen correctly, and yield curve has standard shape.</a:t>
+            </a:r>
+          </a:p>
+          <a:p>
+            <a:pPr marL="285750" indent="-285750">
+              <a:buClr>
+                <a:srgbClr val="D50000"/>
+              </a:buClr>
+              <a:buFont typeface="Wingdings" pitchFamily="2" charset="2"/>
+              <a:buChar char="Ø"/>
+            </a:pPr>
+            <a:r>
+              <a:rPr lang="en-US" sz="1400" dirty="0">
+                <a:latin typeface="Jost Light" pitchFamily="2" charset="77"/>
+                <a:ea typeface="Jost Light" pitchFamily="2" charset="77"/>
+              </a:rPr>
+              <a:t>Newton Method can struggle to provide solutions when starting far from the final minimum.</a:t>
+            </a:r>
+          </a:p>
+        </p:txBody>
+      </p:sp>
+      <p:cxnSp>
+        <p:nvCxnSpPr>
+          <p:cNvPr id="16" name="Straight Arrow Connector 15">
+            <a:extLst>
+              <a:ext uri="{FF2B5EF4-FFF2-40B4-BE49-F238E27FC236}">
+                <a16:creationId xmlns:a16="http://schemas.microsoft.com/office/drawing/2014/main" id="{01966541-081F-A49C-B31A-7F252CF3C75E}"/>
+              </a:ext>
+            </a:extLst>
+          </p:cNvPr>
+          <p:cNvCxnSpPr>
+            <a:cxnSpLocks/>
+            <a:stCxn id="15" idx="3"/>
+            <a:endCxn id="19" idx="1"/>
+          </p:cNvCxnSpPr>
+          <p:nvPr/>
+        </p:nvCxnSpPr>
+        <p:spPr>
+          <a:xfrm>
+            <a:off x="4800600" y="6107227"/>
+            <a:ext cx="215900" cy="0"/>
+          </a:xfrm>
+          <a:prstGeom prst="straightConnector1">
+            <a:avLst/>
+          </a:prstGeom>
+          <a:ln w="19050">
+            <a:solidFill>
+              <a:srgbClr val="D50000"/>
+            </a:solidFill>
+            <a:prstDash val="dashDot"/>
+            <a:headEnd type="oval" w="med" len="med"/>
+            <a:tailEnd type="triangle" w="med" len="med"/>
+          </a:ln>
+        </p:spPr>
+        <p:style>
+          <a:lnRef idx="1">
+            <a:schemeClr val="accent1"/>
+          </a:lnRef>
+          <a:fillRef idx="0">
+            <a:schemeClr val="accent1"/>
+          </a:fillRef>
+          <a:effectRef idx="0">
+            <a:schemeClr val="accent1"/>
+          </a:effectRef>
+          <a:fontRef idx="minor">
+            <a:schemeClr val="tx1"/>
+          </a:fontRef>
+        </p:style>
+      </p:cxnSp>
+      <p:sp>
+        <p:nvSpPr>
+          <p:cNvPr id="19" name="Rectangle 18">
+            <a:extLst>
+              <a:ext uri="{FF2B5EF4-FFF2-40B4-BE49-F238E27FC236}">
+                <a16:creationId xmlns:a16="http://schemas.microsoft.com/office/drawing/2014/main" id="{8E740B2D-F61B-35AC-4871-D468359A3C91}"/>
+              </a:ext>
+            </a:extLst>
+          </p:cNvPr>
+          <p:cNvSpPr/>
+          <p:nvPr/>
+        </p:nvSpPr>
+        <p:spPr>
+          <a:xfrm>
+            <a:off x="5016500" y="5522451"/>
+            <a:ext cx="6311901" cy="1169551"/>
+          </a:xfrm>
+          <a:prstGeom prst="rect">
+            <a:avLst/>
+          </a:prstGeom>
+        </p:spPr>
+        <p:txBody>
+          <a:bodyPr wrap="square">
+            <a:spAutoFit/>
+          </a:bodyPr>
+          <a:lstStyle/>
+          <a:p>
+            <a:pPr>
+              <a:buClr>
+                <a:srgbClr val="D50000"/>
+              </a:buClr>
+            </a:pPr>
+            <a:r>
+              <a:rPr lang="en-US" sz="1400" b="1" dirty="0">
+                <a:latin typeface="Jost Light" pitchFamily="2" charset="77"/>
+                <a:ea typeface="Jost Light" pitchFamily="2" charset="77"/>
+              </a:rPr>
+              <a:t>Conclusion</a:t>
+            </a:r>
+            <a:r>
+              <a:rPr lang="en-US" sz="1400" dirty="0">
+                <a:latin typeface="Jost Light" pitchFamily="2" charset="77"/>
+                <a:ea typeface="Jost Light" pitchFamily="2" charset="77"/>
+              </a:rPr>
+              <a:t>:</a:t>
+            </a:r>
+          </a:p>
+          <a:p>
+            <a:pPr marL="285750" indent="-285750">
+              <a:buClr>
+                <a:srgbClr val="D50000"/>
+              </a:buClr>
+              <a:buFont typeface="Wingdings" pitchFamily="2" charset="2"/>
+              <a:buChar char="v"/>
+            </a:pPr>
+            <a:r>
+              <a:rPr lang="en-US" sz="1400" dirty="0">
+                <a:latin typeface="Jost Light" pitchFamily="2" charset="77"/>
+                <a:ea typeface="Jost Light" pitchFamily="2" charset="77"/>
+              </a:rPr>
+              <a:t>The LM method is preferred for balancing speed and accuracy, excelling with limited data or complex non-linear models.</a:t>
+            </a:r>
+          </a:p>
+          <a:p>
+            <a:pPr marL="285750" indent="-285750">
+              <a:buClr>
+                <a:srgbClr val="D50000"/>
+              </a:buClr>
+              <a:buFont typeface="Wingdings" pitchFamily="2" charset="2"/>
+              <a:buChar char="v"/>
+            </a:pPr>
+            <a:r>
+              <a:rPr lang="en-US" sz="1400" dirty="0">
+                <a:latin typeface="Jost Light" pitchFamily="2" charset="77"/>
+                <a:ea typeface="Jost Light" pitchFamily="2" charset="77"/>
+              </a:rPr>
+              <a:t>Requires careful calibration of </a:t>
+            </a:r>
+            <a:r>
+              <a:rPr lang="el-GR" sz="1400" dirty="0">
+                <a:latin typeface="Jost Light" pitchFamily="2" charset="77"/>
+                <a:ea typeface="Jost Light" pitchFamily="2" charset="77"/>
+              </a:rPr>
+              <a:t>λ, </a:t>
+            </a:r>
+            <a:r>
+              <a:rPr lang="en-US" sz="1400" dirty="0">
+                <a:latin typeface="Jost Light" pitchFamily="2" charset="77"/>
+                <a:ea typeface="Jost Light" pitchFamily="2" charset="77"/>
+              </a:rPr>
+              <a:t>but its ability to converge from distant starting points makes it a strong choice for non-linear least squares optimization.</a:t>
+            </a:r>
+          </a:p>
+        </p:txBody>
+      </p:sp>
+    </p:spTree>
+    <p:extLst>
+      <p:ext uri="{BB962C8B-B14F-4D97-AF65-F5344CB8AC3E}">
+        <p14:creationId xmlns:p14="http://schemas.microsoft.com/office/powerpoint/2010/main" val="436137546"/>
+      </p:ext>
+    </p:extLst>
+  </p:cSld>
+  <p:clrMapOvr>
+    <a:masterClrMapping/>
+  </p:clrMapOvr>
+</p:sld>
+</file>
+
+<file path=ppt/slides/slide2.xml><?xml version="1.0" encoding="utf-8"?>
+<p:sld xmlns:a="http://schemas.openxmlformats.org/drawingml/2006/main" xmlns:r="http://schemas.openxmlformats.org/officeDocument/2006/relationships" xmlns:p="http://schemas.openxmlformats.org/presentationml/2006/main">
+  <p:cSld>
+    <p:spTree>
+      <p:nvGrpSpPr>
+        <p:cNvPr id="1" name=""/>
+        <p:cNvGrpSpPr/>
+        <p:nvPr/>
+      </p:nvGrpSpPr>
+      <p:grpSpPr>
+        <a:xfrm>
+          <a:off x="0" y="0"/>
+          <a:ext cx="0" cy="0"/>
+          <a:chOff x="0" y="0"/>
+          <a:chExt cx="0" cy="0"/>
+        </a:xfrm>
+      </p:grpSpPr>
+      <p:sp>
+        <p:nvSpPr>
+          <p:cNvPr id="10" name="Titolo 9">
+            <a:extLst>
+              <a:ext uri="{FF2B5EF4-FFF2-40B4-BE49-F238E27FC236}">
+                <a16:creationId xmlns:a16="http://schemas.microsoft.com/office/drawing/2014/main" id="{81572802-B089-87B8-F0BC-08BC8B6917DA}"/>
+              </a:ext>
+            </a:extLst>
+          </p:cNvPr>
+          <p:cNvSpPr>
+            <a:spLocks noGrp="1"/>
+          </p:cNvSpPr>
+          <p:nvPr>
+            <p:ph type="title"/>
+          </p:nvPr>
+        </p:nvSpPr>
+        <p:spPr>
+          <a:xfrm>
+            <a:off x="838200" y="1028699"/>
+            <a:ext cx="10515600" cy="755323"/>
+          </a:xfrm>
+        </p:spPr>
+        <p:txBody>
+          <a:bodyPr/>
+          <a:lstStyle/>
+          <a:p>
+            <a:pPr algn="ctr"/>
+            <a:r>
+              <a:rPr lang="it-IT" dirty="0"/>
+              <a:t>Index</a:t>
+            </a:r>
+            <a:endParaRPr lang="en-GB" dirty="0"/>
+          </a:p>
+        </p:txBody>
+      </p:sp>
+      <p:sp>
+        <p:nvSpPr>
+          <p:cNvPr id="11" name="Segnaposto contenuto 10">
+            <a:extLst>
+              <a:ext uri="{FF2B5EF4-FFF2-40B4-BE49-F238E27FC236}">
+                <a16:creationId xmlns:a16="http://schemas.microsoft.com/office/drawing/2014/main" id="{920BD547-8EAA-0995-27DD-58F0387692D2}"/>
+              </a:ext>
+            </a:extLst>
+          </p:cNvPr>
+          <p:cNvSpPr>
+            <a:spLocks noGrp="1"/>
+          </p:cNvSpPr>
+          <p:nvPr>
+            <p:ph idx="1"/>
+          </p:nvPr>
+        </p:nvSpPr>
+        <p:spPr>
+          <a:xfrm>
+            <a:off x="838200" y="1784023"/>
+            <a:ext cx="10515600" cy="4045277"/>
+          </a:xfrm>
+        </p:spPr>
+        <p:txBody>
+          <a:bodyPr>
+            <a:normAutofit/>
+          </a:bodyPr>
+          <a:lstStyle/>
+          <a:p>
+            <a:pPr marL="0" indent="0" algn="ctr">
+              <a:lnSpc>
+                <a:spcPct val="150000"/>
+              </a:lnSpc>
+              <a:buNone/>
+            </a:pPr>
+            <a:r>
+              <a:rPr lang="it-IT" dirty="0"/>
+              <a:t>The Nelson-Siegel and Nelson-Siegel-Svensson model</a:t>
+            </a:r>
+          </a:p>
+          <a:p>
+            <a:pPr marL="0" indent="0" algn="ctr">
+              <a:lnSpc>
+                <a:spcPct val="150000"/>
+              </a:lnSpc>
+              <a:buNone/>
+            </a:pPr>
+            <a:r>
+              <a:rPr lang="it-IT" dirty="0" err="1"/>
+              <a:t>Gradient</a:t>
+            </a:r>
+            <a:r>
+              <a:rPr lang="it-IT" dirty="0"/>
+              <a:t> </a:t>
+            </a:r>
+            <a:r>
+              <a:rPr lang="it-IT" dirty="0" err="1"/>
+              <a:t>Descent</a:t>
+            </a:r>
+            <a:r>
+              <a:rPr lang="it-IT" dirty="0"/>
+              <a:t> </a:t>
+            </a:r>
+            <a:r>
+              <a:rPr lang="it-IT" dirty="0" err="1"/>
+              <a:t>method</a:t>
+            </a:r>
+            <a:endParaRPr lang="it-IT" dirty="0"/>
+          </a:p>
+          <a:p>
+            <a:pPr marL="0" indent="0" algn="ctr">
+              <a:lnSpc>
+                <a:spcPct val="150000"/>
+              </a:lnSpc>
+              <a:buNone/>
+            </a:pPr>
+            <a:r>
+              <a:rPr lang="it-IT" dirty="0">
+                <a:effectLst/>
+                <a:ea typeface="Calibri" panose="020F0502020204030204" pitchFamily="34" charset="0"/>
+              </a:rPr>
+              <a:t>Newton </a:t>
+            </a:r>
+            <a:r>
+              <a:rPr lang="it-IT" dirty="0" err="1">
+                <a:effectLst/>
+                <a:ea typeface="Calibri" panose="020F0502020204030204" pitchFamily="34" charset="0"/>
+              </a:rPr>
+              <a:t>method</a:t>
+            </a:r>
+            <a:endParaRPr lang="it-IT" dirty="0">
+              <a:effectLst/>
+              <a:ea typeface="Calibri" panose="020F0502020204030204" pitchFamily="34" charset="0"/>
+            </a:endParaRPr>
+          </a:p>
+          <a:p>
+            <a:pPr marL="0" indent="0" algn="ctr">
+              <a:lnSpc>
+                <a:spcPct val="150000"/>
+              </a:lnSpc>
+              <a:buNone/>
+            </a:pPr>
+            <a:r>
+              <a:rPr lang="en-GB" dirty="0"/>
+              <a:t>BFGS method</a:t>
+            </a:r>
+          </a:p>
+          <a:p>
+            <a:pPr marL="0" indent="0" algn="ctr">
+              <a:lnSpc>
+                <a:spcPct val="150000"/>
+              </a:lnSpc>
+              <a:buNone/>
+            </a:pPr>
+            <a:r>
+              <a:rPr lang="en-GB" dirty="0"/>
+              <a:t>LM method</a:t>
+            </a:r>
+          </a:p>
+          <a:p>
+            <a:endParaRPr lang="en-GB" dirty="0"/>
+          </a:p>
+        </p:txBody>
+      </p:sp>
+    </p:spTree>
+    <p:extLst>
+      <p:ext uri="{BB962C8B-B14F-4D97-AF65-F5344CB8AC3E}">
+        <p14:creationId xmlns:p14="http://schemas.microsoft.com/office/powerpoint/2010/main" val="2903334426"/>
+      </p:ext>
+    </p:extLst>
+  </p:cSld>
+  <p:clrMapOvr>
+    <a:masterClrMapping/>
+  </p:clrMapOvr>
+</p:sld>
+</file>
+
+<file path=ppt/slides/slide20.xml><?xml version="1.0" encoding="utf-8"?>
+<p:sld xmlns:a="http://schemas.openxmlformats.org/drawingml/2006/main" xmlns:r="http://schemas.openxmlformats.org/officeDocument/2006/relationships" xmlns:p="http://schemas.openxmlformats.org/presentationml/2006/main">
+  <p:cSld>
+    <p:spTree>
+      <p:nvGrpSpPr>
+        <p:cNvPr id="1" name=""/>
+        <p:cNvGrpSpPr/>
+        <p:nvPr/>
+      </p:nvGrpSpPr>
+      <p:grpSpPr>
+        <a:xfrm>
+          <a:off x="0" y="0"/>
+          <a:ext cx="0" cy="0"/>
+          <a:chOff x="0" y="0"/>
+          <a:chExt cx="0" cy="0"/>
+        </a:xfrm>
+      </p:grpSpPr>
+      <p:sp>
+        <p:nvSpPr>
           <p:cNvPr id="4" name="Titolo 3">
             <a:extLst>
               <a:ext uri="{FF2B5EF4-FFF2-40B4-BE49-F238E27FC236}">
@@ -9499,194 +14160,6 @@
 </p:sld>
 </file>
 
-<file path=ppt/slides/slide2.xml><?xml version="1.0" encoding="utf-8"?>
-<p:sld xmlns:a="http://schemas.openxmlformats.org/drawingml/2006/main" xmlns:r="http://schemas.openxmlformats.org/officeDocument/2006/relationships" xmlns:p="http://schemas.openxmlformats.org/presentationml/2006/main">
-  <p:cSld>
-    <p:spTree>
-      <p:nvGrpSpPr>
-        <p:cNvPr id="1" name=""/>
-        <p:cNvGrpSpPr/>
-        <p:nvPr/>
-      </p:nvGrpSpPr>
-      <p:grpSpPr>
-        <a:xfrm>
-          <a:off x="0" y="0"/>
-          <a:ext cx="0" cy="0"/>
-          <a:chOff x="0" y="0"/>
-          <a:chExt cx="0" cy="0"/>
-        </a:xfrm>
-      </p:grpSpPr>
-      <p:sp>
-        <p:nvSpPr>
-          <p:cNvPr id="10" name="Titolo 9">
-            <a:extLst>
-              <a:ext uri="{FF2B5EF4-FFF2-40B4-BE49-F238E27FC236}">
-                <a16:creationId xmlns:a16="http://schemas.microsoft.com/office/drawing/2014/main" id="{81572802-B089-87B8-F0BC-08BC8B6917DA}"/>
-              </a:ext>
-            </a:extLst>
-          </p:cNvPr>
-          <p:cNvSpPr>
-            <a:spLocks noGrp="1"/>
-          </p:cNvSpPr>
-          <p:nvPr>
-            <p:ph type="title"/>
-          </p:nvPr>
-        </p:nvSpPr>
-        <p:spPr>
-          <a:xfrm>
-            <a:off x="838200" y="1028699"/>
-            <a:ext cx="10515600" cy="755323"/>
-          </a:xfrm>
-        </p:spPr>
-        <p:txBody>
-          <a:bodyPr/>
-          <a:lstStyle/>
-          <a:p>
-            <a:pPr algn="ctr"/>
-            <a:r>
-              <a:rPr lang="it-IT" dirty="0"/>
-              <a:t>Index</a:t>
-            </a:r>
-            <a:endParaRPr lang="en-GB" dirty="0"/>
-          </a:p>
-        </p:txBody>
-      </p:sp>
-      <p:sp>
-        <p:nvSpPr>
-          <p:cNvPr id="11" name="Segnaposto contenuto 10">
-            <a:extLst>
-              <a:ext uri="{FF2B5EF4-FFF2-40B4-BE49-F238E27FC236}">
-                <a16:creationId xmlns:a16="http://schemas.microsoft.com/office/drawing/2014/main" id="{920BD547-8EAA-0995-27DD-58F0387692D2}"/>
-              </a:ext>
-            </a:extLst>
-          </p:cNvPr>
-          <p:cNvSpPr>
-            <a:spLocks noGrp="1"/>
-          </p:cNvSpPr>
-          <p:nvPr>
-            <p:ph idx="1"/>
-          </p:nvPr>
-        </p:nvSpPr>
-        <p:spPr>
-          <a:xfrm>
-            <a:off x="838200" y="1784023"/>
-            <a:ext cx="10515600" cy="4045277"/>
-          </a:xfrm>
-        </p:spPr>
-        <p:txBody>
-          <a:bodyPr>
-            <a:normAutofit/>
-          </a:bodyPr>
-          <a:lstStyle/>
-          <a:p>
-            <a:pPr marL="0" indent="0" algn="ctr">
-              <a:lnSpc>
-                <a:spcPct val="150000"/>
-              </a:lnSpc>
-              <a:buNone/>
-            </a:pPr>
-            <a:r>
-              <a:rPr lang="it-IT" dirty="0"/>
-              <a:t>The Nelson-Siegel and Nelson-Siegel-Svensson model</a:t>
-            </a:r>
-          </a:p>
-          <a:p>
-            <a:pPr marL="0" indent="0" algn="ctr">
-              <a:lnSpc>
-                <a:spcPct val="150000"/>
-              </a:lnSpc>
-              <a:buNone/>
-            </a:pPr>
-            <a:r>
-              <a:rPr lang="it-IT" dirty="0" err="1"/>
-              <a:t>Gradient</a:t>
-            </a:r>
-            <a:r>
-              <a:rPr lang="it-IT" dirty="0"/>
-              <a:t> </a:t>
-            </a:r>
-            <a:r>
-              <a:rPr lang="it-IT" dirty="0" err="1"/>
-              <a:t>Descent</a:t>
-            </a:r>
-            <a:r>
-              <a:rPr lang="it-IT" dirty="0"/>
-              <a:t> </a:t>
-            </a:r>
-            <a:r>
-              <a:rPr lang="it-IT" dirty="0" err="1"/>
-              <a:t>method</a:t>
-            </a:r>
-            <a:endParaRPr lang="it-IT" dirty="0"/>
-          </a:p>
-          <a:p>
-            <a:pPr marL="0" indent="0" algn="ctr">
-              <a:lnSpc>
-                <a:spcPct val="150000"/>
-              </a:lnSpc>
-              <a:buNone/>
-            </a:pPr>
-            <a:r>
-              <a:rPr lang="it-IT" dirty="0">
-                <a:effectLst/>
-                <a:ea typeface="Calibri" panose="020F0502020204030204" pitchFamily="34" charset="0"/>
-              </a:rPr>
-              <a:t>Newton </a:t>
-            </a:r>
-            <a:r>
-              <a:rPr lang="it-IT" dirty="0" err="1">
-                <a:effectLst/>
-                <a:ea typeface="Calibri" panose="020F0502020204030204" pitchFamily="34" charset="0"/>
-              </a:rPr>
-              <a:t>method</a:t>
-            </a:r>
-            <a:endParaRPr lang="it-IT" dirty="0">
-              <a:effectLst/>
-              <a:ea typeface="Calibri" panose="020F0502020204030204" pitchFamily="34" charset="0"/>
-            </a:endParaRPr>
-          </a:p>
-          <a:p>
-            <a:pPr marL="0" indent="0" algn="ctr">
-              <a:lnSpc>
-                <a:spcPct val="150000"/>
-              </a:lnSpc>
-              <a:buNone/>
-            </a:pPr>
-            <a:r>
-              <a:rPr lang="en-GB" dirty="0"/>
-              <a:t>BFGS method</a:t>
-            </a:r>
-          </a:p>
-          <a:p>
-            <a:pPr marL="0" indent="0" algn="ctr">
-              <a:lnSpc>
-                <a:spcPct val="150000"/>
-              </a:lnSpc>
-              <a:buNone/>
-            </a:pPr>
-            <a:r>
-              <a:rPr lang="en-GB" dirty="0"/>
-              <a:t>LM method</a:t>
-            </a:r>
-          </a:p>
-          <a:p>
-            <a:endParaRPr lang="en-GB" dirty="0"/>
-          </a:p>
-        </p:txBody>
-      </p:sp>
-    </p:spTree>
-    <p:extLst>
-      <p:ext uri="{BB962C8B-B14F-4D97-AF65-F5344CB8AC3E}">
-        <p14:creationId xmlns:p14="http://schemas.microsoft.com/office/powerpoint/2010/main" val="2903334426"/>
-      </p:ext>
-    </p:extLst>
-  </p:cSld>
-  <p:clrMapOvr>
-    <a:masterClrMapping/>
-  </p:clrMapOvr>
-</p:sld>
-</file>
-
 <file path=ppt/slides/slide3.xml><?xml version="1.0" encoding="utf-8"?>
 <p:sld xmlns:a="http://schemas.openxmlformats.org/drawingml/2006/main" xmlns:r="http://schemas.openxmlformats.org/officeDocument/2006/relationships" xmlns:p="http://schemas.openxmlformats.org/presentationml/2006/main">
   <p:cSld>
@@ -9736,8 +14209,8 @@
           </a:p>
         </p:txBody>
       </p:sp>
-      <mc:AlternateContent xmlns:mc="http://schemas.openxmlformats.org/markup-compatibility/2006">
-        <mc:Choice xmlns:a14="http://schemas.microsoft.com/office/drawing/2010/main" Requires="a14">
+      <mc:AlternateContent xmlns:mc="http://schemas.openxmlformats.org/markup-compatibility/2006" xmlns:a14="http://schemas.microsoft.com/office/drawing/2010/main">
+        <mc:Choice Requires="a14">
           <p:sp>
             <p:nvSpPr>
               <p:cNvPr id="3" name="Segnaposto contenuto 2">
@@ -11010,7 +15483,7 @@
             </p:txBody>
           </p:sp>
         </mc:Choice>
-        <mc:Fallback>
+        <mc:Fallback xmlns="">
           <p:sp>
             <p:nvSpPr>
               <p:cNvPr id="3" name="Segnaposto contenuto 2">
@@ -11488,8 +15961,8 @@
           </a:p>
         </p:txBody>
       </p:sp>
-      <mc:AlternateContent xmlns:mc="http://schemas.openxmlformats.org/markup-compatibility/2006">
-        <mc:Choice xmlns:a14="http://schemas.microsoft.com/office/drawing/2010/main" Requires="a14">
+      <mc:AlternateContent xmlns:mc="http://schemas.openxmlformats.org/markup-compatibility/2006" xmlns:a14="http://schemas.microsoft.com/office/drawing/2010/main">
+        <mc:Choice Requires="a14">
           <p:sp>
             <p:nvSpPr>
               <p:cNvPr id="20" name="CasellaDiTesto 19">
@@ -11626,7 +16099,7 @@
             </p:txBody>
           </p:sp>
         </mc:Choice>
-        <mc:Fallback>
+        <mc:Fallback xmlns="">
           <p:sp>
             <p:nvSpPr>
               <p:cNvPr id="20" name="CasellaDiTesto 19">

</xml_diff>